<commit_message>
finished up to design constraints
</commit_message>
<xml_diff>
--- a/CMQA/Presentations/First Semester Presentation.pptx
+++ b/CMQA/Presentations/First Semester Presentation.pptx
@@ -6,7 +6,7 @@
     <p:sldMasterId id="2147483649" r:id="rId2"/>
   </p:sldMasterIdLst>
   <p:notesMasterIdLst>
-    <p:notesMasterId r:id="rId15"/>
+    <p:notesMasterId r:id="rId18"/>
   </p:notesMasterIdLst>
   <p:sldIdLst>
     <p:sldId id="256" r:id="rId3"/>
@@ -21,6 +21,9 @@
     <p:sldId id="263" r:id="rId12"/>
     <p:sldId id="266" r:id="rId13"/>
     <p:sldId id="267" r:id="rId14"/>
+    <p:sldId id="268" r:id="rId15"/>
+    <p:sldId id="269" r:id="rId16"/>
+    <p:sldId id="270" r:id="rId17"/>
   </p:sldIdLst>
   <p:sldSz cx="10075863" cy="7562850"/>
   <p:notesSz cx="7772400" cy="10058400"/>
@@ -11757,6 +11760,641 @@
                 <a:defRPr/>
               </a:pPr>
               <a:t>12</a:t>
+            </a:fld>
+            <a:endParaRPr lang="en-US" altLang="en-US" dirty="0"/>
+          </a:p>
+        </p:txBody>
+      </p:sp>
+      <p:sp>
+        <p:nvSpPr>
+          <p:cNvPr id="40964" name="AutoShape 4" descr="data:image/jpeg;base64,/9j/4AAQSkZJRgABAQAAAQABAAD/2wCEAAkGBxQSEhUUExQWFRUXFxgZGBUWGBwbHBobHhwYFxsfIRwYHCggHhwmHRcYIjEkJykrLi4uHB8zODMsNygtLisBCgoKDg0OGhAQGywmICQ0LCwsLy8sLCwsLCwsLywsLSwsLCwsLCwsLCwsLCwsLC8sLCwxLDQsLSwsLCwsLDQsLP/AABEIAMoA+QMBIgACEQEDEQH/xAAbAAEAAgMBAQAAAAAAAAAAAAAABQYCAwQHAf/EAEEQAAIBAwMCBQIDBAcIAgMBAAECEQADIQQSMQVBBhMiUWEycUKBsRQjkaEzNFJic7LBJENyg8LR4fCCs2OT8RX/xAAZAQEAAwEBAAAAAAAAAAAAAAAAAQIEAwX/xAAwEQACAQMBBAkEAgMAAAAAAAAAAQIDESExBBJBYSIyUYGRscHh8DNxodETI0NSYv/aAAwDAQACEQMRAD8A9xpSlAKUpQClKUApSlAKwuXAoJJAAyScCozxD1pdLb3GNxB2j3iAfv8AUKpV25qtedwCrZOd5YhVjB7gmMyBgxBY1yqVYw1JSuTnWfGaowt2hkmDcYgKuJk+358cweDK9A60LmltXrrKpfd3iSCRiecCaqQt6XSLtRRfdztJuR+IDCKBOccDgqSSIqN6a15z/slvcqMq+pQYUksxljsEThcnviazR2l5lbHPBbdPVrdwMAQQQeCKzqi6TxHbFyLreTeG4kqCFIHIdW4gEc/cECrF03rJa2GvJ5UmJMbTkgGQTAODn3Amu1PaFLEsP5oQ4tExSvgNfa0FRSlKAUpSgFKUoBSlKAUpSgFKUoBSlKAUpXygPtKUoBSlKAUrn1etS0Jdgo+e/wCXJqlda8YPc9GkGWJUNgkkGTAVpI29x2PIPFJTUdSUrls6r1i3YWWMnJgcwIk/AEiqVrfEmp1bhNIGXcTnjaAYkmIE/PHYSawtdFKlrusuMu7cBaQ7mhjJBIBChtsYzx6prDU+IEtA27RVEgRbThMZ3NtyxJAIzkQfnJKvKbtD2LJWJfxBdVjY84hmtA71G0hmIRsk4UE22MQcA8AE1X9T1t7odFMkQAArFZOIC44zEiD7HiujpPhq9qQr3ybaCGXaVlgVBBABO0zmWk54AFXfp/TrdgEWxEmWY5ZickknJOayVNojF9LpP8FkisdN8HFmR9SwbaBCLOTydxPOYwIq2abTrbUKihVHAAgVtpWCpVlPVljg6l0e1fyygPBAuADcv2J/Q4qpdQ6Ve0iIYGptrcLFWHpWSSCV/DAP1Dj86vlKtTryhjgLIqnTevkXLh3qttVGzT7SWYDLFSD9XaPjjvVm6T1db6g7WRiAdlwbWg8c1EdV8M27u5k/duwIlQNpJ7sIyR8EVW763dO+nGqtm8ELhbm8jkLkEMBmMBhIPBAr09n2pWsvB66cDm4nplKqGg8SeVbZ7twXUV9sKrm4oYwsiJbnmIxMmrRpdWlwSjTHIyCPuDkV6EakZaFWjfSlKuQKUpQClKUApSlAKUpQClKUAr5X2vlQwfaV8qF6z4ltWAZYFuABxPPI9vijaWoJm5cCiSQB7nFVTrnjNLYZbILsPxDgerb3GfYe5981X7uq1fUc2zttg7TPpC9ySc5PBCk4ETk1kLWn0h32wLlwc3SvoBJA9CyMwTET9/fLU2lX3Y6/PAuo9phasX9Wxe7eFu2B9NyCYmWHlzMcwW/IRitx1VnTY06BDEb22+a05OWyBwcxAJxMA8apc1F64LKEvks4OCxgDPCqMnMknMTEWDoPg9LQVrxFy4CTHKCfgiWPyax1ZqP1H3FkV7SaDUa0kqdijaPMLMQ2Cpzy5EDHyZJJmrh0nw3ZsqAUW44Eb2UE8RA9h8VMIgAgAAewxX2sVXaJSxHCJsAIpSlZyRSlKAUpSgFYXrKuCrAMDyCJB/I1nSgKt1bwuwLPpXFtj+HIz3hlysjtx7RUfY6y1u6RfF0XdkbwxUAKcErO1iCckAyDweKvNc+u0SXVKuoIzB7j5B7H5rXT2prEvHiRY5On9cIt2zqPLlzt3Wm3qWzHCjtn4+KnbdwMJBBHuKoN7w9f0rBtJBUcgkltvLAjh/g8jivnSvEIBvEFvOJHogeWWiAJIG3ODuOPevUpbVfmu39r3KOJ6DSozTdXWUS9Fq6wkIWBB+zd6k61xkpK6KClKVYClKUApSlAKUpQCvlfa+VDBSfFfXbgvNYRxbIClTJG4tiJBHvOcYyDUfpujWrThrn726FAXTrJSAAsFmB3gEycQJ4rk8aT+3nE+m3JjjNOn9WOnZoOMkzkRPc8gS386w7SpO9jojd1Hq7m55CIyqAV8q2pKqMR6Fjd3HYCQZ5FdHSPB7vD6phO9mKAeppjlwcCR9IH5136fq9q4Wa0pW+SqttVfUcHliAwj5n2zU5a1sELcXYx9srPA9Xae0gVhnUnBWireZZG/S6RLYOxFWedoifv71upSsLd3dkilKVAFKUoBSlKAUpSgFKE18BpYH2lKUAqK6z0K3qFcRsdgR5iYaeATH1fnUrSrRk4u6BRH6bd0l1Cba37YTy97LPpiSAIZrYJnuV95muzoHX2S3JutqGa6V8ogKwLE7QpLxtUQDEzEwJq31X+reGUdWNn9287oGFJGe30z7jP3rbR2vKvh9v79irRYdJr0clQYccofqHHbuMjIxXXXmzF7F0i/aALoANQcsGAMQ/4iB2kGPsanuieIW22gxbU7hDXLVsjYwE+peykcEmfv29SntCa6Xjw9u8o42LXStWn1Cuu5Tj7QQe4IPBrbWm5UUpSgFKUoBXyvtKhg8s8a/1857Wse+f9OagergeYuYzj59dvFT3jYj9vOMxag+2c/wAqgupkLcA+TBOYO5IwfmKzSXTLomLmm/snb7gcEfkcfcV1aXqjqWDIhLJtNxxub+7BOHE52kj8q577ELg5xmPy4qH0/WVdypkjiCP+3fk/MQM85Ywck3qieRe+m9U2ra2M99nlWAT0qwmWMSbYmR3GMRU9p9arQD6Hz6GjdjmM5HyK84tOZBtORtIMAwR9j3Bzzg9qkLfVmCXlRVW4zb/MeT6jAY7VII9IMFT3+9Z57OpaE3PQKVAaDrP7xLYJvBrPmBlUwIAxu4YnsCd3vM1NafUK67lOPkEEH2IOQfisU6bjqWNtKUqgFKVydTF0pFnaHkZbsO8Yifv/ADqUruwM9XrUtj1MAYJC/iaPZeSftUVrNXqLgi2hSBuIxvjsvMBjk7QeB9Smt9voikE3WNy4wILNwJ4gcQK5ReuWztXaLuwKQ+AxUYZCYDYmVkZ/jXemo8Msg0aG3Z2st9juU53vuEn1Qvsf7sbvivuitl2Js2otRzcld3MbSF3Lx889jWoX7ZV11L3t7YINpwMCMQpRxk5iKaDqF4ubdos6gBQWXOcbsncsdw2D+GK7NPLX5vbuIJLp3UAsBywUqzA3TlCGCMjMcSCwj3HvEnOz1R7rgWrZ2BoNx8CAYMDv3/7VlpOl4/ecAkhQZyTJJaJJJzGB8VJogAAAgAQAOwrPKUL4RJ9pSlcSRSlKA13rCuIZQw9iJqr9Q8LuhD6W4ybc+WDEj+yG9vg4nvVspXSFWUNAUPT9bZPMVkazeJk3WLCWgDcyQfRiMSPgVbrHiBN6oxVtylhct5SBgy2QuZ7n7196p0m1qF23k3DjkgwecjNVjVdM1OjZrli6DZiSCssWkASigbjHdYPGMV6NDauCxyencUa7S/W3DAEEEHgjINZVR+kdesrFpL3l3oDMjlnSST6dzcT8EH78VO9P6wdZb3acgAOUdzypAVjtBHqkMIJx8HivRpVlPg0UasS2o1KpG5gJwJOSfYDufgVwdI6t+0Nc2rtFt9jBj6t21XyB9OGGDnmQIrrs6JVbdlm43MZP5DgfkBXJ0fR27dzUlEC7r25oESTbtEk/Mk12IJSvlfa+VDB5d41J/byO0Wp/jj+dQeuBNwSdv1SOZh0MY94/KpvxtH7eZmYtR/HM/lUF1Zv3qcjOI999v/SazS65dEzqj6fzH61SNCPXd+4/6qu+r+k/cfqKpGgP7y79x/1Vnj9Gfd5o7UPqL5wZKW9U6jBx/wCd3P8AxZ/jUla6irAB+/sDuxn8Pz9gf4iolBJA+a+H8x9sfpXGM8ZNVShGTxhlm0uruoUa252iQyrHBgQRxj3WPipPpfUES2FU+UVuH97dus3pP1Hc+7PEK2PkRVY6SbhDEEEgkfMQCB8xwPaT3Nddx0eQ2GIgnt2gEH/0fE1eUEzC+i7Pgei2eo+raSHAAO9BIEgn1AfSCBIPHPGJ7rN1WAZSCDwQZH8q8+0/Urtr07yEZSvp7HgENyhzjtUz0XqPmBBYDITO/wA5skrj6Yg7u5BU+9Y6mz2yiUy10qO0nWLbts3LuB24YFSw5UEfiHsYP3qRrNKLi7MkVi9sHBAPfNZUqoMfKHsKW7YUQAAPYYrKlTcCqp4l8XHTam1p0W07NsLrcvLbch3CKLat/SPhjEjt71a6qviXwm2pveYlxbYdbaXt1vezIlzzF2NuGxssJg9vaulHc3unoQzf1fxK1izrrgthv2SIG6N820uZxj6478VO6K9vto8RuVWj2kA/61UvEfg/Uai5fFvV+Vp9Tt86z5KsxhQh2uTKyqgVb9PaCKqjhQAPsBAqaihurd19l63CubK13L6qVDMAWMKCYk+w9zWyawuWlaJAMGRI4PuPmuStfJJnXx3ABJMAZJPaoHqnWl0rOWcvuMhDAW3C8SM5gmIJzxFV/Va/Va241q0CFUmSIAVo4ciRGf7xmCIrvDZ5Szw7SLk71jxbatEqpDsCAc4kiRn292OB7ziq+x1OpBe+x09mFLXWIQQNxESATlvge8muXUajS6T03P8Aa9Qvb/do3ME8sc99x+1QfVOo3tS037hYA4QelR+Q/UyfmK20qKXVXe9e5DU6+o/s6C4ulV3ITbc1JZisZgBPpjP1AD7mK9K8D6VU0iOJm9+9ef7TBQYAGBCjFeWII0uojH9GPyk/+a9b8I/1LT/4S/pW7Z8XRznFXvxJeuPQ/Xf/AMUf/VarsmuPQ/Xf/wAQf/VarSVOyvlfaVDB5b41J/bjicWs+3q/14qC6pIcBRzMkdgXQT/E1avFPSbt7XMLaXMom1gPRIzLMcQPiTNVvqugueeLch7i7mOwMQdrIzACJP8A3rNO6lvF0TFrSPdJRBO1QT78wP4waq/UelPaYtbUspXc9vAdCPqx+Je4I9+0VYtL1l7V9Ra2Mr4ae8DcMj/j/lVls6jT6wsAGW4hgN9LCO4KnjMc+9Zo1JU9VdPUnKd1qeXae8rcH7j2rOrZ1/wmIZyIaSwu2l9X2dZAI7yucd5qp6yy9iDch0Jhb1vKE+2YIYe3NP4FUX9Lvyevd2+fI109qX+THPh7Ez4f4f8A4h+grDxZdKWNwidyjIBwcEZ7EYrLw4wKuRkbh+grT4y/q/8A80/Wr7PH++EX2x9DJXfWa5mvRdSK/V3BJ5jsfy7/AH/WTQh4KtBmdskqW5Bxnt+fcVXhWSXCOO38P/H5Vy3+k7mqezKycS5WeuOqMjnaCcEAF4GWjdIae3fNTnTuqMbpt2LbNaFsOHYgIOAUH4ge+RHIwIqh6bqU+lszA9RgzHY98x89+1SWjumRcRjgERORI45gg/P8apOnFxM7upWZ6NpdYtwCDmJ2nkdv/YrorzvR9S9FlT5dlbV4FtlvOwnjkFCSZJE8GrXoepNuuAJcuW0Ii5Alt3q9PZwsxIgyIg81jqUHHQJkzStdi+rruUhge4/n+dbKzkilK06mxvAG5lhlb0mJggwfgxmpQN1YX7yopZjCgSSewrmu6l0a4XVRaVQVbdkn8QIOB8Zqqde8XI6G2EYbwwbcRK8YO0mJ7xJA7GutOjKbXYGy0P1iwAzeYvpmYOcCf9R/GvPhrrvmbLZa4z7jC7iCjZiGOeMnC5IBjNbR0V2t+dqriWLBacghsTACn3zG4yOwzWnWde2qyaFRpxtk3LmXcjhRG6JHH6Ct9KnGF1DN+3RfORU7tP0dVH+1E3bzRcOmtAG40KEAYgwFiBiAMCaius+ILt4eXHkIuPKQxMGIYjmIiBj71E6bqV5HZ9+244Kt5ZMlTtJJZvUT6Rkn4GMVp1CuuXEDmIM/cTXf+K0rt3+cESuZkiR8n3rKtdpuBzj6vf8A81sroWO1MaW+f7RUfwBNeq+FHA0Wmk820A+8V5Sv9Tvf4uP/ANan/U16X0H+q6DH9nt/+K5XShqzlMkBbvDUuxBNrYNsNwcYCzEzJkjiM9qj9D028pUXA7ib8sbv4TculBhgZKunYxt5ECevUWNQCdrMR5vp+mNhVPqyCAG38Sa+3rOoNpgpi4zMwM/Ss+hQSDmAu6fdoPFaCh26Qi1aQOwBhRJb8R7Sxk5+a65qvdVD+Q4uA5ayFmGlg4kiJgH5j7CrDFAceg+q9/if9KVXeu+HnF03rGZO6AYZWyCyzggg5B+eZgdt7qz2L5U6e49u5dI823kW4RSS45C85E8dqsCOGEggg9wZqs4KSsweQ6/e113gtfVgpJ9EQPVIg5IODx8d6jL5K2WUkBtu4qpn6oK5HebbYr2Hq3RLOoB3rDERvXDAdsiqT1joV+wQfSyCT5qj6WyAWQ/B5ms8qTjpoXUu009H8VOrLauAG2qS1wk78Ec8zAZT8ipl9DY1Qa5Ydd30kgAg9yGVhBFUs2QCXXcxY7SZEbQFQieS5KDt8Vlo7l7TlUDm2S8MoPbn/qg1mdJPKwWZ3P059K7g2gttmZgycL8c8AR/7xEeLHD6aVMjeuR96uPSfFdu+SlwAKAAXYiCchpHY7lYVh1LwrbuLvsFdrQSoMo45wRjPvU06u7VjOpqmn9yko3i0igIcVsB9J+4+1dOv6DctM3lTAJPkv8AXHJ2H8cZ4zwYzUfZ1AMjIPdTg/wqs6LV5xzHPdftXDyPQpV4zSjo/mhjrnK23YchGI+4BNWf9jgBkmcHbMdoMYx2/hH2qvU/6G7/AMD/AOU1drX0j7D9K5wk1HBz2vrI4G1Ck7bghhEEZZSeDjOeeIzB+dysTuVj5lq4m1l5Vh33KPzyPtFVzq39cb/hH+VBXXpuoMnv8nn4Eg8x8H/uO84qNs6q/wA8DPCnKUW1wZdundZ8w2CTb04jYRJLEjhVIO2I7MCasOj6luDFx6VMeYFIU5jg5WO5OO8153buI+RCtMzyN3E4waktH1O4jbLjMUJUqskDHKhh7/2TzNZalGLIvqehTUF1rxPasiFO54aB2x+ueMic5EEji6lrbH7KwVjbGB5YME5EgATyJyMDNVpbml0yBr5/abt0K4sr9Ken0h885jPA4GM8qWzp5lf7E3Oy9+064l/SlhlYG4zehVIgzxMDBAAB7nmudOo2NKUt6MftN4zF1+EmFhBAEnt9sk1D9V6vf1WLrBbciLKYUR9P/v6V1eG9Gu5r7fRZBcgclgCV/hH8hWxx3Y9LTsQscnWzc88m+267CiZnBAMCMAZ4HzXGs8k7FmN32yTjMfasuo9UBZrjy1xzMRgLEfmeOePY8iJe9cvHLYiOYAA7fb4rrHCV9TpCm5fY6bvVFtibfY7t/cCMxnBJJMzInmuu5g24/EjEj7FAP1NV7XLCuAQcHI71YbvNn/Cf/MlWTuiakFBqxpuW4yBKkyR7fIrYj+8Z4I7is6wtaRiTsUkRJUSSI7ihTQ69SP8AZQY/3r/ySP8ASvXPCH9S0/8AhJ+leVdV6t5mnt2ggVbakkj8TQc/HNeq+EP6lp/8JP0rps983OcyYri0P13/APFH/wBVqu2oTovUd97VIy7GW9AEglgLVn1Y4BxWk5k3FKUoD5Fcd3QerfbY22PI5RjEAsuJPyCDgZjFdtKA4LWvKwt8BGJ2g/gYxMg9vs0H713GvlxAwIIBB5BqPuWbttt1uGtBf6HvuEAbWJhcdjj7STQHD1nwrbvkspa25MypwT8gjvwYjmqN1HpNywXV7QQR6bmCmfr2ngHH4hPsBzXqWk1a3BIkHupwynuCPvWWosK6lXUMp5UiQfyrnOkpEp2PGfIVAPK3N5ig8YBY7bY92Yh2JIEYHFdfTOt3NP5dpP8AdWgHtRy4TI/iAMH86tfXPCDbg+naEXJs/HcKYxGIHbtFVTT6S1bU7bQQrcXcSpB2rkgKIyxHJ+Z71mlBrEkXuWzR9Ts6xXV127Tt9RGcxIPvxj5HNRXiHwoLijDXAv4ww84L7BmlWAjgifkVVtVa2ILZdXf0lwJ/Eu6OIn0qcVO9K8Q3LWo2XG/2faSBGVAKgEEdsk/aK4pSg96mw0nhlT6z0u7bS6oBu29pXeohgSCAGU5H3iD2Jq3W+B9h+lWC5ptPrrRe3BJBAYSCpjv3qt63S3tKT5k3LfZxkiT3+I/94qJTU8WSfHhf08g2+LuVjq39cb/hH+VK+V86vdH7Tu/C6gK3b6V/1BFJq21xaVN/8+rNmxNbslz9EbJKmQfy/wBDUp0zWSApx24xJ4//AJ/5qKuNOZBwMisUPqt/41v/AC3f+1c49Zx4CtBOnvcST1F1mRySfRsiP73pP8iajw013N/R3v8AlfqKjNNO3Puf1NaE9UZIpXubSamurKNPYt6cCTe9d3OT9Ij3AjH5Vz+HdKLl9d30pLt7enifzj+FcvUNWb153JkFoU/AJH8P+1UfSmo8Fl+n7LMrurM3Gj3gflit7IzL6sACdi+3v3j86xu3trPH1bj6vYZBrVaR3wJOePv+pq3Fo2LqpmGocunlgCOw+cxJ/Op6+hBsyP8AdP8AzZI/1rZoekJb2NeDMSQfKSd5TMtj6BMD+0e2M1t1guM43qQY2qqqQAq8KqjsPialGapNSeDlq0+DmuMly3bWd5hnAyoj+1wP1z8V96X4YVFF7WN5dsAk2yYbERPf/wCIzx9q5upeJ2bZb0i/s9kTKqAGYyIjbwInHPGe1cZS3+jHx4e5TU5PFPlg+XatLbCegwSWJjMicgSMxJnntV78DdWB0iJcG1rbCyFGSxCo3Ak/jz7ROBVR6H4Ov6gByfKWQQXBlveB7fJ79q9J6T0+3ZDrbUKN8+5JKpJJOST7/ArdRhuxOM27hfNu7gwNlCIEEG58+6qP4nPaurSaVLa7UUKPYfqT3PzW6ldiBSlKAUpSgFKUoDn1WjW5BMhh9LKYYfYj9ODXO+puWi3mLut8i4gkj4KCWP3UH7CpClAYWbquAykEHgio7rXQbOqUrdWT/aGGGZ5rovaAfVbPltJJ2jDE5O5eDPvz81t1GoFtdzmBiT8kgfqahq4TtlFE6r4dvWWZlzb2t+8SN6g4yDmQD9Q9u1VQ6dSiG2rkw6By0ACNqjaRJE8s0DHtXr//APp24uGTFvDEqfcjGM5BGKrvW9JpL0bWNu4SrDarQ8njYMNPB71xlR/1LKR5/pnuW3thbkBDtJRgRvVpPBjAeDVw0XilW8wXwqokAuJOcCNoBnPtUXrul3LW8OirbIBVwJBXBMEibZgAHHfvFQl7T3I8tFZ/Mgl8fVLMABORAB3fb7VmnBPEkWuXHWeHbN5C9kI6uD6TBUzwQeVYe4P3qmdT8O3LTqthTJmbLkSIj6XMK09hhs8GJrv0HV7lu9bCO2wBmKKfS0CDjjlD/wCmrToutafVqfORUH4d5EEfB5B+Kqp1KatrHsfz8rI0d1hnmlu+CdplWGCrYIPtWxfqt/41v/Leq89c8LBwzR5sgw0nzVPIIefUPgz+VU+90t7LWpfeDeSAVIZQFuTvBmDLRMn+dTGNKXSg7cn6P9/k6yrylHdku86W/o73/K/zCo2y8g/BIqSb+jvf8r9RWnoWi8y8qQCN25542iC0/cY/OrNpbzfzBziSjt5GigDbd1B+/o4H2EZj5NQYHH5V3de1fnahmH0L6FE4xyft8feuGq0lZXeryXNQ6KT+8chLbOQGP3gkKssw+QI9yK7f2tbcjTpsHHmvBuD32n8IPxn+9U54V6f5gJa35g94GApMgFgRJJ+4g5Far/UNMmoBTSBgwcIhcn1KVAJQAgTJxnjFS53bSVyHJvU1dK0tyzYfU5CkhQTEurGWABwRgffPzW/qPiZne26kbrZBRQIWCpye5MmNsgRPxTTefr9Utm+biITO0CFRQD+A8TkSwnIwJxcdL4G063TcJLr+G0fpH37sPg1eFBy6UtSjaKPY6fq9e5cKXz9bHaig9hOIEcLJq/8AQfB9jTEOR5l0fjbgH+6vA+/NT1iwqKFRVVRgKoAAHwBgVyPq3uEraXEZut9IPsF5Y/wHz2rTCmolXJs6NbrEsqWdoA/Mn4AGSfYDJrm6LrfOVrnlvbBYbRcADEbEIO0Ekc8GDjit2m0IWCxNx+d7ZM/A4UfAiuuK6FRSlKAUpSgFKUoBSlKAUpSgFRvUdUm2953otIAWef8A5HEdoH3qSqM6p0ZNQl1LhbbcH4CVI9O3kGgOPzbDM48y6zMyDhjw7lYO36QxbPGI7Vhr7OmVgLjXAyQUweSQfTC+ozEjNdFvoG0jbfugBlO30kEKWbaSVkrLseZ+az6l0Jb8+ZcciICwpUZBOCsNMCQ0jFAddqHDWyspsX6s7lYMCCCPj+dQHV/CS7ZsDg/0bHB+xP0kdv8ASp5l8oFgCwCou1RkBd0kAc4PAHbFdFjUK4lTMcjgg8wQcgwRzVZQUlZg8kv6NrYdGtrYbccEAGJOVIxDFjPyTya5H0+BbQFyCp3BSDgbmwRMDcM/Br2DX9OtXl23EVsEAkZE+x5B+1U7rPhS5bLOjtcQiCgEOBIPIPrHuIHAwa4SpNZRZSILpPiq6lxkuR5dtLcqFzJmQD7ZH8Ksto6fXIHEqxkc7WkYOO/5e9U79k80YAtlid+5fUGLEgH1fu1WeIP5VosrFxEX1KjM3mqCAZLLInjIEH5EVmcE8rUu1bBiwi3e/wCV+orf0rX27OnvCGN66ds/hVNoH+rfyrQw/d3f+UJ/MfzrV03VC1cRyAdrKRPbnMHBjmryhe9+XkEa9NonLC2qMXP4YM5zMe2ZmrLp+gWdMu/XPBP0WkaSYOZ289uMD3rh1viK557XkJVyhtz+ELOIHBPeT/a+M7ejeHNTrG3uWVcTduhiSMkbQYLD8wBPNRuTm7aefiTfGTDqHie46+Tp18izhUS2IePaV9/Yfxqf8F+F7lm8L98BYTaikgkltpmOxG2PfJqzeH/DdnSqAoD3MzdYDcZ9vYdoFdHVVBfTzGLx5HB8q6B+cxHzWmlRUCkpX0Pmo01zzVZSdq7cSMyx3z7wsRXHe0epDbkd9pdnKMVJEFAqA/2CN7fwFcdu/qCDH7QQZ2g21VgRhpnBwCy8fVHauh79/wAu1/TbmZwPQMDdKG57ekRHu3xXcoSPR7T27e267MxYkG4VLGRMenGDIx7VI1WLPmNb0xvBvMGoT6hkelt2BwJ3Z9qs9AKUpQClKUApSlAKUpQClKUApSlAKUpQClKUArmv6JWYP9LgQHXmPb5Hwa6aUBHrqntj98BA/wB4v0x7sD9PzyK7lYESDIPBFfSK4m6ftYNaOyMFI9DD22ggA/3h880Bq6r0S3fywIcCA4Ofz7H86o3VegXrIbzfXbNxGm3uAO3I3hTIBJM5ir/Z13a6PLaQBJ9LE/2W78HHPxXWygiCAQe1c50oy+5Kk0eNdR0YCGPqJEAD2K9+OAcfFSngzwmmrU3rrHywWQIIkkYaTGB2EZ+RVw6v4Z0927bLhhuMbUIVTCtyIkYkYip3T6dLS7UVUUdgABUQptdZ3G8yB6X4L09lt5BuEGV3nA9scGPczVgv3lRSzGFAkk1xjqG8xZXeMTcmLcTBhhO4iDgd+SK2afQwSzsbjEg+oYWMjavAj8z810SsQavOuXQvlg20OS7r6iPYIeCfdv4e3TpNItudsyxliSSSfkmuilSBSlKAUpSgFKUoBSlKAUpSgFKUoBSlKAUpSgFKUoBSlKAUpSgFKUoDXfsq6lWAKkQQa4/IuWiPLO+3ABRzkROVY5J+GPYQRUhSgKprfFCXGK6ZGv6ixcKtpvSjBjbciS5C7f7wJHPNTGk0ty6k6mAWCk2kJ2qeSCwMvkwZ9JA45nPV2VF6y20btzeqBP0N3qQoD4qgCBgV9pSgFKUoBSlKAUpSgFKUoBSlKAUpSgP/2Q=="/>
+          <p:cNvSpPr>
+            <a:spLocks noChangeAspect="1" noChangeArrowheads="1"/>
+          </p:cNvSpPr>
+          <p:nvPr/>
+        </p:nvSpPr>
+        <p:spPr bwMode="auto">
+          <a:xfrm>
+            <a:off x="155575" y="-144463"/>
+            <a:ext cx="304800" cy="304801"/>
+          </a:xfrm>
+          <a:prstGeom prst="rect">
+            <a:avLst/>
+          </a:prstGeom>
+          <a:noFill/>
+        </p:spPr>
+        <p:txBody>
+          <a:bodyPr vert="horz" wrap="square" lIns="91440" tIns="45720" rIns="91440" bIns="45720" numCol="1" anchor="t" anchorCtr="0" compatLnSpc="1">
+            <a:prstTxWarp prst="textNoShape">
+              <a:avLst/>
+            </a:prstTxWarp>
+          </a:bodyPr>
+          <a:lstStyle/>
+          <a:p>
+            <a:endParaRPr lang="en-US"/>
+          </a:p>
+        </p:txBody>
+      </p:sp>
+    </p:spTree>
+  </p:cSld>
+  <p:clrMapOvr>
+    <a:masterClrMapping/>
+  </p:clrMapOvr>
+  <p:timing>
+    <p:tnLst>
+      <p:par>
+        <p:cTn id="1" dur="indefinite" restart="never" nodeType="tmRoot"/>
+      </p:par>
+    </p:tnLst>
+  </p:timing>
+</p:sld>
+</file>
+
+<file path=ppt/slides/slide13.xml><?xml version="1.0" encoding="utf-8"?>
+<p:sld xmlns:a="http://schemas.openxmlformats.org/drawingml/2006/main" xmlns:r="http://schemas.openxmlformats.org/officeDocument/2006/relationships" xmlns:p="http://schemas.openxmlformats.org/presentationml/2006/main">
+  <p:cSld>
+    <p:spTree>
+      <p:nvGrpSpPr>
+        <p:cNvPr id="1" name=""/>
+        <p:cNvGrpSpPr/>
+        <p:nvPr/>
+      </p:nvGrpSpPr>
+      <p:grpSpPr>
+        <a:xfrm>
+          <a:off x="0" y="0"/>
+          <a:ext cx="0" cy="0"/>
+          <a:chOff x="0" y="0"/>
+          <a:chExt cx="0" cy="0"/>
+        </a:xfrm>
+      </p:grpSpPr>
+      <p:sp>
+        <p:nvSpPr>
+          <p:cNvPr id="2" name="Title 1"/>
+          <p:cNvSpPr>
+            <a:spLocks noGrp="1"/>
+          </p:cNvSpPr>
+          <p:nvPr>
+            <p:ph type="title"/>
+          </p:nvPr>
+        </p:nvSpPr>
+        <p:spPr/>
+        <p:txBody>
+          <a:bodyPr/>
+          <a:lstStyle/>
+          <a:p>
+            <a:r>
+              <a:rPr lang="en-US" b="1" dirty="0" smtClean="0">
+                <a:solidFill>
+                  <a:schemeClr val="tx1">
+                    <a:lumMod val="85000"/>
+                    <a:lumOff val="15000"/>
+                  </a:schemeClr>
+                </a:solidFill>
+              </a:rPr>
+              <a:t>Key Design Parameters: Mission Success Verification</a:t>
+            </a:r>
+            <a:endParaRPr lang="en-US" b="1" dirty="0">
+              <a:solidFill>
+                <a:schemeClr val="tx1">
+                  <a:lumMod val="85000"/>
+                  <a:lumOff val="15000"/>
+                </a:schemeClr>
+              </a:solidFill>
+            </a:endParaRPr>
+          </a:p>
+        </p:txBody>
+      </p:sp>
+      <p:sp>
+        <p:nvSpPr>
+          <p:cNvPr id="3" name="Content Placeholder 2"/>
+          <p:cNvSpPr>
+            <a:spLocks noGrp="1"/>
+          </p:cNvSpPr>
+          <p:nvPr>
+            <p:ph idx="1"/>
+          </p:nvPr>
+        </p:nvSpPr>
+        <p:spPr>
+          <a:xfrm>
+            <a:off x="618331" y="1419225"/>
+            <a:ext cx="9210675" cy="3124200"/>
+          </a:xfrm>
+        </p:spPr>
+        <p:txBody>
+          <a:bodyPr/>
+          <a:lstStyle/>
+          <a:p>
+            <a:pPr>
+              <a:buFont typeface="Arial" pitchFamily="34" charset="0"/>
+              <a:buChar char="•"/>
+            </a:pPr>
+            <a:r>
+              <a:rPr lang="en-US" sz="2000" dirty="0" smtClean="0">
+                <a:solidFill>
+                  <a:schemeClr val="tx1">
+                    <a:lumMod val="85000"/>
+                    <a:lumOff val="15000"/>
+                  </a:schemeClr>
+                </a:solidFill>
+              </a:rPr>
+              <a:t>The final major parameter that drives small spacecraft design is the ability to verify that mission success has been achieved.</a:t>
+            </a:r>
+            <a:endParaRPr lang="en-US" sz="2000" dirty="0" smtClean="0">
+              <a:solidFill>
+                <a:schemeClr val="tx1">
+                  <a:lumMod val="85000"/>
+                  <a:lumOff val="15000"/>
+                </a:schemeClr>
+              </a:solidFill>
+            </a:endParaRPr>
+          </a:p>
+          <a:p>
+            <a:pPr lvl="1">
+              <a:buFont typeface="Arial" pitchFamily="34" charset="0"/>
+              <a:buChar char="•"/>
+            </a:pPr>
+            <a:r>
+              <a:rPr lang="en-US" sz="1800" dirty="0" smtClean="0">
+                <a:solidFill>
+                  <a:schemeClr val="tx1">
+                    <a:lumMod val="85000"/>
+                    <a:lumOff val="15000"/>
+                  </a:schemeClr>
+                </a:solidFill>
+              </a:rPr>
+              <a:t>Without successful mission verification, there would be no reason to conduct the mission in the first place.</a:t>
+            </a:r>
+          </a:p>
+          <a:p>
+            <a:pPr>
+              <a:buFont typeface="Arial" pitchFamily="34" charset="0"/>
+              <a:buChar char="•"/>
+            </a:pPr>
+            <a:r>
+              <a:rPr lang="en-US" sz="2000" dirty="0" smtClean="0">
+                <a:solidFill>
+                  <a:schemeClr val="tx1">
+                    <a:lumMod val="85000"/>
+                    <a:lumOff val="15000"/>
+                  </a:schemeClr>
+                </a:solidFill>
+              </a:rPr>
+              <a:t>Thus, any design associated with the Rascal mission must have the ability to relay the success of meeting its mission criteria to operators on the ground.</a:t>
+            </a:r>
+          </a:p>
+          <a:p>
+            <a:pPr lvl="1">
+              <a:buFont typeface="Arial" pitchFamily="34" charset="0"/>
+              <a:buChar char="•"/>
+            </a:pPr>
+            <a:r>
+              <a:rPr lang="en-US" sz="1800" dirty="0" smtClean="0">
+                <a:solidFill>
+                  <a:schemeClr val="tx1">
+                    <a:lumMod val="85000"/>
+                    <a:lumOff val="15000"/>
+                  </a:schemeClr>
+                </a:solidFill>
+              </a:rPr>
+              <a:t>In the case of Rascal, the data being relayed to the ground would consist of the relative distance between it and its target resident space object over the course of each orbital maneuver.</a:t>
+            </a:r>
+          </a:p>
+          <a:p>
+            <a:pPr lvl="1">
+              <a:buFont typeface="Arial" pitchFamily="34" charset="0"/>
+              <a:buChar char="•"/>
+            </a:pPr>
+            <a:endParaRPr lang="en-US" sz="1800" dirty="0" smtClean="0">
+              <a:solidFill>
+                <a:schemeClr val="tx1">
+                  <a:lumMod val="85000"/>
+                  <a:lumOff val="15000"/>
+                </a:schemeClr>
+              </a:solidFill>
+            </a:endParaRPr>
+          </a:p>
+          <a:p>
+            <a:endParaRPr lang="en-US" dirty="0" smtClean="0">
+              <a:solidFill>
+                <a:schemeClr val="tx1">
+                  <a:lumMod val="85000"/>
+                  <a:lumOff val="15000"/>
+                </a:schemeClr>
+              </a:solidFill>
+            </a:endParaRPr>
+          </a:p>
+        </p:txBody>
+      </p:sp>
+      <p:sp>
+        <p:nvSpPr>
+          <p:cNvPr id="4" name="Slide Number Placeholder 3"/>
+          <p:cNvSpPr>
+            <a:spLocks noGrp="1"/>
+          </p:cNvSpPr>
+          <p:nvPr>
+            <p:ph type="sldNum" idx="12"/>
+          </p:nvPr>
+        </p:nvSpPr>
+        <p:spPr/>
+        <p:txBody>
+          <a:bodyPr/>
+          <a:lstStyle/>
+          <a:p>
+            <a:pPr>
+              <a:defRPr/>
+            </a:pPr>
+            <a:fld id="{8C6E2802-7AC4-44BB-B0A5-E12803E0614A}" type="slidenum">
+              <a:rPr lang="en-US" altLang="en-US" smtClean="0"/>
+              <a:pPr>
+                <a:defRPr/>
+              </a:pPr>
+              <a:t>13</a:t>
+            </a:fld>
+            <a:endParaRPr lang="en-US" altLang="en-US" dirty="0"/>
+          </a:p>
+        </p:txBody>
+      </p:sp>
+      <p:sp>
+        <p:nvSpPr>
+          <p:cNvPr id="40964" name="AutoShape 4" descr="data:image/jpeg;base64,/9j/4AAQSkZJRgABAQAAAQABAAD/2wCEAAkGBxQSEhUUExQWFRUXFxgZGBUWGBwbHBobHhwYFxsfIRwYHCggHhwmHRcYIjEkJykrLi4uHB8zODMsNygtLisBCgoKDg0OGhAQGywmICQ0LCwsLy8sLCwsLCwsLywsLSwsLCwsLCwsLCwsLCwsLC8sLCwxLDQsLSwsLCwsLDQsLP/AABEIAMoA+QMBIgACEQEDEQH/xAAbAAEAAgMBAQAAAAAAAAAAAAAABQYCAwQHAf/EAEEQAAIBAwMCBQIDBAcIAgMBAAECEQADIQQSMQVBBhMiUWEycUKBsRQjkaEzNFJic7LBJENyg8LR4fCCs2OT8RX/xAAZAQEAAwEBAAAAAAAAAAAAAAAAAQIEAwX/xAAwEQACAQMBBAkEAgMAAAAAAAAAAQIDESExBBJBYSIyUYGRscHh8DNxodETI0NSYv/aAAwDAQACEQMRAD8A9xpSlAKUpQClKUApSlAKwuXAoJJAAyScCozxD1pdLb3GNxB2j3iAfv8AUKpV25qtedwCrZOd5YhVjB7gmMyBgxBY1yqVYw1JSuTnWfGaowt2hkmDcYgKuJk+358cweDK9A60LmltXrrKpfd3iSCRiecCaqQt6XSLtRRfdztJuR+IDCKBOccDgqSSIqN6a15z/slvcqMq+pQYUksxljsEThcnviazR2l5lbHPBbdPVrdwMAQQQeCKzqi6TxHbFyLreTeG4kqCFIHIdW4gEc/cECrF03rJa2GvJ5UmJMbTkgGQTAODn3Amu1PaFLEsP5oQ4tExSvgNfa0FRSlKAUpSgFKUoBSlKAUpSgFKUoBSlKAUpXygPtKUoBSlKAUrn1etS0Jdgo+e/wCXJqlda8YPc9GkGWJUNgkkGTAVpI29x2PIPFJTUdSUrls6r1i3YWWMnJgcwIk/AEiqVrfEmp1bhNIGXcTnjaAYkmIE/PHYSawtdFKlrusuMu7cBaQ7mhjJBIBChtsYzx6prDU+IEtA27RVEgRbThMZ3NtyxJAIzkQfnJKvKbtD2LJWJfxBdVjY84hmtA71G0hmIRsk4UE22MQcA8AE1X9T1t7odFMkQAArFZOIC44zEiD7HiujpPhq9qQr3ybaCGXaVlgVBBABO0zmWk54AFXfp/TrdgEWxEmWY5ZickknJOayVNojF9LpP8FkisdN8HFmR9SwbaBCLOTydxPOYwIq2abTrbUKihVHAAgVtpWCpVlPVljg6l0e1fyygPBAuADcv2J/Q4qpdQ6Ve0iIYGptrcLFWHpWSSCV/DAP1Dj86vlKtTryhjgLIqnTevkXLh3qttVGzT7SWYDLFSD9XaPjjvVm6T1db6g7WRiAdlwbWg8c1EdV8M27u5k/duwIlQNpJ7sIyR8EVW763dO+nGqtm8ELhbm8jkLkEMBmMBhIPBAr09n2pWsvB66cDm4nplKqGg8SeVbZ7twXUV9sKrm4oYwsiJbnmIxMmrRpdWlwSjTHIyCPuDkV6EakZaFWjfSlKuQKUpQClKUApSlAKUpQClKUAr5X2vlQwfaV8qF6z4ltWAZYFuABxPPI9vijaWoJm5cCiSQB7nFVTrnjNLYZbILsPxDgerb3GfYe5981X7uq1fUc2zttg7TPpC9ySc5PBCk4ETk1kLWn0h32wLlwc3SvoBJA9CyMwTET9/fLU2lX3Y6/PAuo9phasX9Wxe7eFu2B9NyCYmWHlzMcwW/IRitx1VnTY06BDEb22+a05OWyBwcxAJxMA8apc1F64LKEvks4OCxgDPCqMnMknMTEWDoPg9LQVrxFy4CTHKCfgiWPyax1ZqP1H3FkV7SaDUa0kqdijaPMLMQ2Cpzy5EDHyZJJmrh0nw3ZsqAUW44Eb2UE8RA9h8VMIgAgAAewxX2sVXaJSxHCJsAIpSlZyRSlKAUpSgFYXrKuCrAMDyCJB/I1nSgKt1bwuwLPpXFtj+HIz3hlysjtx7RUfY6y1u6RfF0XdkbwxUAKcErO1iCckAyDweKvNc+u0SXVKuoIzB7j5B7H5rXT2prEvHiRY5On9cIt2zqPLlzt3Wm3qWzHCjtn4+KnbdwMJBBHuKoN7w9f0rBtJBUcgkltvLAjh/g8jivnSvEIBvEFvOJHogeWWiAJIG3ODuOPevUpbVfmu39r3KOJ6DSozTdXWUS9Fq6wkIWBB+zd6k61xkpK6KClKVYClKUApSlAKUpQCvlfa+VDBSfFfXbgvNYRxbIClTJG4tiJBHvOcYyDUfpujWrThrn726FAXTrJSAAsFmB3gEycQJ4rk8aT+3nE+m3JjjNOn9WOnZoOMkzkRPc8gS386w7SpO9jojd1Hq7m55CIyqAV8q2pKqMR6Fjd3HYCQZ5FdHSPB7vD6phO9mKAeppjlwcCR9IH5136fq9q4Wa0pW+SqttVfUcHliAwj5n2zU5a1sELcXYx9srPA9Xae0gVhnUnBWireZZG/S6RLYOxFWedoifv71upSsLd3dkilKVAFKUoBSlKAUpSgFKE18BpYH2lKUAqK6z0K3qFcRsdgR5iYaeATH1fnUrSrRk4u6BRH6bd0l1Cba37YTy97LPpiSAIZrYJnuV95muzoHX2S3JutqGa6V8ogKwLE7QpLxtUQDEzEwJq31X+reGUdWNn9287oGFJGe30z7jP3rbR2vKvh9v79irRYdJr0clQYccofqHHbuMjIxXXXmzF7F0i/aALoANQcsGAMQ/4iB2kGPsanuieIW22gxbU7hDXLVsjYwE+peykcEmfv29SntCa6Xjw9u8o42LXStWn1Cuu5Tj7QQe4IPBrbWm5UUpSgFKUoBXyvtKhg8s8a/1857Wse+f9OagergeYuYzj59dvFT3jYj9vOMxag+2c/wAqgupkLcA+TBOYO5IwfmKzSXTLomLmm/snb7gcEfkcfcV1aXqjqWDIhLJtNxxub+7BOHE52kj8q577ELg5xmPy4qH0/WVdypkjiCP+3fk/MQM85Ywck3qieRe+m9U2ra2M99nlWAT0qwmWMSbYmR3GMRU9p9arQD6Hz6GjdjmM5HyK84tOZBtORtIMAwR9j3Bzzg9qkLfVmCXlRVW4zb/MeT6jAY7VII9IMFT3+9Z57OpaE3PQKVAaDrP7xLYJvBrPmBlUwIAxu4YnsCd3vM1NafUK67lOPkEEH2IOQfisU6bjqWNtKUqgFKVydTF0pFnaHkZbsO8Yifv/ADqUruwM9XrUtj1MAYJC/iaPZeSftUVrNXqLgi2hSBuIxvjsvMBjk7QeB9Smt9voikE3WNy4wILNwJ4gcQK5ReuWztXaLuwKQ+AxUYZCYDYmVkZ/jXemo8Msg0aG3Z2st9juU53vuEn1Qvsf7sbvivuitl2Js2otRzcld3MbSF3Lx889jWoX7ZV11L3t7YINpwMCMQpRxk5iKaDqF4ubdos6gBQWXOcbsncsdw2D+GK7NPLX5vbuIJLp3UAsBywUqzA3TlCGCMjMcSCwj3HvEnOz1R7rgWrZ2BoNx8CAYMDv3/7VlpOl4/ecAkhQZyTJJaJJJzGB8VJogAAAgAQAOwrPKUL4RJ9pSlcSRSlKA13rCuIZQw9iJqr9Q8LuhD6W4ybc+WDEj+yG9vg4nvVspXSFWUNAUPT9bZPMVkazeJk3WLCWgDcyQfRiMSPgVbrHiBN6oxVtylhct5SBgy2QuZ7n7196p0m1qF23k3DjkgwecjNVjVdM1OjZrli6DZiSCssWkASigbjHdYPGMV6NDauCxyencUa7S/W3DAEEEHgjINZVR+kdesrFpL3l3oDMjlnSST6dzcT8EH78VO9P6wdZb3acgAOUdzypAVjtBHqkMIJx8HivRpVlPg0UasS2o1KpG5gJwJOSfYDufgVwdI6t+0Nc2rtFt9jBj6t21XyB9OGGDnmQIrrs6JVbdlm43MZP5DgfkBXJ0fR27dzUlEC7r25oESTbtEk/Mk12IJSvlfa+VDB5d41J/byO0Wp/jj+dQeuBNwSdv1SOZh0MY94/KpvxtH7eZmYtR/HM/lUF1Zv3qcjOI999v/SazS65dEzqj6fzH61SNCPXd+4/6qu+r+k/cfqKpGgP7y79x/1Vnj9Gfd5o7UPqL5wZKW9U6jBx/wCd3P8AxZ/jUla6irAB+/sDuxn8Pz9gf4iolBJA+a+H8x9sfpXGM8ZNVShGTxhlm0uruoUa252iQyrHBgQRxj3WPipPpfUES2FU+UVuH97dus3pP1Hc+7PEK2PkRVY6SbhDEEEgkfMQCB8xwPaT3Nddx0eQ2GIgnt2gEH/0fE1eUEzC+i7Pgei2eo+raSHAAO9BIEgn1AfSCBIPHPGJ7rN1WAZSCDwQZH8q8+0/Urtr07yEZSvp7HgENyhzjtUz0XqPmBBYDITO/wA5skrj6Yg7u5BU+9Y6mz2yiUy10qO0nWLbts3LuB24YFSw5UEfiHsYP3qRrNKLi7MkVi9sHBAPfNZUqoMfKHsKW7YUQAAPYYrKlTcCqp4l8XHTam1p0W07NsLrcvLbch3CKLat/SPhjEjt71a6qviXwm2pveYlxbYdbaXt1vezIlzzF2NuGxssJg9vaulHc3unoQzf1fxK1izrrgthv2SIG6N820uZxj6478VO6K9vto8RuVWj2kA/61UvEfg/Uai5fFvV+Vp9Tt86z5KsxhQh2uTKyqgVb9PaCKqjhQAPsBAqaihurd19l63CubK13L6qVDMAWMKCYk+w9zWyawuWlaJAMGRI4PuPmuStfJJnXx3ABJMAZJPaoHqnWl0rOWcvuMhDAW3C8SM5gmIJzxFV/Va/Va241q0CFUmSIAVo4ciRGf7xmCIrvDZ5Szw7SLk71jxbatEqpDsCAc4kiRn292OB7ziq+x1OpBe+x09mFLXWIQQNxESATlvge8muXUajS6T03P8Aa9Qvb/do3ME8sc99x+1QfVOo3tS037hYA4QelR+Q/UyfmK20qKXVXe9e5DU6+o/s6C4ulV3ITbc1JZisZgBPpjP1AD7mK9K8D6VU0iOJm9+9ef7TBQYAGBCjFeWII0uojH9GPyk/+a9b8I/1LT/4S/pW7Z8XRznFXvxJeuPQ/Xf/AMUf/VarsmuPQ/Xf/wAQf/VarSVOyvlfaVDB5b41J/bjicWs+3q/14qC6pIcBRzMkdgXQT/E1avFPSbt7XMLaXMom1gPRIzLMcQPiTNVvqugueeLch7i7mOwMQdrIzACJP8A3rNO6lvF0TFrSPdJRBO1QT78wP4waq/UelPaYtbUspXc9vAdCPqx+Je4I9+0VYtL1l7V9Ra2Mr4ae8DcMj/j/lVls6jT6wsAGW4hgN9LCO4KnjMc+9Zo1JU9VdPUnKd1qeXae8rcH7j2rOrZ1/wmIZyIaSwu2l9X2dZAI7yucd5qp6yy9iDch0Jhb1vKE+2YIYe3NP4FUX9Lvyevd2+fI109qX+THPh7Ez4f4f8A4h+grDxZdKWNwidyjIBwcEZ7EYrLw4wKuRkbh+grT4y/q/8A80/Wr7PH++EX2x9DJXfWa5mvRdSK/V3BJ5jsfy7/AH/WTQh4KtBmdskqW5Bxnt+fcVXhWSXCOO38P/H5Vy3+k7mqezKycS5WeuOqMjnaCcEAF4GWjdIae3fNTnTuqMbpt2LbNaFsOHYgIOAUH4ge+RHIwIqh6bqU+lszA9RgzHY98x89+1SWjumRcRjgERORI45gg/P8apOnFxM7upWZ6NpdYtwCDmJ2nkdv/YrorzvR9S9FlT5dlbV4FtlvOwnjkFCSZJE8GrXoepNuuAJcuW0Ii5Alt3q9PZwsxIgyIg81jqUHHQJkzStdi+rruUhge4/n+dbKzkilK06mxvAG5lhlb0mJggwfgxmpQN1YX7yopZjCgSSewrmu6l0a4XVRaVQVbdkn8QIOB8Zqqde8XI6G2EYbwwbcRK8YO0mJ7xJA7GutOjKbXYGy0P1iwAzeYvpmYOcCf9R/GvPhrrvmbLZa4z7jC7iCjZiGOeMnC5IBjNbR0V2t+dqriWLBacghsTACn3zG4yOwzWnWde2qyaFRpxtk3LmXcjhRG6JHH6Ct9KnGF1DN+3RfORU7tP0dVH+1E3bzRcOmtAG40KEAYgwFiBiAMCaius+ILt4eXHkIuPKQxMGIYjmIiBj71E6bqV5HZ9+244Kt5ZMlTtJJZvUT6Rkn4GMVp1CuuXEDmIM/cTXf+K0rt3+cESuZkiR8n3rKtdpuBzj6vf8A81sroWO1MaW+f7RUfwBNeq+FHA0Wmk820A+8V5Sv9Tvf4uP/ANan/U16X0H+q6DH9nt/+K5XShqzlMkBbvDUuxBNrYNsNwcYCzEzJkjiM9qj9D028pUXA7ib8sbv4TculBhgZKunYxt5ECevUWNQCdrMR5vp+mNhVPqyCAG38Sa+3rOoNpgpi4zMwM/Ss+hQSDmAu6fdoPFaCh26Qi1aQOwBhRJb8R7Sxk5+a65qvdVD+Q4uA5ayFmGlg4kiJgH5j7CrDFAceg+q9/if9KVXeu+HnF03rGZO6AYZWyCyzggg5B+eZgdt7qz2L5U6e49u5dI823kW4RSS45C85E8dqsCOGEggg9wZqs4KSsweQ6/e113gtfVgpJ9EQPVIg5IODx8d6jL5K2WUkBtu4qpn6oK5HebbYr2Hq3RLOoB3rDERvXDAdsiqT1joV+wQfSyCT5qj6WyAWQ/B5ms8qTjpoXUu009H8VOrLauAG2qS1wk78Ec8zAZT8ipl9DY1Qa5Ydd30kgAg9yGVhBFUs2QCXXcxY7SZEbQFQieS5KDt8Vlo7l7TlUDm2S8MoPbn/qg1mdJPKwWZ3P059K7g2gttmZgycL8c8AR/7xEeLHD6aVMjeuR96uPSfFdu+SlwAKAAXYiCchpHY7lYVh1LwrbuLvsFdrQSoMo45wRjPvU06u7VjOpqmn9yko3i0igIcVsB9J+4+1dOv6DctM3lTAJPkv8AXHJ2H8cZ4zwYzUfZ1AMjIPdTg/wqs6LV5xzHPdftXDyPQpV4zSjo/mhjrnK23YchGI+4BNWf9jgBkmcHbMdoMYx2/hH2qvU/6G7/AMD/AOU1drX0j7D9K5wk1HBz2vrI4G1Ck7bghhEEZZSeDjOeeIzB+dysTuVj5lq4m1l5Vh33KPzyPtFVzq39cb/hH+VBXXpuoMnv8nn4Eg8x8H/uO84qNs6q/wA8DPCnKUW1wZdundZ8w2CTb04jYRJLEjhVIO2I7MCasOj6luDFx6VMeYFIU5jg5WO5OO8153buI+RCtMzyN3E4waktH1O4jbLjMUJUqskDHKhh7/2TzNZalGLIvqehTUF1rxPasiFO54aB2x+ueMic5EEji6lrbH7KwVjbGB5YME5EgATyJyMDNVpbml0yBr5/abt0K4sr9Ken0h885jPA4GM8qWzp5lf7E3Oy9+064l/SlhlYG4zehVIgzxMDBAAB7nmudOo2NKUt6MftN4zF1+EmFhBAEnt9sk1D9V6vf1WLrBbciLKYUR9P/v6V1eG9Gu5r7fRZBcgclgCV/hH8hWxx3Y9LTsQscnWzc88m+267CiZnBAMCMAZ4HzXGs8k7FmN32yTjMfasuo9UBZrjy1xzMRgLEfmeOePY8iJe9cvHLYiOYAA7fb4rrHCV9TpCm5fY6bvVFtibfY7t/cCMxnBJJMzInmuu5g24/EjEj7FAP1NV7XLCuAQcHI71YbvNn/Cf/MlWTuiakFBqxpuW4yBKkyR7fIrYj+8Z4I7is6wtaRiTsUkRJUSSI7ihTQ69SP8AZQY/3r/ySP8ASvXPCH9S0/8AhJ+leVdV6t5mnt2ggVbakkj8TQc/HNeq+EP6lp/8JP0rps983OcyYri0P13/APFH/wBVqu2oTovUd97VIy7GW9AEglgLVn1Y4BxWk5k3FKUoD5Fcd3QerfbY22PI5RjEAsuJPyCDgZjFdtKA4LWvKwt8BGJ2g/gYxMg9vs0H713GvlxAwIIBB5BqPuWbttt1uGtBf6HvuEAbWJhcdjj7STQHD1nwrbvkspa25MypwT8gjvwYjmqN1HpNywXV7QQR6bmCmfr2ngHH4hPsBzXqWk1a3BIkHupwynuCPvWWosK6lXUMp5UiQfyrnOkpEp2PGfIVAPK3N5ig8YBY7bY92Yh2JIEYHFdfTOt3NP5dpP8AdWgHtRy4TI/iAMH86tfXPCDbg+naEXJs/HcKYxGIHbtFVTT6S1bU7bQQrcXcSpB2rkgKIyxHJ+Z71mlBrEkXuWzR9Ts6xXV127Tt9RGcxIPvxj5HNRXiHwoLijDXAv4ww84L7BmlWAjgifkVVtVa2ILZdXf0lwJ/Eu6OIn0qcVO9K8Q3LWo2XG/2faSBGVAKgEEdsk/aK4pSg96mw0nhlT6z0u7bS6oBu29pXeohgSCAGU5H3iD2Jq3W+B9h+lWC5ptPrrRe3BJBAYSCpjv3qt63S3tKT5k3LfZxkiT3+I/94qJTU8WSfHhf08g2+LuVjq39cb/hH+VK+V86vdH7Tu/C6gK3b6V/1BFJq21xaVN/8+rNmxNbslz9EbJKmQfy/wBDUp0zWSApx24xJ4//AJ/5qKuNOZBwMisUPqt/41v/AC3f+1c49Zx4CtBOnvcST1F1mRySfRsiP73pP8iajw013N/R3v8AlfqKjNNO3Puf1NaE9UZIpXubSamurKNPYt6cCTe9d3OT9Ij3AjH5Vz+HdKLl9d30pLt7enifzj+FcvUNWb153JkFoU/AJH8P+1UfSmo8Fl+n7LMrurM3Gj3gflit7IzL6sACdi+3v3j86xu3trPH1bj6vYZBrVaR3wJOePv+pq3Fo2LqpmGocunlgCOw+cxJ/Op6+hBsyP8AdP8AzZI/1rZoekJb2NeDMSQfKSd5TMtj6BMD+0e2M1t1guM43qQY2qqqQAq8KqjsPialGapNSeDlq0+DmuMly3bWd5hnAyoj+1wP1z8V96X4YVFF7WN5dsAk2yYbERPf/wCIzx9q5upeJ2bZb0i/s9kTKqAGYyIjbwInHPGe1cZS3+jHx4e5TU5PFPlg+XatLbCegwSWJjMicgSMxJnntV78DdWB0iJcG1rbCyFGSxCo3Ak/jz7ROBVR6H4Ov6gByfKWQQXBlveB7fJ79q9J6T0+3ZDrbUKN8+5JKpJJOST7/ArdRhuxOM27hfNu7gwNlCIEEG58+6qP4nPaurSaVLa7UUKPYfqT3PzW6ldiBSlKAUpSgFKUoDn1WjW5BMhh9LKYYfYj9ODXO+puWi3mLut8i4gkj4KCWP3UH7CpClAYWbquAykEHgio7rXQbOqUrdWT/aGGGZ5rovaAfVbPltJJ2jDE5O5eDPvz81t1GoFtdzmBiT8kgfqahq4TtlFE6r4dvWWZlzb2t+8SN6g4yDmQD9Q9u1VQ6dSiG2rkw6By0ACNqjaRJE8s0DHtXr//APp24uGTFvDEqfcjGM5BGKrvW9JpL0bWNu4SrDarQ8njYMNPB71xlR/1LKR5/pnuW3thbkBDtJRgRvVpPBjAeDVw0XilW8wXwqokAuJOcCNoBnPtUXrul3LW8OirbIBVwJBXBMEibZgAHHfvFQl7T3I8tFZ/Mgl8fVLMABORAB3fb7VmnBPEkWuXHWeHbN5C9kI6uD6TBUzwQeVYe4P3qmdT8O3LTqthTJmbLkSIj6XMK09hhs8GJrv0HV7lu9bCO2wBmKKfS0CDjjlD/wCmrToutafVqfORUH4d5EEfB5B+Kqp1KatrHsfz8rI0d1hnmlu+CdplWGCrYIPtWxfqt/41v/Leq89c8LBwzR5sgw0nzVPIIefUPgz+VU+90t7LWpfeDeSAVIZQFuTvBmDLRMn+dTGNKXSg7cn6P9/k6yrylHdku86W/o73/K/zCo2y8g/BIqSb+jvf8r9RWnoWi8y8qQCN25542iC0/cY/OrNpbzfzBziSjt5GigDbd1B+/o4H2EZj5NQYHH5V3de1fnahmH0L6FE4xyft8feuGq0lZXeryXNQ6KT+8chLbOQGP3gkKssw+QI9yK7f2tbcjTpsHHmvBuD32n8IPxn+9U54V6f5gJa35g94GApMgFgRJJ+4g5Far/UNMmoBTSBgwcIhcn1KVAJQAgTJxnjFS53bSVyHJvU1dK0tyzYfU5CkhQTEurGWABwRgffPzW/qPiZne26kbrZBRQIWCpye5MmNsgRPxTTefr9Utm+biITO0CFRQD+A8TkSwnIwJxcdL4G063TcJLr+G0fpH37sPg1eFBy6UtSjaKPY6fq9e5cKXz9bHaig9hOIEcLJq/8AQfB9jTEOR5l0fjbgH+6vA+/NT1iwqKFRVVRgKoAAHwBgVyPq3uEraXEZut9IPsF5Y/wHz2rTCmolXJs6NbrEsqWdoA/Mn4AGSfYDJrm6LrfOVrnlvbBYbRcADEbEIO0Ekc8GDjit2m0IWCxNx+d7ZM/A4UfAiuuK6FRSlKAUpSgFKUoBSlKAUpSgFRvUdUm2953otIAWef8A5HEdoH3qSqM6p0ZNQl1LhbbcH4CVI9O3kGgOPzbDM48y6zMyDhjw7lYO36QxbPGI7Vhr7OmVgLjXAyQUweSQfTC+ozEjNdFvoG0jbfugBlO30kEKWbaSVkrLseZ+az6l0Jb8+ZcciICwpUZBOCsNMCQ0jFAddqHDWyspsX6s7lYMCCCPj+dQHV/CS7ZsDg/0bHB+xP0kdv8ASp5l8oFgCwCou1RkBd0kAc4PAHbFdFjUK4lTMcjgg8wQcgwRzVZQUlZg8kv6NrYdGtrYbccEAGJOVIxDFjPyTya5H0+BbQFyCp3BSDgbmwRMDcM/Br2DX9OtXl23EVsEAkZE+x5B+1U7rPhS5bLOjtcQiCgEOBIPIPrHuIHAwa4SpNZRZSILpPiq6lxkuR5dtLcqFzJmQD7ZH8Ksto6fXIHEqxkc7WkYOO/5e9U79k80YAtlid+5fUGLEgH1fu1WeIP5VosrFxEX1KjM3mqCAZLLInjIEH5EVmcE8rUu1bBiwi3e/wCV+orf0rX27OnvCGN66ds/hVNoH+rfyrQw/d3f+UJ/MfzrV03VC1cRyAdrKRPbnMHBjmryhe9+XkEa9NonLC2qMXP4YM5zMe2ZmrLp+gWdMu/XPBP0WkaSYOZ289uMD3rh1viK557XkJVyhtz+ELOIHBPeT/a+M7ejeHNTrG3uWVcTduhiSMkbQYLD8wBPNRuTm7aefiTfGTDqHie46+Tp18izhUS2IePaV9/Yfxqf8F+F7lm8L98BYTaikgkltpmOxG2PfJqzeH/DdnSqAoD3MzdYDcZ9vYdoFdHVVBfTzGLx5HB8q6B+cxHzWmlRUCkpX0Pmo01zzVZSdq7cSMyx3z7wsRXHe0epDbkd9pdnKMVJEFAqA/2CN7fwFcdu/qCDH7QQZ2g21VgRhpnBwCy8fVHauh79/wAu1/TbmZwPQMDdKG57ekRHu3xXcoSPR7T27e267MxYkG4VLGRMenGDIx7VI1WLPmNb0xvBvMGoT6hkelt2BwJ3Z9qs9AKUpQClKUApSlAKUpQClKUApSlAKUpQClKUArmv6JWYP9LgQHXmPb5Hwa6aUBHrqntj98BA/wB4v0x7sD9PzyK7lYESDIPBFfSK4m6ftYNaOyMFI9DD22ggA/3h880Bq6r0S3fywIcCA4Ofz7H86o3VegXrIbzfXbNxGm3uAO3I3hTIBJM5ir/Z13a6PLaQBJ9LE/2W78HHPxXWygiCAQe1c50oy+5Kk0eNdR0YCGPqJEAD2K9+OAcfFSngzwmmrU3rrHywWQIIkkYaTGB2EZ+RVw6v4Z0927bLhhuMbUIVTCtyIkYkYip3T6dLS7UVUUdgABUQptdZ3G8yB6X4L09lt5BuEGV3nA9scGPczVgv3lRSzGFAkk1xjqG8xZXeMTcmLcTBhhO4iDgd+SK2afQwSzsbjEg+oYWMjavAj8z810SsQavOuXQvlg20OS7r6iPYIeCfdv4e3TpNItudsyxliSSSfkmuilSBSlKAUpSgFKUoBSlKAUpSgFKUoBSlKAUpSgFKUoBSlKAUpSgFKUoDXfsq6lWAKkQQa4/IuWiPLO+3ABRzkROVY5J+GPYQRUhSgKprfFCXGK6ZGv6ixcKtpvSjBjbciS5C7f7wJHPNTGk0ty6k6mAWCk2kJ2qeSCwMvkwZ9JA45nPV2VF6y20btzeqBP0N3qQoD4qgCBgV9pSgFKUoBSlKAUpSgFKUoBSlKAUpSgP/2Q=="/>
+          <p:cNvSpPr>
+            <a:spLocks noChangeAspect="1" noChangeArrowheads="1"/>
+          </p:cNvSpPr>
+          <p:nvPr/>
+        </p:nvSpPr>
+        <p:spPr bwMode="auto">
+          <a:xfrm>
+            <a:off x="155575" y="-144463"/>
+            <a:ext cx="304800" cy="304801"/>
+          </a:xfrm>
+          <a:prstGeom prst="rect">
+            <a:avLst/>
+          </a:prstGeom>
+          <a:noFill/>
+        </p:spPr>
+        <p:txBody>
+          <a:bodyPr vert="horz" wrap="square" lIns="91440" tIns="45720" rIns="91440" bIns="45720" numCol="1" anchor="t" anchorCtr="0" compatLnSpc="1">
+            <a:prstTxWarp prst="textNoShape">
+              <a:avLst/>
+            </a:prstTxWarp>
+          </a:bodyPr>
+          <a:lstStyle/>
+          <a:p>
+            <a:endParaRPr lang="en-US"/>
+          </a:p>
+        </p:txBody>
+      </p:sp>
+    </p:spTree>
+  </p:cSld>
+  <p:clrMapOvr>
+    <a:masterClrMapping/>
+  </p:clrMapOvr>
+  <p:timing>
+    <p:tnLst>
+      <p:par>
+        <p:cTn id="1" dur="indefinite" restart="never" nodeType="tmRoot"/>
+      </p:par>
+    </p:tnLst>
+  </p:timing>
+</p:sld>
+</file>
+
+<file path=ppt/slides/slide14.xml><?xml version="1.0" encoding="utf-8"?>
+<p:sld xmlns:a="http://schemas.openxmlformats.org/drawingml/2006/main" xmlns:r="http://schemas.openxmlformats.org/officeDocument/2006/relationships" xmlns:p="http://schemas.openxmlformats.org/presentationml/2006/main">
+  <p:cSld>
+    <p:spTree>
+      <p:nvGrpSpPr>
+        <p:cNvPr id="1" name=""/>
+        <p:cNvGrpSpPr/>
+        <p:nvPr/>
+      </p:nvGrpSpPr>
+      <p:grpSpPr>
+        <a:xfrm>
+          <a:off x="0" y="0"/>
+          <a:ext cx="0" cy="0"/>
+          <a:chOff x="0" y="0"/>
+          <a:chExt cx="0" cy="0"/>
+        </a:xfrm>
+      </p:grpSpPr>
+      <p:sp>
+        <p:nvSpPr>
+          <p:cNvPr id="2" name="Subtitle 1"/>
+          <p:cNvSpPr>
+            <a:spLocks noGrp="1"/>
+          </p:cNvSpPr>
+          <p:nvPr>
+            <p:ph type="subTitle" idx="1"/>
+          </p:nvPr>
+        </p:nvSpPr>
+        <p:spPr>
+          <a:xfrm>
+            <a:off x="1456531" y="971338"/>
+            <a:ext cx="7053104" cy="6591512"/>
+          </a:xfrm>
+        </p:spPr>
+        <p:txBody>
+          <a:bodyPr/>
+          <a:lstStyle/>
+          <a:p>
+            <a:r>
+              <a:rPr lang="en-US" sz="3200" dirty="0" smtClean="0">
+                <a:solidFill>
+                  <a:schemeClr val="bg1">
+                    <a:lumMod val="65000"/>
+                  </a:schemeClr>
+                </a:solidFill>
+              </a:rPr>
+              <a:t>Group Organization</a:t>
+            </a:r>
+            <a:endParaRPr lang="en-US" sz="3200" dirty="0" smtClean="0">
+              <a:solidFill>
+                <a:schemeClr val="bg1">
+                  <a:lumMod val="65000"/>
+                </a:schemeClr>
+              </a:solidFill>
+            </a:endParaRPr>
+          </a:p>
+          <a:p>
+            <a:r>
+              <a:rPr lang="en-US" sz="3200" dirty="0" smtClean="0">
+                <a:solidFill>
+                  <a:schemeClr val="bg1">
+                    <a:lumMod val="65000"/>
+                  </a:schemeClr>
+                </a:solidFill>
+              </a:rPr>
+              <a:t>Project Overview</a:t>
+            </a:r>
+          </a:p>
+          <a:p>
+            <a:r>
+              <a:rPr lang="en-US" sz="3200" dirty="0" smtClean="0">
+                <a:solidFill>
+                  <a:schemeClr val="bg1">
+                    <a:lumMod val="65000"/>
+                  </a:schemeClr>
+                </a:solidFill>
+              </a:rPr>
+              <a:t>Design Constraints</a:t>
+            </a:r>
+            <a:endParaRPr lang="en-US" sz="3200" dirty="0" smtClean="0">
+              <a:solidFill>
+                <a:schemeClr val="bg1">
+                  <a:lumMod val="65000"/>
+                </a:schemeClr>
+              </a:solidFill>
+            </a:endParaRPr>
+          </a:p>
+          <a:p>
+            <a:r>
+              <a:rPr lang="en-US" sz="3200" dirty="0" smtClean="0">
+                <a:solidFill>
+                  <a:schemeClr val="tx1">
+                    <a:lumMod val="85000"/>
+                    <a:lumOff val="15000"/>
+                  </a:schemeClr>
+                </a:solidFill>
+              </a:rPr>
+              <a:t>Mission Architecture</a:t>
+            </a:r>
+          </a:p>
+          <a:p>
+            <a:r>
+              <a:rPr lang="en-US" sz="3200" dirty="0" smtClean="0">
+                <a:solidFill>
+                  <a:schemeClr val="bg1">
+                    <a:lumMod val="65000"/>
+                  </a:schemeClr>
+                </a:solidFill>
+              </a:rPr>
+              <a:t>CONOPS</a:t>
+            </a:r>
+          </a:p>
+          <a:p>
+            <a:r>
+              <a:rPr lang="en-US" sz="3200" dirty="0" smtClean="0">
+                <a:solidFill>
+                  <a:schemeClr val="bg1">
+                    <a:lumMod val="65000"/>
+                  </a:schemeClr>
+                </a:solidFill>
+              </a:rPr>
+              <a:t>Risk Assessment</a:t>
+            </a:r>
+          </a:p>
+          <a:p>
+            <a:r>
+              <a:rPr lang="en-US" sz="3200" dirty="0" smtClean="0">
+                <a:solidFill>
+                  <a:schemeClr val="bg1">
+                    <a:lumMod val="65000"/>
+                  </a:schemeClr>
+                </a:solidFill>
+              </a:rPr>
+              <a:t>Schedule</a:t>
+            </a:r>
+          </a:p>
+          <a:p>
+            <a:r>
+              <a:rPr lang="en-US" sz="3200" dirty="0" smtClean="0">
+                <a:solidFill>
+                  <a:schemeClr val="bg1">
+                    <a:lumMod val="65000"/>
+                  </a:schemeClr>
+                </a:solidFill>
+              </a:rPr>
+              <a:t>Conclusion</a:t>
+            </a:r>
+            <a:endParaRPr lang="en-US" sz="3200" dirty="0">
+              <a:solidFill>
+                <a:schemeClr val="bg1">
+                  <a:lumMod val="65000"/>
+                </a:schemeClr>
+              </a:solidFill>
+            </a:endParaRPr>
+          </a:p>
+          <a:p>
+            <a:endParaRPr lang="en-US" sz="4000" dirty="0">
+              <a:solidFill>
+                <a:schemeClr val="bg1">
+                  <a:lumMod val="65000"/>
+                </a:schemeClr>
+              </a:solidFill>
+            </a:endParaRPr>
+          </a:p>
+          <a:p>
+            <a:endParaRPr lang="en-US" dirty="0" smtClean="0">
+              <a:solidFill>
+                <a:schemeClr val="bg1">
+                  <a:lumMod val="65000"/>
+                </a:schemeClr>
+              </a:solidFill>
+            </a:endParaRPr>
+          </a:p>
+        </p:txBody>
+      </p:sp>
+    </p:spTree>
+    <p:extLst>
+      <p:ext uri="{BB962C8B-B14F-4D97-AF65-F5344CB8AC3E}">
+        <p14:creationId xmlns:p14="http://schemas.microsoft.com/office/powerpoint/2010/main" xmlns="" val="1899034955"/>
+      </p:ext>
+    </p:extLst>
+  </p:cSld>
+  <p:clrMapOvr>
+    <a:masterClrMapping/>
+  </p:clrMapOvr>
+  <mc:AlternateContent xmlns:mc="http://schemas.openxmlformats.org/markup-compatibility/2006">
+    <mc:Choice xmlns:p14="http://schemas.microsoft.com/office/powerpoint/2010/main" xmlns="" Requires="p14">
+      <p:transition spd="slow" p14:dur="2000" advTm="1111"/>
+    </mc:Choice>
+    <mc:Fallback>
+      <p:transition spd="slow" advTm="1111"/>
+    </mc:Fallback>
+  </mc:AlternateContent>
+  <p:timing>
+    <p:tnLst>
+      <p:par>
+        <p:cTn id="1" dur="indefinite" restart="never" nodeType="tmRoot"/>
+      </p:par>
+    </p:tnLst>
+  </p:timing>
+</p:sld>
+</file>
+
+<file path=ppt/slides/slide15.xml><?xml version="1.0" encoding="utf-8"?>
+<p:sld xmlns:a="http://schemas.openxmlformats.org/drawingml/2006/main" xmlns:r="http://schemas.openxmlformats.org/officeDocument/2006/relationships" xmlns:p="http://schemas.openxmlformats.org/presentationml/2006/main">
+  <p:cSld>
+    <p:spTree>
+      <p:nvGrpSpPr>
+        <p:cNvPr id="1" name=""/>
+        <p:cNvGrpSpPr/>
+        <p:nvPr/>
+      </p:nvGrpSpPr>
+      <p:grpSpPr>
+        <a:xfrm>
+          <a:off x="0" y="0"/>
+          <a:ext cx="0" cy="0"/>
+          <a:chOff x="0" y="0"/>
+          <a:chExt cx="0" cy="0"/>
+        </a:xfrm>
+      </p:grpSpPr>
+      <p:sp>
+        <p:nvSpPr>
+          <p:cNvPr id="2" name="Title 1"/>
+          <p:cNvSpPr>
+            <a:spLocks noGrp="1"/>
+          </p:cNvSpPr>
+          <p:nvPr>
+            <p:ph type="title"/>
+          </p:nvPr>
+        </p:nvSpPr>
+        <p:spPr/>
+        <p:txBody>
+          <a:bodyPr/>
+          <a:lstStyle/>
+          <a:p>
+            <a:r>
+              <a:rPr lang="en-US" b="1" dirty="0" smtClean="0">
+                <a:solidFill>
+                  <a:schemeClr val="tx1">
+                    <a:lumMod val="85000"/>
+                    <a:lumOff val="15000"/>
+                  </a:schemeClr>
+                </a:solidFill>
+              </a:rPr>
+              <a:t>Relating Design Constraints to Mission Design</a:t>
+            </a:r>
+            <a:endParaRPr lang="en-US" b="1" dirty="0">
+              <a:solidFill>
+                <a:schemeClr val="tx1">
+                  <a:lumMod val="85000"/>
+                  <a:lumOff val="15000"/>
+                </a:schemeClr>
+              </a:solidFill>
+            </a:endParaRPr>
+          </a:p>
+        </p:txBody>
+      </p:sp>
+      <p:sp>
+        <p:nvSpPr>
+          <p:cNvPr id="3" name="Content Placeholder 2"/>
+          <p:cNvSpPr>
+            <a:spLocks noGrp="1"/>
+          </p:cNvSpPr>
+          <p:nvPr>
+            <p:ph idx="1"/>
+          </p:nvPr>
+        </p:nvSpPr>
+        <p:spPr>
+          <a:xfrm>
+            <a:off x="618331" y="1419225"/>
+            <a:ext cx="9210675" cy="3124200"/>
+          </a:xfrm>
+        </p:spPr>
+        <p:txBody>
+          <a:bodyPr/>
+          <a:lstStyle/>
+          <a:p>
+            <a:pPr>
+              <a:buFont typeface="Arial" pitchFamily="34" charset="0"/>
+              <a:buChar char="•"/>
+            </a:pPr>
+            <a:r>
+              <a:rPr lang="en-US" sz="2000" dirty="0" smtClean="0">
+                <a:solidFill>
+                  <a:schemeClr val="tx1">
+                    <a:lumMod val="85000"/>
+                    <a:lumOff val="15000"/>
+                  </a:schemeClr>
+                </a:solidFill>
+              </a:rPr>
+              <a:t>Each of the design constraints listed in the previous section relate directly to design decisions made to </a:t>
+            </a:r>
+            <a:endParaRPr lang="en-US" sz="1800" dirty="0" smtClean="0">
+              <a:solidFill>
+                <a:schemeClr val="tx1">
+                  <a:lumMod val="85000"/>
+                  <a:lumOff val="15000"/>
+                </a:schemeClr>
+              </a:solidFill>
+            </a:endParaRPr>
+          </a:p>
+          <a:p>
+            <a:endParaRPr lang="en-US" dirty="0" smtClean="0">
+              <a:solidFill>
+                <a:schemeClr val="tx1">
+                  <a:lumMod val="85000"/>
+                  <a:lumOff val="15000"/>
+                </a:schemeClr>
+              </a:solidFill>
+            </a:endParaRPr>
+          </a:p>
+        </p:txBody>
+      </p:sp>
+      <p:sp>
+        <p:nvSpPr>
+          <p:cNvPr id="4" name="Slide Number Placeholder 3"/>
+          <p:cNvSpPr>
+            <a:spLocks noGrp="1"/>
+          </p:cNvSpPr>
+          <p:nvPr>
+            <p:ph type="sldNum" idx="12"/>
+          </p:nvPr>
+        </p:nvSpPr>
+        <p:spPr/>
+        <p:txBody>
+          <a:bodyPr/>
+          <a:lstStyle/>
+          <a:p>
+            <a:pPr>
+              <a:defRPr/>
+            </a:pPr>
+            <a:fld id="{8C6E2802-7AC4-44BB-B0A5-E12803E0614A}" type="slidenum">
+              <a:rPr lang="en-US" altLang="en-US" smtClean="0"/>
+              <a:pPr>
+                <a:defRPr/>
+              </a:pPr>
+              <a:t>15</a:t>
             </a:fld>
             <a:endParaRPr lang="en-US" altLang="en-US" dirty="0"/>
           </a:p>

</xml_diff>

<commit_message>
Added places for other files
</commit_message>
<xml_diff>
--- a/CMQA/Presentations/First Semester Presentation.pptx
+++ b/CMQA/Presentations/First Semester Presentation.pptx
@@ -6,7 +6,7 @@
     <p:sldMasterId id="2147483649" r:id="rId2"/>
   </p:sldMasterIdLst>
   <p:notesMasterIdLst>
-    <p:notesMasterId r:id="rId18"/>
+    <p:notesMasterId r:id="rId27"/>
   </p:notesMasterIdLst>
   <p:sldIdLst>
     <p:sldId id="256" r:id="rId3"/>
@@ -24,6 +24,15 @@
     <p:sldId id="268" r:id="rId15"/>
     <p:sldId id="269" r:id="rId16"/>
     <p:sldId id="270" r:id="rId17"/>
+    <p:sldId id="271" r:id="rId18"/>
+    <p:sldId id="272" r:id="rId19"/>
+    <p:sldId id="273" r:id="rId20"/>
+    <p:sldId id="274" r:id="rId21"/>
+    <p:sldId id="275" r:id="rId22"/>
+    <p:sldId id="276" r:id="rId23"/>
+    <p:sldId id="277" r:id="rId24"/>
+    <p:sldId id="278" r:id="rId25"/>
+    <p:sldId id="279" r:id="rId26"/>
   </p:sldIdLst>
   <p:sldSz cx="10075863" cy="7562850"/>
   <p:notesSz cx="7772400" cy="10058400"/>
@@ -2156,6 +2165,365 @@
       <p:sp>
         <p:nvSpPr>
           <p:cNvPr id="62468" name="Rectangle 2"/>
+          <p:cNvSpPr>
+            <a:spLocks noGrp="1" noChangeArrowheads="1"/>
+          </p:cNvSpPr>
+          <p:nvPr>
+            <p:ph type="body" idx="1"/>
+          </p:nvPr>
+        </p:nvSpPr>
+        <p:spPr>
+          <a:xfrm>
+            <a:off x="777875" y="4776788"/>
+            <a:ext cx="6210300" cy="4518025"/>
+          </a:xfrm>
+          <a:noFill/>
+          <a:extLst>
+            <a:ext uri="{91240B29-F687-4F45-9708-019B960494DF}">
+              <a14:hiddenLine xmlns="" xmlns:a14="http://schemas.microsoft.com/office/drawing/2010/main" w="9525">
+                <a:solidFill>
+                  <a:srgbClr val="808080"/>
+                </a:solidFill>
+                <a:miter lim="800000"/>
+                <a:headEnd/>
+                <a:tailEnd/>
+              </a14:hiddenLine>
+            </a:ext>
+            <a:ext uri="{AF507438-7753-43E0-B8FC-AC1667EBCBE1}">
+              <a14:hiddenEffects xmlns="" xmlns:a14="http://schemas.microsoft.com/office/drawing/2010/main">
+                <a:effectLst>
+                  <a:outerShdw dist="35921" dir="2700000" algn="ctr" rotWithShape="0">
+                    <a:srgbClr val="808080"/>
+                  </a:outerShdw>
+                </a:effectLst>
+              </a14:hiddenEffects>
+            </a:ext>
+          </a:extLst>
+        </p:spPr>
+        <p:txBody>
+          <a:bodyPr wrap="none" anchor="ctr"/>
+          <a:lstStyle/>
+          <a:p>
+            <a:endParaRPr lang="en-US" altLang="en-US" smtClean="0"/>
+          </a:p>
+        </p:txBody>
+      </p:sp>
+    </p:spTree>
+  </p:cSld>
+  <p:clrMapOvr>
+    <a:masterClrMapping/>
+  </p:clrMapOvr>
+</p:notes>
+</file>
+
+<file path=ppt/notesSlides/notesSlide4.xml><?xml version="1.0" encoding="utf-8"?>
+<p:notes xmlns:a="http://schemas.openxmlformats.org/drawingml/2006/main" xmlns:r="http://schemas.openxmlformats.org/officeDocument/2006/relationships" xmlns:p="http://schemas.openxmlformats.org/presentationml/2006/main">
+  <p:cSld>
+    <p:bg>
+      <p:bgPr>
+        <a:solidFill>
+          <a:srgbClr val="FFFFFF"/>
+        </a:solidFill>
+        <a:effectLst/>
+      </p:bgPr>
+    </p:bg>
+    <p:spTree>
+      <p:nvGrpSpPr>
+        <p:cNvPr id="1" name=""/>
+        <p:cNvGrpSpPr/>
+        <p:nvPr/>
+      </p:nvGrpSpPr>
+      <p:grpSpPr>
+        <a:xfrm>
+          <a:off x="0" y="0"/>
+          <a:ext cx="0" cy="0"/>
+          <a:chOff x="0" y="0"/>
+          <a:chExt cx="0" cy="0"/>
+        </a:xfrm>
+      </p:grpSpPr>
+      <p:sp>
+        <p:nvSpPr>
+          <p:cNvPr id="61442" name="Rectangle 11"/>
+          <p:cNvSpPr>
+            <a:spLocks noGrp="1" noChangeArrowheads="1"/>
+          </p:cNvSpPr>
+          <p:nvPr>
+            <p:ph type="sldNum" sz="quarter"/>
+          </p:nvPr>
+        </p:nvSpPr>
+        <p:spPr>
+          <a:noFill/>
+          <a:extLst>
+            <a:ext uri="{91240B29-F687-4F45-9708-019B960494DF}">
+              <a14:hiddenLine xmlns="" xmlns:a14="http://schemas.microsoft.com/office/drawing/2010/main" w="9525">
+                <a:solidFill>
+                  <a:srgbClr val="808080"/>
+                </a:solidFill>
+                <a:round/>
+                <a:headEnd/>
+                <a:tailEnd/>
+              </a14:hiddenLine>
+            </a:ext>
+          </a:extLst>
+        </p:spPr>
+        <p:txBody>
+          <a:bodyPr/>
+          <a:lstStyle>
+            <a:lvl1pPr eaLnBrk="0">
+              <a:tabLst>
+                <a:tab pos="723900" algn="l"/>
+                <a:tab pos="1447800" algn="l"/>
+                <a:tab pos="2171700" algn="l"/>
+                <a:tab pos="2895600" algn="l"/>
+              </a:tabLst>
+              <a:defRPr>
+                <a:solidFill>
+                  <a:schemeClr val="bg1"/>
+                </a:solidFill>
+                <a:latin typeface="Arial" charset="0"/>
+                <a:ea typeface="Microsoft YaHei" charset="-122"/>
+              </a:defRPr>
+            </a:lvl1pPr>
+            <a:lvl2pPr eaLnBrk="0">
+              <a:tabLst>
+                <a:tab pos="723900" algn="l"/>
+                <a:tab pos="1447800" algn="l"/>
+                <a:tab pos="2171700" algn="l"/>
+                <a:tab pos="2895600" algn="l"/>
+              </a:tabLst>
+              <a:defRPr>
+                <a:solidFill>
+                  <a:schemeClr val="bg1"/>
+                </a:solidFill>
+                <a:latin typeface="Arial" charset="0"/>
+                <a:ea typeface="Microsoft YaHei" charset="-122"/>
+              </a:defRPr>
+            </a:lvl2pPr>
+            <a:lvl3pPr eaLnBrk="0">
+              <a:tabLst>
+                <a:tab pos="723900" algn="l"/>
+                <a:tab pos="1447800" algn="l"/>
+                <a:tab pos="2171700" algn="l"/>
+                <a:tab pos="2895600" algn="l"/>
+              </a:tabLst>
+              <a:defRPr>
+                <a:solidFill>
+                  <a:schemeClr val="bg1"/>
+                </a:solidFill>
+                <a:latin typeface="Arial" charset="0"/>
+                <a:ea typeface="Microsoft YaHei" charset="-122"/>
+              </a:defRPr>
+            </a:lvl3pPr>
+            <a:lvl4pPr eaLnBrk="0">
+              <a:tabLst>
+                <a:tab pos="723900" algn="l"/>
+                <a:tab pos="1447800" algn="l"/>
+                <a:tab pos="2171700" algn="l"/>
+                <a:tab pos="2895600" algn="l"/>
+              </a:tabLst>
+              <a:defRPr>
+                <a:solidFill>
+                  <a:schemeClr val="bg1"/>
+                </a:solidFill>
+                <a:latin typeface="Arial" charset="0"/>
+                <a:ea typeface="Microsoft YaHei" charset="-122"/>
+              </a:defRPr>
+            </a:lvl4pPr>
+            <a:lvl5pPr eaLnBrk="0">
+              <a:tabLst>
+                <a:tab pos="723900" algn="l"/>
+                <a:tab pos="1447800" algn="l"/>
+                <a:tab pos="2171700" algn="l"/>
+                <a:tab pos="2895600" algn="l"/>
+              </a:tabLst>
+              <a:defRPr>
+                <a:solidFill>
+                  <a:schemeClr val="bg1"/>
+                </a:solidFill>
+                <a:latin typeface="Arial" charset="0"/>
+                <a:ea typeface="Microsoft YaHei" charset="-122"/>
+              </a:defRPr>
+            </a:lvl5pPr>
+            <a:lvl6pPr marL="2514600" indent="-228600" defTabSz="457200" eaLnBrk="0" fontAlgn="base" hangingPunct="0">
+              <a:lnSpc>
+                <a:spcPct val="93000"/>
+              </a:lnSpc>
+              <a:spcBef>
+                <a:spcPct val="0"/>
+              </a:spcBef>
+              <a:spcAft>
+                <a:spcPct val="0"/>
+              </a:spcAft>
+              <a:buClr>
+                <a:srgbClr val="000000"/>
+              </a:buClr>
+              <a:buSzPct val="100000"/>
+              <a:buFont typeface="Times New Roman" pitchFamily="16" charset="0"/>
+              <a:tabLst>
+                <a:tab pos="723900" algn="l"/>
+                <a:tab pos="1447800" algn="l"/>
+                <a:tab pos="2171700" algn="l"/>
+                <a:tab pos="2895600" algn="l"/>
+              </a:tabLst>
+              <a:defRPr>
+                <a:solidFill>
+                  <a:schemeClr val="bg1"/>
+                </a:solidFill>
+                <a:latin typeface="Arial" charset="0"/>
+                <a:ea typeface="Microsoft YaHei" charset="-122"/>
+              </a:defRPr>
+            </a:lvl6pPr>
+            <a:lvl7pPr marL="2971800" indent="-228600" defTabSz="457200" eaLnBrk="0" fontAlgn="base" hangingPunct="0">
+              <a:lnSpc>
+                <a:spcPct val="93000"/>
+              </a:lnSpc>
+              <a:spcBef>
+                <a:spcPct val="0"/>
+              </a:spcBef>
+              <a:spcAft>
+                <a:spcPct val="0"/>
+              </a:spcAft>
+              <a:buClr>
+                <a:srgbClr val="000000"/>
+              </a:buClr>
+              <a:buSzPct val="100000"/>
+              <a:buFont typeface="Times New Roman" pitchFamily="16" charset="0"/>
+              <a:tabLst>
+                <a:tab pos="723900" algn="l"/>
+                <a:tab pos="1447800" algn="l"/>
+                <a:tab pos="2171700" algn="l"/>
+                <a:tab pos="2895600" algn="l"/>
+              </a:tabLst>
+              <a:defRPr>
+                <a:solidFill>
+                  <a:schemeClr val="bg1"/>
+                </a:solidFill>
+                <a:latin typeface="Arial" charset="0"/>
+                <a:ea typeface="Microsoft YaHei" charset="-122"/>
+              </a:defRPr>
+            </a:lvl7pPr>
+            <a:lvl8pPr marL="3429000" indent="-228600" defTabSz="457200" eaLnBrk="0" fontAlgn="base" hangingPunct="0">
+              <a:lnSpc>
+                <a:spcPct val="93000"/>
+              </a:lnSpc>
+              <a:spcBef>
+                <a:spcPct val="0"/>
+              </a:spcBef>
+              <a:spcAft>
+                <a:spcPct val="0"/>
+              </a:spcAft>
+              <a:buClr>
+                <a:srgbClr val="000000"/>
+              </a:buClr>
+              <a:buSzPct val="100000"/>
+              <a:buFont typeface="Times New Roman" pitchFamily="16" charset="0"/>
+              <a:tabLst>
+                <a:tab pos="723900" algn="l"/>
+                <a:tab pos="1447800" algn="l"/>
+                <a:tab pos="2171700" algn="l"/>
+                <a:tab pos="2895600" algn="l"/>
+              </a:tabLst>
+              <a:defRPr>
+                <a:solidFill>
+                  <a:schemeClr val="bg1"/>
+                </a:solidFill>
+                <a:latin typeface="Arial" charset="0"/>
+                <a:ea typeface="Microsoft YaHei" charset="-122"/>
+              </a:defRPr>
+            </a:lvl8pPr>
+            <a:lvl9pPr marL="3886200" indent="-228600" defTabSz="457200" eaLnBrk="0" fontAlgn="base" hangingPunct="0">
+              <a:lnSpc>
+                <a:spcPct val="93000"/>
+              </a:lnSpc>
+              <a:spcBef>
+                <a:spcPct val="0"/>
+              </a:spcBef>
+              <a:spcAft>
+                <a:spcPct val="0"/>
+              </a:spcAft>
+              <a:buClr>
+                <a:srgbClr val="000000"/>
+              </a:buClr>
+              <a:buSzPct val="100000"/>
+              <a:buFont typeface="Times New Roman" pitchFamily="16" charset="0"/>
+              <a:tabLst>
+                <a:tab pos="723900" algn="l"/>
+                <a:tab pos="1447800" algn="l"/>
+                <a:tab pos="2171700" algn="l"/>
+                <a:tab pos="2895600" algn="l"/>
+              </a:tabLst>
+              <a:defRPr>
+                <a:solidFill>
+                  <a:schemeClr val="bg1"/>
+                </a:solidFill>
+                <a:latin typeface="Arial" charset="0"/>
+                <a:ea typeface="Microsoft YaHei" charset="-122"/>
+              </a:defRPr>
+            </a:lvl9pPr>
+          </a:lstStyle>
+          <a:p>
+            <a:pPr eaLnBrk="1"/>
+            <a:fld id="{31E3B3A6-0991-4311-8485-A8B91551DA57}" type="slidenum">
+              <a:rPr lang="en-US" altLang="en-US" smtClean="0">
+                <a:solidFill>
+                  <a:srgbClr val="FFFFFF"/>
+                </a:solidFill>
+                <a:latin typeface="Times New Roman" pitchFamily="16" charset="0"/>
+              </a:rPr>
+              <a:pPr eaLnBrk="1"/>
+              <a:t>24</a:t>
+            </a:fld>
+            <a:endParaRPr lang="en-US" altLang="en-US" smtClean="0">
+              <a:solidFill>
+                <a:srgbClr val="FFFFFF"/>
+              </a:solidFill>
+              <a:latin typeface="Times New Roman" pitchFamily="16" charset="0"/>
+            </a:endParaRPr>
+          </a:p>
+        </p:txBody>
+      </p:sp>
+      <p:sp>
+        <p:nvSpPr>
+          <p:cNvPr id="61443" name="Rectangle 1"/>
+          <p:cNvSpPr>
+            <a:spLocks noGrp="1" noRot="1" noChangeAspect="1" noChangeArrowheads="1" noTextEdit="1"/>
+          </p:cNvSpPr>
+          <p:nvPr>
+            <p:ph type="sldImg"/>
+          </p:nvPr>
+        </p:nvSpPr>
+        <p:spPr>
+          <a:xfrm>
+            <a:off x="1373188" y="763588"/>
+            <a:ext cx="5026025" cy="3771900"/>
+          </a:xfrm>
+          <a:solidFill>
+            <a:srgbClr val="FFFFFF"/>
+          </a:solidFill>
+          <a:ln>
+            <a:solidFill>
+              <a:srgbClr val="000000"/>
+            </a:solidFill>
+            <a:miter lim="800000"/>
+            <a:headEnd/>
+            <a:tailEnd/>
+          </a:ln>
+          <a:extLst>
+            <a:ext uri="{AF507438-7753-43E0-B8FC-AC1667EBCBE1}">
+              <a14:hiddenEffects xmlns="" xmlns:a14="http://schemas.microsoft.com/office/drawing/2010/main">
+                <a:effectLst>
+                  <a:outerShdw dist="35921" dir="2700000" algn="ctr" rotWithShape="0">
+                    <a:srgbClr val="808080"/>
+                  </a:outerShdw>
+                </a:effectLst>
+              </a14:hiddenEffects>
+            </a:ext>
+          </a:extLst>
+        </p:spPr>
+      </p:sp>
+      <p:sp>
+        <p:nvSpPr>
+          <p:cNvPr id="61444" name="Rectangle 2"/>
           <p:cNvSpPr>
             <a:spLocks noGrp="1" noChangeArrowheads="1"/>
           </p:cNvSpPr>
@@ -12195,25 +12563,6 @@
             </a:r>
           </a:p>
           <a:p>
-            <a:r>
-              <a:rPr lang="en-US" sz="3200" dirty="0" smtClean="0">
-                <a:solidFill>
-                  <a:schemeClr val="bg1">
-                    <a:lumMod val="65000"/>
-                  </a:schemeClr>
-                </a:solidFill>
-              </a:rPr>
-              <a:t>Conclusion</a:t>
-            </a:r>
-            <a:endParaRPr lang="en-US" sz="3200" dirty="0">
-              <a:solidFill>
-                <a:schemeClr val="bg1">
-                  <a:lumMod val="65000"/>
-                </a:schemeClr>
-              </a:solidFill>
-            </a:endParaRPr>
-          </a:p>
-          <a:p>
             <a:endParaRPr lang="en-US" sz="4000" dirty="0">
               <a:solidFill>
                 <a:schemeClr val="bg1">
@@ -12445,7 +12794,7 @@
 </p:sld>
 </file>
 
-<file path=ppt/slides/slide2.xml><?xml version="1.0" encoding="utf-8"?>
+<file path=ppt/slides/slide16.xml><?xml version="1.0" encoding="utf-8"?>
 <p:sld xmlns:a="http://schemas.openxmlformats.org/drawingml/2006/main" xmlns:r="http://schemas.openxmlformats.org/officeDocument/2006/relationships" xmlns:p="http://schemas.openxmlformats.org/presentationml/2006/main">
   <p:cSld>
     <p:spTree>
@@ -12464,26 +12813,21 @@
       </p:grpSpPr>
       <p:sp>
         <p:nvSpPr>
-          <p:cNvPr id="2" name="Subtitle 1"/>
+          <p:cNvPr id="2" name="Title 1"/>
           <p:cNvSpPr>
             <a:spLocks noGrp="1"/>
           </p:cNvSpPr>
           <p:nvPr>
-            <p:ph type="subTitle" idx="1"/>
+            <p:ph type="title"/>
           </p:nvPr>
         </p:nvSpPr>
-        <p:spPr>
-          <a:xfrm>
-            <a:off x="1456531" y="971338"/>
-            <a:ext cx="7053104" cy="6591512"/>
-          </a:xfrm>
-        </p:spPr>
+        <p:spPr/>
         <p:txBody>
           <a:bodyPr/>
           <a:lstStyle/>
           <a:p>
             <a:r>
-              <a:rPr lang="en-US" sz="3200" dirty="0" smtClean="0">
+              <a:rPr lang="en-US" dirty="0" smtClean="0">
                 <a:solidFill>
                   <a:schemeClr val="tx1">
                     <a:lumMod val="85000"/>
@@ -12491,9 +12835,9 @@
                   </a:schemeClr>
                 </a:solidFill>
               </a:rPr>
-              <a:t>Group Organization</a:t>
-            </a:r>
-            <a:endParaRPr lang="en-US" sz="3200" dirty="0" smtClean="0">
+              <a:t>Tom Slide</a:t>
+            </a:r>
+            <a:endParaRPr lang="en-US" dirty="0">
               <a:solidFill>
                 <a:schemeClr val="tx1">
                   <a:lumMod val="85000"/>
@@ -12502,6 +12846,210 @@
               </a:solidFill>
             </a:endParaRPr>
           </a:p>
+        </p:txBody>
+      </p:sp>
+      <p:sp>
+        <p:nvSpPr>
+          <p:cNvPr id="3" name="Content Placeholder 2"/>
+          <p:cNvSpPr>
+            <a:spLocks noGrp="1"/>
+          </p:cNvSpPr>
+          <p:nvPr>
+            <p:ph idx="1"/>
+          </p:nvPr>
+        </p:nvSpPr>
+        <p:spPr/>
+        <p:txBody>
+          <a:bodyPr/>
+          <a:lstStyle/>
+          <a:p>
+            <a:endParaRPr lang="en-US"/>
+          </a:p>
+        </p:txBody>
+      </p:sp>
+      <p:sp>
+        <p:nvSpPr>
+          <p:cNvPr id="4" name="Slide Number Placeholder 3"/>
+          <p:cNvSpPr>
+            <a:spLocks noGrp="1"/>
+          </p:cNvSpPr>
+          <p:nvPr>
+            <p:ph type="sldNum" idx="12"/>
+          </p:nvPr>
+        </p:nvSpPr>
+        <p:spPr/>
+        <p:txBody>
+          <a:bodyPr/>
+          <a:lstStyle/>
+          <a:p>
+            <a:pPr>
+              <a:defRPr/>
+            </a:pPr>
+            <a:fld id="{8C6E2802-7AC4-44BB-B0A5-E12803E0614A}" type="slidenum">
+              <a:rPr lang="en-US" altLang="en-US" smtClean="0"/>
+              <a:pPr>
+                <a:defRPr/>
+              </a:pPr>
+              <a:t>16</a:t>
+            </a:fld>
+            <a:endParaRPr lang="en-US" altLang="en-US" dirty="0"/>
+          </a:p>
+        </p:txBody>
+      </p:sp>
+    </p:spTree>
+  </p:cSld>
+  <p:clrMapOvr>
+    <a:masterClrMapping/>
+  </p:clrMapOvr>
+</p:sld>
+</file>
+
+<file path=ppt/slides/slide17.xml><?xml version="1.0" encoding="utf-8"?>
+<p:sld xmlns:a="http://schemas.openxmlformats.org/drawingml/2006/main" xmlns:r="http://schemas.openxmlformats.org/officeDocument/2006/relationships" xmlns:p="http://schemas.openxmlformats.org/presentationml/2006/main">
+  <p:cSld>
+    <p:spTree>
+      <p:nvGrpSpPr>
+        <p:cNvPr id="1" name=""/>
+        <p:cNvGrpSpPr/>
+        <p:nvPr/>
+      </p:nvGrpSpPr>
+      <p:grpSpPr>
+        <a:xfrm>
+          <a:off x="0" y="0"/>
+          <a:ext cx="0" cy="0"/>
+          <a:chOff x="0" y="0"/>
+          <a:chExt cx="0" cy="0"/>
+        </a:xfrm>
+      </p:grpSpPr>
+      <p:sp>
+        <p:nvSpPr>
+          <p:cNvPr id="2" name="Title 1"/>
+          <p:cNvSpPr>
+            <a:spLocks noGrp="1"/>
+          </p:cNvSpPr>
+          <p:nvPr>
+            <p:ph type="title"/>
+          </p:nvPr>
+        </p:nvSpPr>
+        <p:spPr/>
+        <p:txBody>
+          <a:bodyPr/>
+          <a:lstStyle/>
+          <a:p>
+            <a:r>
+              <a:rPr lang="en-US" dirty="0" smtClean="0">
+                <a:solidFill>
+                  <a:schemeClr val="tx1">
+                    <a:lumMod val="85000"/>
+                    <a:lumOff val="15000"/>
+                  </a:schemeClr>
+                </a:solidFill>
+              </a:rPr>
+              <a:t>Here Be Subsystem Slides (Still Have to Make CDH/ADC ones)</a:t>
+            </a:r>
+            <a:endParaRPr lang="en-US" dirty="0">
+              <a:solidFill>
+                <a:schemeClr val="tx1">
+                  <a:lumMod val="85000"/>
+                  <a:lumOff val="15000"/>
+                </a:schemeClr>
+              </a:solidFill>
+            </a:endParaRPr>
+          </a:p>
+        </p:txBody>
+      </p:sp>
+      <p:sp>
+        <p:nvSpPr>
+          <p:cNvPr id="3" name="Content Placeholder 2"/>
+          <p:cNvSpPr>
+            <a:spLocks noGrp="1"/>
+          </p:cNvSpPr>
+          <p:nvPr>
+            <p:ph idx="1"/>
+          </p:nvPr>
+        </p:nvSpPr>
+        <p:spPr/>
+        <p:txBody>
+          <a:bodyPr/>
+          <a:lstStyle/>
+          <a:p>
+            <a:endParaRPr lang="en-US"/>
+          </a:p>
+        </p:txBody>
+      </p:sp>
+      <p:sp>
+        <p:nvSpPr>
+          <p:cNvPr id="4" name="Slide Number Placeholder 3"/>
+          <p:cNvSpPr>
+            <a:spLocks noGrp="1"/>
+          </p:cNvSpPr>
+          <p:nvPr>
+            <p:ph type="sldNum" idx="12"/>
+          </p:nvPr>
+        </p:nvSpPr>
+        <p:spPr/>
+        <p:txBody>
+          <a:bodyPr/>
+          <a:lstStyle/>
+          <a:p>
+            <a:pPr>
+              <a:defRPr/>
+            </a:pPr>
+            <a:fld id="{8C6E2802-7AC4-44BB-B0A5-E12803E0614A}" type="slidenum">
+              <a:rPr lang="en-US" altLang="en-US" smtClean="0"/>
+              <a:pPr>
+                <a:defRPr/>
+              </a:pPr>
+              <a:t>17</a:t>
+            </a:fld>
+            <a:endParaRPr lang="en-US" altLang="en-US" dirty="0"/>
+          </a:p>
+        </p:txBody>
+      </p:sp>
+    </p:spTree>
+  </p:cSld>
+  <p:clrMapOvr>
+    <a:masterClrMapping/>
+  </p:clrMapOvr>
+</p:sld>
+</file>
+
+<file path=ppt/slides/slide18.xml><?xml version="1.0" encoding="utf-8"?>
+<p:sld xmlns:a="http://schemas.openxmlformats.org/drawingml/2006/main" xmlns:r="http://schemas.openxmlformats.org/officeDocument/2006/relationships" xmlns:p="http://schemas.openxmlformats.org/presentationml/2006/main">
+  <p:cSld>
+    <p:spTree>
+      <p:nvGrpSpPr>
+        <p:cNvPr id="1" name=""/>
+        <p:cNvGrpSpPr/>
+        <p:nvPr/>
+      </p:nvGrpSpPr>
+      <p:grpSpPr>
+        <a:xfrm>
+          <a:off x="0" y="0"/>
+          <a:ext cx="0" cy="0"/>
+          <a:chOff x="0" y="0"/>
+          <a:chExt cx="0" cy="0"/>
+        </a:xfrm>
+      </p:grpSpPr>
+      <p:sp>
+        <p:nvSpPr>
+          <p:cNvPr id="2" name="Subtitle 1"/>
+          <p:cNvSpPr>
+            <a:spLocks noGrp="1"/>
+          </p:cNvSpPr>
+          <p:nvPr>
+            <p:ph type="subTitle" idx="1"/>
+          </p:nvPr>
+        </p:nvSpPr>
+        <p:spPr>
+          <a:xfrm>
+            <a:off x="1456531" y="971338"/>
+            <a:ext cx="7053104" cy="6591512"/>
+          </a:xfrm>
+        </p:spPr>
+        <p:txBody>
+          <a:bodyPr/>
+          <a:lstStyle/>
           <a:p>
             <a:r>
               <a:rPr lang="en-US" sz="3200" dirty="0" smtClean="0">
@@ -12511,31 +13059,7 @@
                   </a:schemeClr>
                 </a:solidFill>
               </a:rPr>
-              <a:t>Project Overview</a:t>
-            </a:r>
-          </a:p>
-          <a:p>
-            <a:r>
-              <a:rPr lang="en-US" sz="3200" dirty="0" smtClean="0">
-                <a:solidFill>
-                  <a:schemeClr val="bg1">
-                    <a:lumMod val="65000"/>
-                  </a:schemeClr>
-                </a:solidFill>
-              </a:rPr>
-              <a:t>Mission Success Criteria</a:t>
-            </a:r>
-          </a:p>
-          <a:p>
-            <a:r>
-              <a:rPr lang="en-US" sz="3200" dirty="0" smtClean="0">
-                <a:solidFill>
-                  <a:schemeClr val="bg1">
-                    <a:lumMod val="65000"/>
-                  </a:schemeClr>
-                </a:solidFill>
-              </a:rPr>
-              <a:t>Design Constraints</a:t>
+              <a:t>Group Organization</a:t>
             </a:r>
             <a:endParaRPr lang="en-US" sz="3200" dirty="0" smtClean="0">
               <a:solidFill>
@@ -12554,7 +13078,7 @@
                   </a:schemeClr>
                 </a:solidFill>
               </a:rPr>
-              <a:t>Mission Architecture</a:t>
+              <a:t>Project Overview</a:t>
             </a:r>
           </a:p>
           <a:p>
@@ -12566,51 +13090,64 @@
                   </a:schemeClr>
                 </a:solidFill>
               </a:rPr>
-              <a:t>CONOPS</a:t>
-            </a:r>
-          </a:p>
-          <a:p>
-            <a:r>
-              <a:rPr lang="en-US" sz="3200" dirty="0" smtClean="0">
-                <a:solidFill>
-                  <a:schemeClr val="bg1">
-                    <a:lumMod val="65000"/>
-                  </a:schemeClr>
-                </a:solidFill>
-              </a:rPr>
-              <a:t>Risk Assessment</a:t>
-            </a:r>
-          </a:p>
-          <a:p>
-            <a:r>
-              <a:rPr lang="en-US" sz="3200" dirty="0" smtClean="0">
-                <a:solidFill>
-                  <a:schemeClr val="bg1">
-                    <a:lumMod val="65000"/>
-                  </a:schemeClr>
-                </a:solidFill>
-              </a:rPr>
-              <a:t>Schedule</a:t>
-            </a:r>
-          </a:p>
-          <a:p>
-            <a:r>
-              <a:rPr lang="en-US" sz="3200" dirty="0" smtClean="0">
-                <a:solidFill>
-                  <a:schemeClr val="bg1">
-                    <a:lumMod val="65000"/>
-                  </a:schemeClr>
-                </a:solidFill>
-              </a:rPr>
-              <a:t>Conclusion</a:t>
-            </a:r>
-            <a:endParaRPr lang="en-US" sz="3200" dirty="0">
+              <a:t>Design Constraints</a:t>
+            </a:r>
+            <a:endParaRPr lang="en-US" sz="3200" dirty="0" smtClean="0">
               <a:solidFill>
                 <a:schemeClr val="bg1">
                   <a:lumMod val="65000"/>
                 </a:schemeClr>
               </a:solidFill>
             </a:endParaRPr>
+          </a:p>
+          <a:p>
+            <a:r>
+              <a:rPr lang="en-US" sz="3200" dirty="0" smtClean="0">
+                <a:solidFill>
+                  <a:schemeClr val="bg1">
+                    <a:lumMod val="65000"/>
+                  </a:schemeClr>
+                </a:solidFill>
+              </a:rPr>
+              <a:t>Mission Architecture</a:t>
+            </a:r>
+          </a:p>
+          <a:p>
+            <a:r>
+              <a:rPr lang="en-US" sz="3200" dirty="0" smtClean="0">
+                <a:solidFill>
+                  <a:schemeClr val="tx1">
+                    <a:lumMod val="85000"/>
+                    <a:lumOff val="15000"/>
+                  </a:schemeClr>
+                </a:solidFill>
+              </a:rPr>
+              <a:t>CONOPS</a:t>
+            </a:r>
+          </a:p>
+          <a:p>
+            <a:r>
+              <a:rPr lang="en-US" sz="3200" dirty="0" smtClean="0">
+                <a:solidFill>
+                  <a:schemeClr val="bg1">
+                    <a:lumMod val="65000"/>
+                  </a:schemeClr>
+                </a:solidFill>
+              </a:rPr>
+              <a:t>Risk Assessment</a:t>
+            </a:r>
+          </a:p>
+          <a:p>
+            <a:r>
+              <a:rPr lang="en-US" sz="3200" dirty="0" smtClean="0">
+                <a:solidFill>
+                  <a:schemeClr val="bg1">
+                    <a:lumMod val="65000"/>
+                  </a:schemeClr>
+                </a:solidFill>
+              </a:rPr>
+              <a:t>Schedule</a:t>
+            </a:r>
           </a:p>
           <a:p>
             <a:endParaRPr lang="en-US" sz="4000" dirty="0">
@@ -12654,6 +13191,1844 @@
     <p:tnLst>
       <p:par>
         <p:cTn id="1" dur="indefinite" restart="never" nodeType="tmRoot"/>
+      </p:par>
+    </p:tnLst>
+  </p:timing>
+</p:sld>
+</file>
+
+<file path=ppt/slides/slide19.xml><?xml version="1.0" encoding="utf-8"?>
+<p:sld xmlns:a="http://schemas.openxmlformats.org/drawingml/2006/main" xmlns:r="http://schemas.openxmlformats.org/officeDocument/2006/relationships" xmlns:p="http://schemas.openxmlformats.org/presentationml/2006/main">
+  <p:cSld>
+    <p:spTree>
+      <p:nvGrpSpPr>
+        <p:cNvPr id="1" name=""/>
+        <p:cNvGrpSpPr/>
+        <p:nvPr/>
+      </p:nvGrpSpPr>
+      <p:grpSpPr>
+        <a:xfrm>
+          <a:off x="0" y="0"/>
+          <a:ext cx="0" cy="0"/>
+          <a:chOff x="0" y="0"/>
+          <a:chExt cx="0" cy="0"/>
+        </a:xfrm>
+      </p:grpSpPr>
+      <p:sp>
+        <p:nvSpPr>
+          <p:cNvPr id="2" name="Title 1"/>
+          <p:cNvSpPr>
+            <a:spLocks noGrp="1"/>
+          </p:cNvSpPr>
+          <p:nvPr>
+            <p:ph type="title"/>
+          </p:nvPr>
+        </p:nvSpPr>
+        <p:spPr/>
+        <p:txBody>
+          <a:bodyPr/>
+          <a:lstStyle/>
+          <a:p>
+            <a:r>
+              <a:rPr lang="en-US" dirty="0" smtClean="0">
+                <a:solidFill>
+                  <a:schemeClr val="tx1">
+                    <a:lumMod val="85000"/>
+                    <a:lumOff val="15000"/>
+                  </a:schemeClr>
+                </a:solidFill>
+              </a:rPr>
+              <a:t>Here be CONOPS</a:t>
+            </a:r>
+            <a:endParaRPr lang="en-US" dirty="0">
+              <a:solidFill>
+                <a:schemeClr val="tx1">
+                  <a:lumMod val="85000"/>
+                  <a:lumOff val="15000"/>
+                </a:schemeClr>
+              </a:solidFill>
+            </a:endParaRPr>
+          </a:p>
+        </p:txBody>
+      </p:sp>
+      <p:sp>
+        <p:nvSpPr>
+          <p:cNvPr id="3" name="Content Placeholder 2"/>
+          <p:cNvSpPr>
+            <a:spLocks noGrp="1"/>
+          </p:cNvSpPr>
+          <p:nvPr>
+            <p:ph idx="1"/>
+          </p:nvPr>
+        </p:nvSpPr>
+        <p:spPr/>
+        <p:txBody>
+          <a:bodyPr/>
+          <a:lstStyle/>
+          <a:p>
+            <a:endParaRPr lang="en-US"/>
+          </a:p>
+        </p:txBody>
+      </p:sp>
+      <p:sp>
+        <p:nvSpPr>
+          <p:cNvPr id="4" name="Slide Number Placeholder 3"/>
+          <p:cNvSpPr>
+            <a:spLocks noGrp="1"/>
+          </p:cNvSpPr>
+          <p:nvPr>
+            <p:ph type="sldNum" idx="12"/>
+          </p:nvPr>
+        </p:nvSpPr>
+        <p:spPr/>
+        <p:txBody>
+          <a:bodyPr/>
+          <a:lstStyle/>
+          <a:p>
+            <a:pPr>
+              <a:defRPr/>
+            </a:pPr>
+            <a:fld id="{8C6E2802-7AC4-44BB-B0A5-E12803E0614A}" type="slidenum">
+              <a:rPr lang="en-US" altLang="en-US" smtClean="0"/>
+              <a:pPr>
+                <a:defRPr/>
+              </a:pPr>
+              <a:t>19</a:t>
+            </a:fld>
+            <a:endParaRPr lang="en-US" altLang="en-US" dirty="0"/>
+          </a:p>
+        </p:txBody>
+      </p:sp>
+    </p:spTree>
+  </p:cSld>
+  <p:clrMapOvr>
+    <a:masterClrMapping/>
+  </p:clrMapOvr>
+</p:sld>
+</file>
+
+<file path=ppt/slides/slide2.xml><?xml version="1.0" encoding="utf-8"?>
+<p:sld xmlns:a="http://schemas.openxmlformats.org/drawingml/2006/main" xmlns:r="http://schemas.openxmlformats.org/officeDocument/2006/relationships" xmlns:p="http://schemas.openxmlformats.org/presentationml/2006/main">
+  <p:cSld>
+    <p:spTree>
+      <p:nvGrpSpPr>
+        <p:cNvPr id="1" name=""/>
+        <p:cNvGrpSpPr/>
+        <p:nvPr/>
+      </p:nvGrpSpPr>
+      <p:grpSpPr>
+        <a:xfrm>
+          <a:off x="0" y="0"/>
+          <a:ext cx="0" cy="0"/>
+          <a:chOff x="0" y="0"/>
+          <a:chExt cx="0" cy="0"/>
+        </a:xfrm>
+      </p:grpSpPr>
+      <p:sp>
+        <p:nvSpPr>
+          <p:cNvPr id="2" name="Subtitle 1"/>
+          <p:cNvSpPr>
+            <a:spLocks noGrp="1"/>
+          </p:cNvSpPr>
+          <p:nvPr>
+            <p:ph type="subTitle" idx="1"/>
+          </p:nvPr>
+        </p:nvSpPr>
+        <p:spPr>
+          <a:xfrm>
+            <a:off x="1456531" y="971338"/>
+            <a:ext cx="7053104" cy="6591512"/>
+          </a:xfrm>
+        </p:spPr>
+        <p:txBody>
+          <a:bodyPr/>
+          <a:lstStyle/>
+          <a:p>
+            <a:r>
+              <a:rPr lang="en-US" sz="3200" dirty="0" smtClean="0">
+                <a:solidFill>
+                  <a:schemeClr val="tx1">
+                    <a:lumMod val="85000"/>
+                    <a:lumOff val="15000"/>
+                  </a:schemeClr>
+                </a:solidFill>
+              </a:rPr>
+              <a:t>Group Organization</a:t>
+            </a:r>
+            <a:endParaRPr lang="en-US" sz="3200" dirty="0" smtClean="0">
+              <a:solidFill>
+                <a:schemeClr val="tx1">
+                  <a:lumMod val="85000"/>
+                  <a:lumOff val="15000"/>
+                </a:schemeClr>
+              </a:solidFill>
+            </a:endParaRPr>
+          </a:p>
+          <a:p>
+            <a:r>
+              <a:rPr lang="en-US" sz="3200" dirty="0" smtClean="0">
+                <a:solidFill>
+                  <a:schemeClr val="bg1">
+                    <a:lumMod val="65000"/>
+                  </a:schemeClr>
+                </a:solidFill>
+              </a:rPr>
+              <a:t>Project Overview</a:t>
+            </a:r>
+          </a:p>
+          <a:p>
+            <a:r>
+              <a:rPr lang="en-US" sz="3200" dirty="0" smtClean="0">
+                <a:solidFill>
+                  <a:schemeClr val="bg1">
+                    <a:lumMod val="65000"/>
+                  </a:schemeClr>
+                </a:solidFill>
+              </a:rPr>
+              <a:t>Mission Success Criteria</a:t>
+            </a:r>
+          </a:p>
+          <a:p>
+            <a:r>
+              <a:rPr lang="en-US" sz="3200" dirty="0" smtClean="0">
+                <a:solidFill>
+                  <a:schemeClr val="bg1">
+                    <a:lumMod val="65000"/>
+                  </a:schemeClr>
+                </a:solidFill>
+              </a:rPr>
+              <a:t>Design Constraints</a:t>
+            </a:r>
+            <a:endParaRPr lang="en-US" sz="3200" dirty="0" smtClean="0">
+              <a:solidFill>
+                <a:schemeClr val="bg1">
+                  <a:lumMod val="65000"/>
+                </a:schemeClr>
+              </a:solidFill>
+            </a:endParaRPr>
+          </a:p>
+          <a:p>
+            <a:r>
+              <a:rPr lang="en-US" sz="3200" dirty="0" smtClean="0">
+                <a:solidFill>
+                  <a:schemeClr val="bg1">
+                    <a:lumMod val="65000"/>
+                  </a:schemeClr>
+                </a:solidFill>
+              </a:rPr>
+              <a:t>Mission Architecture</a:t>
+            </a:r>
+          </a:p>
+          <a:p>
+            <a:r>
+              <a:rPr lang="en-US" sz="3200" dirty="0" smtClean="0">
+                <a:solidFill>
+                  <a:schemeClr val="bg1">
+                    <a:lumMod val="65000"/>
+                  </a:schemeClr>
+                </a:solidFill>
+              </a:rPr>
+              <a:t>CONOPS</a:t>
+            </a:r>
+          </a:p>
+          <a:p>
+            <a:r>
+              <a:rPr lang="en-US" sz="3200" dirty="0" smtClean="0">
+                <a:solidFill>
+                  <a:schemeClr val="bg1">
+                    <a:lumMod val="65000"/>
+                  </a:schemeClr>
+                </a:solidFill>
+              </a:rPr>
+              <a:t>Risk Assessment</a:t>
+            </a:r>
+          </a:p>
+          <a:p>
+            <a:r>
+              <a:rPr lang="en-US" sz="3200" dirty="0" smtClean="0">
+                <a:solidFill>
+                  <a:schemeClr val="bg1">
+                    <a:lumMod val="65000"/>
+                  </a:schemeClr>
+                </a:solidFill>
+              </a:rPr>
+              <a:t>Schedule</a:t>
+            </a:r>
+          </a:p>
+          <a:p>
+            <a:endParaRPr lang="en-US" sz="4000" dirty="0">
+              <a:solidFill>
+                <a:schemeClr val="bg1">
+                  <a:lumMod val="65000"/>
+                </a:schemeClr>
+              </a:solidFill>
+            </a:endParaRPr>
+          </a:p>
+          <a:p>
+            <a:endParaRPr lang="en-US" dirty="0" smtClean="0">
+              <a:solidFill>
+                <a:schemeClr val="bg1">
+                  <a:lumMod val="65000"/>
+                </a:schemeClr>
+              </a:solidFill>
+            </a:endParaRPr>
+          </a:p>
+        </p:txBody>
+      </p:sp>
+    </p:spTree>
+    <p:extLst>
+      <p:ext uri="{BB962C8B-B14F-4D97-AF65-F5344CB8AC3E}">
+        <p14:creationId xmlns:p14="http://schemas.microsoft.com/office/powerpoint/2010/main" xmlns="" val="1899034955"/>
+      </p:ext>
+    </p:extLst>
+  </p:cSld>
+  <p:clrMapOvr>
+    <a:masterClrMapping/>
+  </p:clrMapOvr>
+  <mc:AlternateContent xmlns:mc="http://schemas.openxmlformats.org/markup-compatibility/2006">
+    <mc:Choice xmlns:p14="http://schemas.microsoft.com/office/powerpoint/2010/main" xmlns="" Requires="p14">
+      <p:transition spd="slow" p14:dur="2000" advTm="1111"/>
+    </mc:Choice>
+    <mc:Fallback>
+      <p:transition spd="slow" advTm="1111"/>
+    </mc:Fallback>
+  </mc:AlternateContent>
+  <p:timing>
+    <p:tnLst>
+      <p:par>
+        <p:cTn id="1" dur="indefinite" restart="never" nodeType="tmRoot"/>
+      </p:par>
+    </p:tnLst>
+  </p:timing>
+</p:sld>
+</file>
+
+<file path=ppt/slides/slide20.xml><?xml version="1.0" encoding="utf-8"?>
+<p:sld xmlns:a="http://schemas.openxmlformats.org/drawingml/2006/main" xmlns:r="http://schemas.openxmlformats.org/officeDocument/2006/relationships" xmlns:p="http://schemas.openxmlformats.org/presentationml/2006/main">
+  <p:cSld>
+    <p:spTree>
+      <p:nvGrpSpPr>
+        <p:cNvPr id="1" name=""/>
+        <p:cNvGrpSpPr/>
+        <p:nvPr/>
+      </p:nvGrpSpPr>
+      <p:grpSpPr>
+        <a:xfrm>
+          <a:off x="0" y="0"/>
+          <a:ext cx="0" cy="0"/>
+          <a:chOff x="0" y="0"/>
+          <a:chExt cx="0" cy="0"/>
+        </a:xfrm>
+      </p:grpSpPr>
+      <p:sp>
+        <p:nvSpPr>
+          <p:cNvPr id="2" name="Subtitle 1"/>
+          <p:cNvSpPr>
+            <a:spLocks noGrp="1"/>
+          </p:cNvSpPr>
+          <p:nvPr>
+            <p:ph type="subTitle" idx="1"/>
+          </p:nvPr>
+        </p:nvSpPr>
+        <p:spPr>
+          <a:xfrm>
+            <a:off x="1456531" y="971338"/>
+            <a:ext cx="7053104" cy="6591512"/>
+          </a:xfrm>
+        </p:spPr>
+        <p:txBody>
+          <a:bodyPr/>
+          <a:lstStyle/>
+          <a:p>
+            <a:r>
+              <a:rPr lang="en-US" sz="3200" dirty="0" smtClean="0">
+                <a:solidFill>
+                  <a:schemeClr val="bg1">
+                    <a:lumMod val="65000"/>
+                  </a:schemeClr>
+                </a:solidFill>
+              </a:rPr>
+              <a:t>Group Organization</a:t>
+            </a:r>
+            <a:endParaRPr lang="en-US" sz="3200" dirty="0" smtClean="0">
+              <a:solidFill>
+                <a:schemeClr val="bg1">
+                  <a:lumMod val="65000"/>
+                </a:schemeClr>
+              </a:solidFill>
+            </a:endParaRPr>
+          </a:p>
+          <a:p>
+            <a:r>
+              <a:rPr lang="en-US" sz="3200" dirty="0" smtClean="0">
+                <a:solidFill>
+                  <a:schemeClr val="bg1">
+                    <a:lumMod val="65000"/>
+                  </a:schemeClr>
+                </a:solidFill>
+              </a:rPr>
+              <a:t>Project Overview</a:t>
+            </a:r>
+          </a:p>
+          <a:p>
+            <a:r>
+              <a:rPr lang="en-US" sz="3200" dirty="0" smtClean="0">
+                <a:solidFill>
+                  <a:schemeClr val="bg1">
+                    <a:lumMod val="65000"/>
+                  </a:schemeClr>
+                </a:solidFill>
+              </a:rPr>
+              <a:t>Design Constraints</a:t>
+            </a:r>
+            <a:endParaRPr lang="en-US" sz="3200" dirty="0" smtClean="0">
+              <a:solidFill>
+                <a:schemeClr val="bg1">
+                  <a:lumMod val="65000"/>
+                </a:schemeClr>
+              </a:solidFill>
+            </a:endParaRPr>
+          </a:p>
+          <a:p>
+            <a:r>
+              <a:rPr lang="en-US" sz="3200" dirty="0" smtClean="0">
+                <a:solidFill>
+                  <a:schemeClr val="bg1">
+                    <a:lumMod val="65000"/>
+                  </a:schemeClr>
+                </a:solidFill>
+              </a:rPr>
+              <a:t>Mission Architecture</a:t>
+            </a:r>
+          </a:p>
+          <a:p>
+            <a:r>
+              <a:rPr lang="en-US" sz="3200" dirty="0" smtClean="0">
+                <a:solidFill>
+                  <a:schemeClr val="bg1">
+                    <a:lumMod val="65000"/>
+                  </a:schemeClr>
+                </a:solidFill>
+              </a:rPr>
+              <a:t>CONOPS</a:t>
+            </a:r>
+          </a:p>
+          <a:p>
+            <a:r>
+              <a:rPr lang="en-US" sz="3200" dirty="0" smtClean="0">
+                <a:solidFill>
+                  <a:schemeClr val="tx1">
+                    <a:lumMod val="85000"/>
+                    <a:lumOff val="15000"/>
+                  </a:schemeClr>
+                </a:solidFill>
+              </a:rPr>
+              <a:t>Risk Assessment</a:t>
+            </a:r>
+          </a:p>
+          <a:p>
+            <a:r>
+              <a:rPr lang="en-US" sz="3200" dirty="0" smtClean="0">
+                <a:solidFill>
+                  <a:schemeClr val="bg1">
+                    <a:lumMod val="65000"/>
+                  </a:schemeClr>
+                </a:solidFill>
+              </a:rPr>
+              <a:t>Schedule</a:t>
+            </a:r>
+          </a:p>
+          <a:p>
+            <a:endParaRPr lang="en-US" sz="4000" dirty="0">
+              <a:solidFill>
+                <a:schemeClr val="bg1">
+                  <a:lumMod val="65000"/>
+                </a:schemeClr>
+              </a:solidFill>
+            </a:endParaRPr>
+          </a:p>
+          <a:p>
+            <a:endParaRPr lang="en-US" dirty="0" smtClean="0">
+              <a:solidFill>
+                <a:schemeClr val="bg1">
+                  <a:lumMod val="65000"/>
+                </a:schemeClr>
+              </a:solidFill>
+            </a:endParaRPr>
+          </a:p>
+        </p:txBody>
+      </p:sp>
+    </p:spTree>
+    <p:extLst>
+      <p:ext uri="{BB962C8B-B14F-4D97-AF65-F5344CB8AC3E}">
+        <p14:creationId xmlns:p14="http://schemas.microsoft.com/office/powerpoint/2010/main" xmlns="" val="1899034955"/>
+      </p:ext>
+    </p:extLst>
+  </p:cSld>
+  <p:clrMapOvr>
+    <a:masterClrMapping/>
+  </p:clrMapOvr>
+  <mc:AlternateContent xmlns:mc="http://schemas.openxmlformats.org/markup-compatibility/2006">
+    <mc:Choice xmlns:p14="http://schemas.microsoft.com/office/powerpoint/2010/main" xmlns="" Requires="p14">
+      <p:transition spd="slow" p14:dur="2000" advTm="1111"/>
+    </mc:Choice>
+    <mc:Fallback>
+      <p:transition spd="slow" advTm="1111"/>
+    </mc:Fallback>
+  </mc:AlternateContent>
+  <p:timing>
+    <p:tnLst>
+      <p:par>
+        <p:cTn id="1" dur="indefinite" restart="never" nodeType="tmRoot"/>
+      </p:par>
+    </p:tnLst>
+  </p:timing>
+</p:sld>
+</file>
+
+<file path=ppt/slides/slide21.xml><?xml version="1.0" encoding="utf-8"?>
+<p:sld xmlns:a="http://schemas.openxmlformats.org/drawingml/2006/main" xmlns:r="http://schemas.openxmlformats.org/officeDocument/2006/relationships" xmlns:p="http://schemas.openxmlformats.org/presentationml/2006/main">
+  <p:cSld>
+    <p:spTree>
+      <p:nvGrpSpPr>
+        <p:cNvPr id="1" name=""/>
+        <p:cNvGrpSpPr/>
+        <p:nvPr/>
+      </p:nvGrpSpPr>
+      <p:grpSpPr>
+        <a:xfrm>
+          <a:off x="0" y="0"/>
+          <a:ext cx="0" cy="0"/>
+          <a:chOff x="0" y="0"/>
+          <a:chExt cx="0" cy="0"/>
+        </a:xfrm>
+      </p:grpSpPr>
+      <p:sp>
+        <p:nvSpPr>
+          <p:cNvPr id="2" name="Title 1"/>
+          <p:cNvSpPr>
+            <a:spLocks noGrp="1"/>
+          </p:cNvSpPr>
+          <p:nvPr>
+            <p:ph type="title"/>
+          </p:nvPr>
+        </p:nvSpPr>
+        <p:spPr/>
+        <p:txBody>
+          <a:bodyPr/>
+          <a:lstStyle/>
+          <a:p>
+            <a:r>
+              <a:rPr lang="en-US" dirty="0" smtClean="0">
+                <a:solidFill>
+                  <a:schemeClr val="tx1">
+                    <a:lumMod val="85000"/>
+                    <a:lumOff val="15000"/>
+                  </a:schemeClr>
+                </a:solidFill>
+              </a:rPr>
+              <a:t>Here be Risk Assessment</a:t>
+            </a:r>
+            <a:endParaRPr lang="en-US" dirty="0">
+              <a:solidFill>
+                <a:schemeClr val="tx1">
+                  <a:lumMod val="85000"/>
+                  <a:lumOff val="15000"/>
+                </a:schemeClr>
+              </a:solidFill>
+            </a:endParaRPr>
+          </a:p>
+        </p:txBody>
+      </p:sp>
+      <p:sp>
+        <p:nvSpPr>
+          <p:cNvPr id="3" name="Content Placeholder 2"/>
+          <p:cNvSpPr>
+            <a:spLocks noGrp="1"/>
+          </p:cNvSpPr>
+          <p:nvPr>
+            <p:ph idx="1"/>
+          </p:nvPr>
+        </p:nvSpPr>
+        <p:spPr/>
+        <p:txBody>
+          <a:bodyPr/>
+          <a:lstStyle/>
+          <a:p>
+            <a:endParaRPr lang="en-US"/>
+          </a:p>
+        </p:txBody>
+      </p:sp>
+      <p:sp>
+        <p:nvSpPr>
+          <p:cNvPr id="4" name="Slide Number Placeholder 3"/>
+          <p:cNvSpPr>
+            <a:spLocks noGrp="1"/>
+          </p:cNvSpPr>
+          <p:nvPr>
+            <p:ph type="sldNum" idx="12"/>
+          </p:nvPr>
+        </p:nvSpPr>
+        <p:spPr/>
+        <p:txBody>
+          <a:bodyPr/>
+          <a:lstStyle/>
+          <a:p>
+            <a:pPr>
+              <a:defRPr/>
+            </a:pPr>
+            <a:fld id="{8C6E2802-7AC4-44BB-B0A5-E12803E0614A}" type="slidenum">
+              <a:rPr lang="en-US" altLang="en-US" smtClean="0"/>
+              <a:pPr>
+                <a:defRPr/>
+              </a:pPr>
+              <a:t>21</a:t>
+            </a:fld>
+            <a:endParaRPr lang="en-US" altLang="en-US" dirty="0"/>
+          </a:p>
+        </p:txBody>
+      </p:sp>
+    </p:spTree>
+  </p:cSld>
+  <p:clrMapOvr>
+    <a:masterClrMapping/>
+  </p:clrMapOvr>
+</p:sld>
+</file>
+
+<file path=ppt/slides/slide22.xml><?xml version="1.0" encoding="utf-8"?>
+<p:sld xmlns:a="http://schemas.openxmlformats.org/drawingml/2006/main" xmlns:r="http://schemas.openxmlformats.org/officeDocument/2006/relationships" xmlns:p="http://schemas.openxmlformats.org/presentationml/2006/main">
+  <p:cSld>
+    <p:spTree>
+      <p:nvGrpSpPr>
+        <p:cNvPr id="1" name=""/>
+        <p:cNvGrpSpPr/>
+        <p:nvPr/>
+      </p:nvGrpSpPr>
+      <p:grpSpPr>
+        <a:xfrm>
+          <a:off x="0" y="0"/>
+          <a:ext cx="0" cy="0"/>
+          <a:chOff x="0" y="0"/>
+          <a:chExt cx="0" cy="0"/>
+        </a:xfrm>
+      </p:grpSpPr>
+      <p:sp>
+        <p:nvSpPr>
+          <p:cNvPr id="2" name="Subtitle 1"/>
+          <p:cNvSpPr>
+            <a:spLocks noGrp="1"/>
+          </p:cNvSpPr>
+          <p:nvPr>
+            <p:ph type="subTitle" idx="1"/>
+          </p:nvPr>
+        </p:nvSpPr>
+        <p:spPr>
+          <a:xfrm>
+            <a:off x="1456531" y="971338"/>
+            <a:ext cx="7053104" cy="6591512"/>
+          </a:xfrm>
+        </p:spPr>
+        <p:txBody>
+          <a:bodyPr/>
+          <a:lstStyle/>
+          <a:p>
+            <a:r>
+              <a:rPr lang="en-US" sz="3200" dirty="0" smtClean="0">
+                <a:solidFill>
+                  <a:schemeClr val="bg1">
+                    <a:lumMod val="65000"/>
+                  </a:schemeClr>
+                </a:solidFill>
+              </a:rPr>
+              <a:t>Group Organization</a:t>
+            </a:r>
+            <a:endParaRPr lang="en-US" sz="3200" dirty="0" smtClean="0">
+              <a:solidFill>
+                <a:schemeClr val="bg1">
+                  <a:lumMod val="65000"/>
+                </a:schemeClr>
+              </a:solidFill>
+            </a:endParaRPr>
+          </a:p>
+          <a:p>
+            <a:r>
+              <a:rPr lang="en-US" sz="3200" dirty="0" smtClean="0">
+                <a:solidFill>
+                  <a:schemeClr val="bg1">
+                    <a:lumMod val="65000"/>
+                  </a:schemeClr>
+                </a:solidFill>
+              </a:rPr>
+              <a:t>Project Overview</a:t>
+            </a:r>
+          </a:p>
+          <a:p>
+            <a:r>
+              <a:rPr lang="en-US" sz="3200" dirty="0" smtClean="0">
+                <a:solidFill>
+                  <a:schemeClr val="bg1">
+                    <a:lumMod val="65000"/>
+                  </a:schemeClr>
+                </a:solidFill>
+              </a:rPr>
+              <a:t>Design Constraints</a:t>
+            </a:r>
+            <a:endParaRPr lang="en-US" sz="3200" dirty="0" smtClean="0">
+              <a:solidFill>
+                <a:schemeClr val="bg1">
+                  <a:lumMod val="65000"/>
+                </a:schemeClr>
+              </a:solidFill>
+            </a:endParaRPr>
+          </a:p>
+          <a:p>
+            <a:r>
+              <a:rPr lang="en-US" sz="3200" dirty="0" smtClean="0">
+                <a:solidFill>
+                  <a:schemeClr val="bg1">
+                    <a:lumMod val="65000"/>
+                  </a:schemeClr>
+                </a:solidFill>
+              </a:rPr>
+              <a:t>Mission Architecture</a:t>
+            </a:r>
+          </a:p>
+          <a:p>
+            <a:r>
+              <a:rPr lang="en-US" sz="3200" dirty="0" smtClean="0">
+                <a:solidFill>
+                  <a:schemeClr val="bg1">
+                    <a:lumMod val="65000"/>
+                  </a:schemeClr>
+                </a:solidFill>
+              </a:rPr>
+              <a:t>CONOPS</a:t>
+            </a:r>
+          </a:p>
+          <a:p>
+            <a:r>
+              <a:rPr lang="en-US" sz="3200" dirty="0" smtClean="0">
+                <a:solidFill>
+                  <a:schemeClr val="bg1">
+                    <a:lumMod val="65000"/>
+                  </a:schemeClr>
+                </a:solidFill>
+              </a:rPr>
+              <a:t>Risk Assessment</a:t>
+            </a:r>
+          </a:p>
+          <a:p>
+            <a:r>
+              <a:rPr lang="en-US" sz="3200" dirty="0" smtClean="0">
+                <a:solidFill>
+                  <a:schemeClr val="tx1"/>
+                </a:solidFill>
+              </a:rPr>
+              <a:t>Schedule</a:t>
+            </a:r>
+          </a:p>
+          <a:p>
+            <a:endParaRPr lang="en-US" sz="4000" dirty="0">
+              <a:solidFill>
+                <a:schemeClr val="bg1">
+                  <a:lumMod val="65000"/>
+                </a:schemeClr>
+              </a:solidFill>
+            </a:endParaRPr>
+          </a:p>
+          <a:p>
+            <a:endParaRPr lang="en-US" dirty="0" smtClean="0">
+              <a:solidFill>
+                <a:schemeClr val="bg1">
+                  <a:lumMod val="65000"/>
+                </a:schemeClr>
+              </a:solidFill>
+            </a:endParaRPr>
+          </a:p>
+        </p:txBody>
+      </p:sp>
+    </p:spTree>
+    <p:extLst>
+      <p:ext uri="{BB962C8B-B14F-4D97-AF65-F5344CB8AC3E}">
+        <p14:creationId xmlns:p14="http://schemas.microsoft.com/office/powerpoint/2010/main" xmlns="" val="1899034955"/>
+      </p:ext>
+    </p:extLst>
+  </p:cSld>
+  <p:clrMapOvr>
+    <a:masterClrMapping/>
+  </p:clrMapOvr>
+  <mc:AlternateContent xmlns:mc="http://schemas.openxmlformats.org/markup-compatibility/2006">
+    <mc:Choice xmlns:p14="http://schemas.microsoft.com/office/powerpoint/2010/main" xmlns="" Requires="p14">
+      <p:transition spd="slow" p14:dur="2000" advTm="1111"/>
+    </mc:Choice>
+    <mc:Fallback>
+      <p:transition spd="slow" advTm="1111"/>
+    </mc:Fallback>
+  </mc:AlternateContent>
+  <p:timing>
+    <p:tnLst>
+      <p:par>
+        <p:cTn id="1" dur="indefinite" restart="never" nodeType="tmRoot"/>
+      </p:par>
+    </p:tnLst>
+  </p:timing>
+</p:sld>
+</file>
+
+<file path=ppt/slides/slide23.xml><?xml version="1.0" encoding="utf-8"?>
+<p:sld xmlns:a="http://schemas.openxmlformats.org/drawingml/2006/main" xmlns:r="http://schemas.openxmlformats.org/officeDocument/2006/relationships" xmlns:p="http://schemas.openxmlformats.org/presentationml/2006/main">
+  <p:cSld>
+    <p:spTree>
+      <p:nvGrpSpPr>
+        <p:cNvPr id="1" name=""/>
+        <p:cNvGrpSpPr/>
+        <p:nvPr/>
+      </p:nvGrpSpPr>
+      <p:grpSpPr>
+        <a:xfrm>
+          <a:off x="0" y="0"/>
+          <a:ext cx="0" cy="0"/>
+          <a:chOff x="0" y="0"/>
+          <a:chExt cx="0" cy="0"/>
+        </a:xfrm>
+      </p:grpSpPr>
+      <p:sp>
+        <p:nvSpPr>
+          <p:cNvPr id="2" name="Title 1"/>
+          <p:cNvSpPr>
+            <a:spLocks noGrp="1"/>
+          </p:cNvSpPr>
+          <p:nvPr>
+            <p:ph type="title"/>
+          </p:nvPr>
+        </p:nvSpPr>
+        <p:spPr/>
+        <p:txBody>
+          <a:bodyPr/>
+          <a:lstStyle/>
+          <a:p>
+            <a:r>
+              <a:rPr lang="en-US" dirty="0" smtClean="0">
+                <a:solidFill>
+                  <a:schemeClr val="tx1">
+                    <a:lumMod val="85000"/>
+                    <a:lumOff val="15000"/>
+                  </a:schemeClr>
+                </a:solidFill>
+              </a:rPr>
+              <a:t>Here be Schedule</a:t>
+            </a:r>
+            <a:endParaRPr lang="en-US" dirty="0">
+              <a:solidFill>
+                <a:schemeClr val="tx1">
+                  <a:lumMod val="85000"/>
+                  <a:lumOff val="15000"/>
+                </a:schemeClr>
+              </a:solidFill>
+            </a:endParaRPr>
+          </a:p>
+        </p:txBody>
+      </p:sp>
+      <p:sp>
+        <p:nvSpPr>
+          <p:cNvPr id="3" name="Content Placeholder 2"/>
+          <p:cNvSpPr>
+            <a:spLocks noGrp="1"/>
+          </p:cNvSpPr>
+          <p:nvPr>
+            <p:ph idx="1"/>
+          </p:nvPr>
+        </p:nvSpPr>
+        <p:spPr/>
+        <p:txBody>
+          <a:bodyPr/>
+          <a:lstStyle/>
+          <a:p>
+            <a:endParaRPr lang="en-US"/>
+          </a:p>
+        </p:txBody>
+      </p:sp>
+      <p:sp>
+        <p:nvSpPr>
+          <p:cNvPr id="4" name="Slide Number Placeholder 3"/>
+          <p:cNvSpPr>
+            <a:spLocks noGrp="1"/>
+          </p:cNvSpPr>
+          <p:nvPr>
+            <p:ph type="sldNum" idx="12"/>
+          </p:nvPr>
+        </p:nvSpPr>
+        <p:spPr/>
+        <p:txBody>
+          <a:bodyPr/>
+          <a:lstStyle/>
+          <a:p>
+            <a:pPr>
+              <a:defRPr/>
+            </a:pPr>
+            <a:fld id="{8C6E2802-7AC4-44BB-B0A5-E12803E0614A}" type="slidenum">
+              <a:rPr lang="en-US" altLang="en-US" smtClean="0"/>
+              <a:pPr>
+                <a:defRPr/>
+              </a:pPr>
+              <a:t>23</a:t>
+            </a:fld>
+            <a:endParaRPr lang="en-US" altLang="en-US" dirty="0"/>
+          </a:p>
+        </p:txBody>
+      </p:sp>
+    </p:spTree>
+  </p:cSld>
+  <p:clrMapOvr>
+    <a:masterClrMapping/>
+  </p:clrMapOvr>
+</p:sld>
+</file>
+
+<file path=ppt/slides/slide24.xml><?xml version="1.0" encoding="utf-8"?>
+<p:sld xmlns:a="http://schemas.openxmlformats.org/drawingml/2006/main" xmlns:r="http://schemas.openxmlformats.org/officeDocument/2006/relationships" xmlns:p="http://schemas.openxmlformats.org/presentationml/2006/main">
+  <p:cSld>
+    <p:spTree>
+      <p:nvGrpSpPr>
+        <p:cNvPr id="1" name=""/>
+        <p:cNvGrpSpPr/>
+        <p:nvPr/>
+      </p:nvGrpSpPr>
+      <p:grpSpPr>
+        <a:xfrm>
+          <a:off x="0" y="0"/>
+          <a:ext cx="0" cy="0"/>
+          <a:chOff x="0" y="0"/>
+          <a:chExt cx="0" cy="0"/>
+        </a:xfrm>
+      </p:grpSpPr>
+      <p:pic>
+        <p:nvPicPr>
+          <p:cNvPr id="7170" name="Picture 1"/>
+          <p:cNvPicPr>
+            <a:picLocks noChangeAspect="1" noChangeArrowheads="1"/>
+          </p:cNvPicPr>
+          <p:nvPr/>
+        </p:nvPicPr>
+        <p:blipFill>
+          <a:blip r:embed="rId3" cstate="print">
+            <a:extLst>
+              <a:ext uri="{28A0092B-C50C-407E-A947-70E740481C1C}">
+                <a14:useLocalDpi xmlns="" xmlns:a14="http://schemas.microsoft.com/office/drawing/2010/main" val="0"/>
+              </a:ext>
+            </a:extLst>
+          </a:blip>
+          <a:srcRect/>
+          <a:stretch>
+            <a:fillRect/>
+          </a:stretch>
+        </p:blipFill>
+        <p:spPr bwMode="auto">
+          <a:xfrm>
+            <a:off x="7552531" y="352425"/>
+            <a:ext cx="2523332" cy="2333313"/>
+          </a:xfrm>
+          <a:prstGeom prst="rect">
+            <a:avLst/>
+          </a:prstGeom>
+          <a:noFill/>
+          <a:ln>
+            <a:noFill/>
+          </a:ln>
+          <a:effectLst/>
+          <a:extLst>
+            <a:ext uri="{909E8E84-426E-40DD-AFC4-6F175D3DCCD1}">
+              <a14:hiddenFill xmlns="" xmlns:a14="http://schemas.microsoft.com/office/drawing/2010/main">
+                <a:blipFill dpi="0" rotWithShape="0">
+                  <a:blip/>
+                  <a:srcRect/>
+                  <a:stretch>
+                    <a:fillRect/>
+                  </a:stretch>
+                </a:blipFill>
+              </a14:hiddenFill>
+            </a:ext>
+            <a:ext uri="{91240B29-F687-4F45-9708-019B960494DF}">
+              <a14:hiddenLine xmlns="" xmlns:a14="http://schemas.microsoft.com/office/drawing/2010/main" w="9525">
+                <a:solidFill>
+                  <a:srgbClr val="808080"/>
+                </a:solidFill>
+                <a:round/>
+                <a:headEnd/>
+                <a:tailEnd/>
+              </a14:hiddenLine>
+            </a:ext>
+            <a:ext uri="{AF507438-7753-43E0-B8FC-AC1667EBCBE1}">
+              <a14:hiddenEffects xmlns="" xmlns:a14="http://schemas.microsoft.com/office/drawing/2010/main">
+                <a:effectLst>
+                  <a:outerShdw dist="35921" dir="2700000" algn="ctr" rotWithShape="0">
+                    <a:srgbClr val="808080"/>
+                  </a:outerShdw>
+                </a:effectLst>
+              </a14:hiddenEffects>
+            </a:ext>
+          </a:extLst>
+        </p:spPr>
+      </p:pic>
+      <p:sp>
+        <p:nvSpPr>
+          <p:cNvPr id="7171" name="Text Box 2"/>
+          <p:cNvSpPr txBox="1">
+            <a:spLocks noChangeArrowheads="1"/>
+          </p:cNvSpPr>
+          <p:nvPr/>
+        </p:nvSpPr>
+        <p:spPr bwMode="auto">
+          <a:xfrm>
+            <a:off x="1913731" y="1647825"/>
+            <a:ext cx="6281737" cy="4930775"/>
+          </a:xfrm>
+          <a:prstGeom prst="rect">
+            <a:avLst/>
+          </a:prstGeom>
+          <a:noFill/>
+          <a:ln>
+            <a:noFill/>
+          </a:ln>
+          <a:effectLst/>
+          <a:extLst>
+            <a:ext uri="{909E8E84-426E-40DD-AFC4-6F175D3DCCD1}">
+              <a14:hiddenFill xmlns="" xmlns:a14="http://schemas.microsoft.com/office/drawing/2010/main">
+                <a:solidFill>
+                  <a:srgbClr val="FFFFFF"/>
+                </a:solidFill>
+              </a14:hiddenFill>
+            </a:ext>
+            <a:ext uri="{91240B29-F687-4F45-9708-019B960494DF}">
+              <a14:hiddenLine xmlns="" xmlns:a14="http://schemas.microsoft.com/office/drawing/2010/main" w="9525">
+                <a:solidFill>
+                  <a:srgbClr val="808080"/>
+                </a:solidFill>
+                <a:round/>
+                <a:headEnd/>
+                <a:tailEnd/>
+              </a14:hiddenLine>
+            </a:ext>
+            <a:ext uri="{AF507438-7753-43E0-B8FC-AC1667EBCBE1}">
+              <a14:hiddenEffects xmlns="" xmlns:a14="http://schemas.microsoft.com/office/drawing/2010/main">
+                <a:effectLst>
+                  <a:outerShdw dist="35921" dir="2700000" algn="ctr" rotWithShape="0">
+                    <a:srgbClr val="808080"/>
+                  </a:outerShdw>
+                </a:effectLst>
+              </a14:hiddenEffects>
+            </a:ext>
+          </a:extLst>
+        </p:spPr>
+        <p:txBody>
+          <a:bodyPr lIns="0" tIns="28080" rIns="0" bIns="0" anchor="ctr"/>
+          <a:lstStyle>
+            <a:lvl1pPr eaLnBrk="0">
+              <a:tabLst>
+                <a:tab pos="0" algn="l"/>
+                <a:tab pos="457200" algn="l"/>
+                <a:tab pos="914400" algn="l"/>
+                <a:tab pos="1371600" algn="l"/>
+                <a:tab pos="1828800" algn="l"/>
+                <a:tab pos="2286000" algn="l"/>
+                <a:tab pos="2743200" algn="l"/>
+                <a:tab pos="3200400" algn="l"/>
+                <a:tab pos="3657600" algn="l"/>
+                <a:tab pos="4114800" algn="l"/>
+                <a:tab pos="4572000" algn="l"/>
+                <a:tab pos="5029200" algn="l"/>
+                <a:tab pos="5486400" algn="l"/>
+                <a:tab pos="5943600" algn="l"/>
+                <a:tab pos="6400800" algn="l"/>
+                <a:tab pos="6858000" algn="l"/>
+                <a:tab pos="7315200" algn="l"/>
+                <a:tab pos="7772400" algn="l"/>
+                <a:tab pos="8229600" algn="l"/>
+                <a:tab pos="8686800" algn="l"/>
+                <a:tab pos="9144000" algn="l"/>
+              </a:tabLst>
+              <a:defRPr>
+                <a:solidFill>
+                  <a:schemeClr val="bg1"/>
+                </a:solidFill>
+                <a:latin typeface="Arial" charset="0"/>
+                <a:ea typeface="Microsoft YaHei" charset="-122"/>
+              </a:defRPr>
+            </a:lvl1pPr>
+            <a:lvl2pPr eaLnBrk="0">
+              <a:tabLst>
+                <a:tab pos="0" algn="l"/>
+                <a:tab pos="457200" algn="l"/>
+                <a:tab pos="914400" algn="l"/>
+                <a:tab pos="1371600" algn="l"/>
+                <a:tab pos="1828800" algn="l"/>
+                <a:tab pos="2286000" algn="l"/>
+                <a:tab pos="2743200" algn="l"/>
+                <a:tab pos="3200400" algn="l"/>
+                <a:tab pos="3657600" algn="l"/>
+                <a:tab pos="4114800" algn="l"/>
+                <a:tab pos="4572000" algn="l"/>
+                <a:tab pos="5029200" algn="l"/>
+                <a:tab pos="5486400" algn="l"/>
+                <a:tab pos="5943600" algn="l"/>
+                <a:tab pos="6400800" algn="l"/>
+                <a:tab pos="6858000" algn="l"/>
+                <a:tab pos="7315200" algn="l"/>
+                <a:tab pos="7772400" algn="l"/>
+                <a:tab pos="8229600" algn="l"/>
+                <a:tab pos="8686800" algn="l"/>
+                <a:tab pos="9144000" algn="l"/>
+              </a:tabLst>
+              <a:defRPr>
+                <a:solidFill>
+                  <a:schemeClr val="bg1"/>
+                </a:solidFill>
+                <a:latin typeface="Arial" charset="0"/>
+                <a:ea typeface="Microsoft YaHei" charset="-122"/>
+              </a:defRPr>
+            </a:lvl2pPr>
+            <a:lvl3pPr eaLnBrk="0">
+              <a:tabLst>
+                <a:tab pos="0" algn="l"/>
+                <a:tab pos="457200" algn="l"/>
+                <a:tab pos="914400" algn="l"/>
+                <a:tab pos="1371600" algn="l"/>
+                <a:tab pos="1828800" algn="l"/>
+                <a:tab pos="2286000" algn="l"/>
+                <a:tab pos="2743200" algn="l"/>
+                <a:tab pos="3200400" algn="l"/>
+                <a:tab pos="3657600" algn="l"/>
+                <a:tab pos="4114800" algn="l"/>
+                <a:tab pos="4572000" algn="l"/>
+                <a:tab pos="5029200" algn="l"/>
+                <a:tab pos="5486400" algn="l"/>
+                <a:tab pos="5943600" algn="l"/>
+                <a:tab pos="6400800" algn="l"/>
+                <a:tab pos="6858000" algn="l"/>
+                <a:tab pos="7315200" algn="l"/>
+                <a:tab pos="7772400" algn="l"/>
+                <a:tab pos="8229600" algn="l"/>
+                <a:tab pos="8686800" algn="l"/>
+                <a:tab pos="9144000" algn="l"/>
+              </a:tabLst>
+              <a:defRPr>
+                <a:solidFill>
+                  <a:schemeClr val="bg1"/>
+                </a:solidFill>
+                <a:latin typeface="Arial" charset="0"/>
+                <a:ea typeface="Microsoft YaHei" charset="-122"/>
+              </a:defRPr>
+            </a:lvl3pPr>
+            <a:lvl4pPr eaLnBrk="0">
+              <a:tabLst>
+                <a:tab pos="0" algn="l"/>
+                <a:tab pos="457200" algn="l"/>
+                <a:tab pos="914400" algn="l"/>
+                <a:tab pos="1371600" algn="l"/>
+                <a:tab pos="1828800" algn="l"/>
+                <a:tab pos="2286000" algn="l"/>
+                <a:tab pos="2743200" algn="l"/>
+                <a:tab pos="3200400" algn="l"/>
+                <a:tab pos="3657600" algn="l"/>
+                <a:tab pos="4114800" algn="l"/>
+                <a:tab pos="4572000" algn="l"/>
+                <a:tab pos="5029200" algn="l"/>
+                <a:tab pos="5486400" algn="l"/>
+                <a:tab pos="5943600" algn="l"/>
+                <a:tab pos="6400800" algn="l"/>
+                <a:tab pos="6858000" algn="l"/>
+                <a:tab pos="7315200" algn="l"/>
+                <a:tab pos="7772400" algn="l"/>
+                <a:tab pos="8229600" algn="l"/>
+                <a:tab pos="8686800" algn="l"/>
+                <a:tab pos="9144000" algn="l"/>
+              </a:tabLst>
+              <a:defRPr>
+                <a:solidFill>
+                  <a:schemeClr val="bg1"/>
+                </a:solidFill>
+                <a:latin typeface="Arial" charset="0"/>
+                <a:ea typeface="Microsoft YaHei" charset="-122"/>
+              </a:defRPr>
+            </a:lvl4pPr>
+            <a:lvl5pPr eaLnBrk="0">
+              <a:tabLst>
+                <a:tab pos="0" algn="l"/>
+                <a:tab pos="457200" algn="l"/>
+                <a:tab pos="914400" algn="l"/>
+                <a:tab pos="1371600" algn="l"/>
+                <a:tab pos="1828800" algn="l"/>
+                <a:tab pos="2286000" algn="l"/>
+                <a:tab pos="2743200" algn="l"/>
+                <a:tab pos="3200400" algn="l"/>
+                <a:tab pos="3657600" algn="l"/>
+                <a:tab pos="4114800" algn="l"/>
+                <a:tab pos="4572000" algn="l"/>
+                <a:tab pos="5029200" algn="l"/>
+                <a:tab pos="5486400" algn="l"/>
+                <a:tab pos="5943600" algn="l"/>
+                <a:tab pos="6400800" algn="l"/>
+                <a:tab pos="6858000" algn="l"/>
+                <a:tab pos="7315200" algn="l"/>
+                <a:tab pos="7772400" algn="l"/>
+                <a:tab pos="8229600" algn="l"/>
+                <a:tab pos="8686800" algn="l"/>
+                <a:tab pos="9144000" algn="l"/>
+              </a:tabLst>
+              <a:defRPr>
+                <a:solidFill>
+                  <a:schemeClr val="bg1"/>
+                </a:solidFill>
+                <a:latin typeface="Arial" charset="0"/>
+                <a:ea typeface="Microsoft YaHei" charset="-122"/>
+              </a:defRPr>
+            </a:lvl5pPr>
+            <a:lvl6pPr marL="2514600" indent="-228600" defTabSz="457200" eaLnBrk="0" fontAlgn="base" hangingPunct="0">
+              <a:lnSpc>
+                <a:spcPct val="93000"/>
+              </a:lnSpc>
+              <a:spcBef>
+                <a:spcPct val="0"/>
+              </a:spcBef>
+              <a:spcAft>
+                <a:spcPct val="0"/>
+              </a:spcAft>
+              <a:buClr>
+                <a:srgbClr val="000000"/>
+              </a:buClr>
+              <a:buSzPct val="100000"/>
+              <a:buFont typeface="Times New Roman" pitchFamily="16" charset="0"/>
+              <a:tabLst>
+                <a:tab pos="0" algn="l"/>
+                <a:tab pos="457200" algn="l"/>
+                <a:tab pos="914400" algn="l"/>
+                <a:tab pos="1371600" algn="l"/>
+                <a:tab pos="1828800" algn="l"/>
+                <a:tab pos="2286000" algn="l"/>
+                <a:tab pos="2743200" algn="l"/>
+                <a:tab pos="3200400" algn="l"/>
+                <a:tab pos="3657600" algn="l"/>
+                <a:tab pos="4114800" algn="l"/>
+                <a:tab pos="4572000" algn="l"/>
+                <a:tab pos="5029200" algn="l"/>
+                <a:tab pos="5486400" algn="l"/>
+                <a:tab pos="5943600" algn="l"/>
+                <a:tab pos="6400800" algn="l"/>
+                <a:tab pos="6858000" algn="l"/>
+                <a:tab pos="7315200" algn="l"/>
+                <a:tab pos="7772400" algn="l"/>
+                <a:tab pos="8229600" algn="l"/>
+                <a:tab pos="8686800" algn="l"/>
+                <a:tab pos="9144000" algn="l"/>
+              </a:tabLst>
+              <a:defRPr>
+                <a:solidFill>
+                  <a:schemeClr val="bg1"/>
+                </a:solidFill>
+                <a:latin typeface="Arial" charset="0"/>
+                <a:ea typeface="Microsoft YaHei" charset="-122"/>
+              </a:defRPr>
+            </a:lvl6pPr>
+            <a:lvl7pPr marL="2971800" indent="-228600" defTabSz="457200" eaLnBrk="0" fontAlgn="base" hangingPunct="0">
+              <a:lnSpc>
+                <a:spcPct val="93000"/>
+              </a:lnSpc>
+              <a:spcBef>
+                <a:spcPct val="0"/>
+              </a:spcBef>
+              <a:spcAft>
+                <a:spcPct val="0"/>
+              </a:spcAft>
+              <a:buClr>
+                <a:srgbClr val="000000"/>
+              </a:buClr>
+              <a:buSzPct val="100000"/>
+              <a:buFont typeface="Times New Roman" pitchFamily="16" charset="0"/>
+              <a:tabLst>
+                <a:tab pos="0" algn="l"/>
+                <a:tab pos="457200" algn="l"/>
+                <a:tab pos="914400" algn="l"/>
+                <a:tab pos="1371600" algn="l"/>
+                <a:tab pos="1828800" algn="l"/>
+                <a:tab pos="2286000" algn="l"/>
+                <a:tab pos="2743200" algn="l"/>
+                <a:tab pos="3200400" algn="l"/>
+                <a:tab pos="3657600" algn="l"/>
+                <a:tab pos="4114800" algn="l"/>
+                <a:tab pos="4572000" algn="l"/>
+                <a:tab pos="5029200" algn="l"/>
+                <a:tab pos="5486400" algn="l"/>
+                <a:tab pos="5943600" algn="l"/>
+                <a:tab pos="6400800" algn="l"/>
+                <a:tab pos="6858000" algn="l"/>
+                <a:tab pos="7315200" algn="l"/>
+                <a:tab pos="7772400" algn="l"/>
+                <a:tab pos="8229600" algn="l"/>
+                <a:tab pos="8686800" algn="l"/>
+                <a:tab pos="9144000" algn="l"/>
+              </a:tabLst>
+              <a:defRPr>
+                <a:solidFill>
+                  <a:schemeClr val="bg1"/>
+                </a:solidFill>
+                <a:latin typeface="Arial" charset="0"/>
+                <a:ea typeface="Microsoft YaHei" charset="-122"/>
+              </a:defRPr>
+            </a:lvl7pPr>
+            <a:lvl8pPr marL="3429000" indent="-228600" defTabSz="457200" eaLnBrk="0" fontAlgn="base" hangingPunct="0">
+              <a:lnSpc>
+                <a:spcPct val="93000"/>
+              </a:lnSpc>
+              <a:spcBef>
+                <a:spcPct val="0"/>
+              </a:spcBef>
+              <a:spcAft>
+                <a:spcPct val="0"/>
+              </a:spcAft>
+              <a:buClr>
+                <a:srgbClr val="000000"/>
+              </a:buClr>
+              <a:buSzPct val="100000"/>
+              <a:buFont typeface="Times New Roman" pitchFamily="16" charset="0"/>
+              <a:tabLst>
+                <a:tab pos="0" algn="l"/>
+                <a:tab pos="457200" algn="l"/>
+                <a:tab pos="914400" algn="l"/>
+                <a:tab pos="1371600" algn="l"/>
+                <a:tab pos="1828800" algn="l"/>
+                <a:tab pos="2286000" algn="l"/>
+                <a:tab pos="2743200" algn="l"/>
+                <a:tab pos="3200400" algn="l"/>
+                <a:tab pos="3657600" algn="l"/>
+                <a:tab pos="4114800" algn="l"/>
+                <a:tab pos="4572000" algn="l"/>
+                <a:tab pos="5029200" algn="l"/>
+                <a:tab pos="5486400" algn="l"/>
+                <a:tab pos="5943600" algn="l"/>
+                <a:tab pos="6400800" algn="l"/>
+                <a:tab pos="6858000" algn="l"/>
+                <a:tab pos="7315200" algn="l"/>
+                <a:tab pos="7772400" algn="l"/>
+                <a:tab pos="8229600" algn="l"/>
+                <a:tab pos="8686800" algn="l"/>
+                <a:tab pos="9144000" algn="l"/>
+              </a:tabLst>
+              <a:defRPr>
+                <a:solidFill>
+                  <a:schemeClr val="bg1"/>
+                </a:solidFill>
+                <a:latin typeface="Arial" charset="0"/>
+                <a:ea typeface="Microsoft YaHei" charset="-122"/>
+              </a:defRPr>
+            </a:lvl8pPr>
+            <a:lvl9pPr marL="3886200" indent="-228600" defTabSz="457200" eaLnBrk="0" fontAlgn="base" hangingPunct="0">
+              <a:lnSpc>
+                <a:spcPct val="93000"/>
+              </a:lnSpc>
+              <a:spcBef>
+                <a:spcPct val="0"/>
+              </a:spcBef>
+              <a:spcAft>
+                <a:spcPct val="0"/>
+              </a:spcAft>
+              <a:buClr>
+                <a:srgbClr val="000000"/>
+              </a:buClr>
+              <a:buSzPct val="100000"/>
+              <a:buFont typeface="Times New Roman" pitchFamily="16" charset="0"/>
+              <a:tabLst>
+                <a:tab pos="0" algn="l"/>
+                <a:tab pos="457200" algn="l"/>
+                <a:tab pos="914400" algn="l"/>
+                <a:tab pos="1371600" algn="l"/>
+                <a:tab pos="1828800" algn="l"/>
+                <a:tab pos="2286000" algn="l"/>
+                <a:tab pos="2743200" algn="l"/>
+                <a:tab pos="3200400" algn="l"/>
+                <a:tab pos="3657600" algn="l"/>
+                <a:tab pos="4114800" algn="l"/>
+                <a:tab pos="4572000" algn="l"/>
+                <a:tab pos="5029200" algn="l"/>
+                <a:tab pos="5486400" algn="l"/>
+                <a:tab pos="5943600" algn="l"/>
+                <a:tab pos="6400800" algn="l"/>
+                <a:tab pos="6858000" algn="l"/>
+                <a:tab pos="7315200" algn="l"/>
+                <a:tab pos="7772400" algn="l"/>
+                <a:tab pos="8229600" algn="l"/>
+                <a:tab pos="8686800" algn="l"/>
+                <a:tab pos="9144000" algn="l"/>
+              </a:tabLst>
+              <a:defRPr>
+                <a:solidFill>
+                  <a:schemeClr val="bg1"/>
+                </a:solidFill>
+                <a:latin typeface="Arial" charset="0"/>
+                <a:ea typeface="Microsoft YaHei" charset="-122"/>
+              </a:defRPr>
+            </a:lvl9pPr>
+          </a:lstStyle>
+          <a:p>
+            <a:pPr algn="ctr" eaLnBrk="1">
+              <a:buClrTx/>
+              <a:buFontTx/>
+              <a:buNone/>
+            </a:pPr>
+            <a:r>
+              <a:rPr lang="en-US" altLang="en-US" sz="2400" b="1" dirty="0" smtClean="0">
+                <a:solidFill>
+                  <a:srgbClr val="000000"/>
+                </a:solidFill>
+              </a:rPr>
+              <a:t>Questions?</a:t>
+            </a:r>
+            <a:endParaRPr lang="en-US" altLang="en-US" sz="2400" dirty="0" smtClean="0">
+              <a:solidFill>
+                <a:srgbClr val="000000"/>
+              </a:solidFill>
+            </a:endParaRPr>
+          </a:p>
+          <a:p>
+            <a:pPr algn="ctr" eaLnBrk="1">
+              <a:buClrTx/>
+              <a:buFontTx/>
+              <a:buNone/>
+            </a:pPr>
+            <a:endParaRPr lang="en-US" altLang="en-US" sz="2400" dirty="0" smtClean="0">
+              <a:solidFill>
+                <a:srgbClr val="000000"/>
+              </a:solidFill>
+            </a:endParaRPr>
+          </a:p>
+          <a:p>
+            <a:pPr algn="ctr" eaLnBrk="1">
+              <a:buClrTx/>
+              <a:buFontTx/>
+              <a:buNone/>
+            </a:pPr>
+            <a:r>
+              <a:rPr lang="en-US" altLang="en-US" dirty="0" smtClean="0">
+                <a:solidFill>
+                  <a:srgbClr val="000000"/>
+                </a:solidFill>
+              </a:rPr>
+              <a:t>Jennifer Babb</a:t>
+            </a:r>
+          </a:p>
+          <a:p>
+            <a:pPr algn="ctr" eaLnBrk="1">
+              <a:buClrTx/>
+              <a:buFontTx/>
+              <a:buNone/>
+            </a:pPr>
+            <a:r>
+              <a:rPr lang="en-US" altLang="en-US" dirty="0" smtClean="0">
+                <a:solidFill>
+                  <a:srgbClr val="000000"/>
+                </a:solidFill>
+              </a:rPr>
+              <a:t>Bryant </a:t>
+            </a:r>
+            <a:r>
+              <a:rPr lang="en-US" altLang="en-US" dirty="0" err="1" smtClean="0">
+                <a:solidFill>
+                  <a:srgbClr val="000000"/>
+                </a:solidFill>
+              </a:rPr>
+              <a:t>Gaume</a:t>
+            </a:r>
+            <a:endParaRPr lang="en-US" altLang="en-US" dirty="0" smtClean="0">
+              <a:solidFill>
+                <a:srgbClr val="000000"/>
+              </a:solidFill>
+            </a:endParaRPr>
+          </a:p>
+          <a:p>
+            <a:pPr algn="ctr" eaLnBrk="1">
+              <a:buClrTx/>
+              <a:buFontTx/>
+              <a:buNone/>
+            </a:pPr>
+            <a:r>
+              <a:rPr lang="en-US" altLang="en-US" dirty="0" smtClean="0">
+                <a:solidFill>
+                  <a:srgbClr val="000000"/>
+                </a:solidFill>
+              </a:rPr>
+              <a:t>Tom Moline</a:t>
+            </a:r>
+          </a:p>
+          <a:p>
+            <a:pPr algn="ctr" eaLnBrk="1">
+              <a:buClrTx/>
+              <a:buFontTx/>
+              <a:buNone/>
+            </a:pPr>
+            <a:r>
+              <a:rPr lang="en-US" altLang="en-US" dirty="0" smtClean="0">
+                <a:solidFill>
+                  <a:srgbClr val="000000"/>
+                </a:solidFill>
+              </a:rPr>
+              <a:t>Tyler Olson</a:t>
+            </a:r>
+          </a:p>
+          <a:p>
+            <a:pPr algn="ctr" eaLnBrk="1">
+              <a:buClrTx/>
+              <a:buFontTx/>
+              <a:buNone/>
+            </a:pPr>
+            <a:r>
+              <a:rPr lang="en-US" altLang="en-US" dirty="0" smtClean="0">
+                <a:solidFill>
+                  <a:srgbClr val="000000"/>
+                </a:solidFill>
+              </a:rPr>
+              <a:t>Nate Richard</a:t>
+            </a:r>
+            <a:endParaRPr lang="en-US" altLang="en-US" dirty="0">
+              <a:solidFill>
+                <a:srgbClr val="000000"/>
+              </a:solidFill>
+            </a:endParaRPr>
+          </a:p>
+          <a:p>
+            <a:pPr algn="ctr" eaLnBrk="1">
+              <a:buClrTx/>
+              <a:buFontTx/>
+              <a:buNone/>
+            </a:pPr>
+            <a:endParaRPr lang="en-US" altLang="en-US" sz="2800" dirty="0">
+              <a:solidFill>
+                <a:srgbClr val="000000"/>
+              </a:solidFill>
+            </a:endParaRPr>
+          </a:p>
+          <a:p>
+            <a:pPr algn="ctr" eaLnBrk="1">
+              <a:buClrTx/>
+              <a:buFontTx/>
+              <a:buNone/>
+            </a:pPr>
+            <a:r>
+              <a:rPr lang="en-US" altLang="en-US" dirty="0" smtClean="0">
+                <a:solidFill>
+                  <a:srgbClr val="000000"/>
+                </a:solidFill>
+              </a:rPr>
+              <a:t>First Semester </a:t>
+            </a:r>
+            <a:r>
+              <a:rPr lang="en-US" altLang="en-US" dirty="0">
+                <a:solidFill>
+                  <a:srgbClr val="000000"/>
+                </a:solidFill>
+              </a:rPr>
+              <a:t>Presentation</a:t>
+            </a:r>
+          </a:p>
+          <a:p>
+            <a:pPr algn="ctr" eaLnBrk="1">
+              <a:buClrTx/>
+              <a:buFontTx/>
+              <a:buNone/>
+            </a:pPr>
+            <a:r>
+              <a:rPr lang="en-US" altLang="en-US" dirty="0" smtClean="0">
+                <a:solidFill>
+                  <a:srgbClr val="000000"/>
+                </a:solidFill>
+              </a:rPr>
+              <a:t>December 3, </a:t>
+            </a:r>
+            <a:r>
+              <a:rPr lang="en-US" altLang="en-US" dirty="0">
+                <a:solidFill>
+                  <a:srgbClr val="000000"/>
+                </a:solidFill>
+              </a:rPr>
+              <a:t>2013</a:t>
+            </a:r>
+          </a:p>
+          <a:p>
+            <a:pPr algn="ctr" eaLnBrk="1">
+              <a:buClrTx/>
+              <a:buFontTx/>
+              <a:buNone/>
+            </a:pPr>
+            <a:endParaRPr lang="en-US" altLang="en-US" dirty="0">
+              <a:solidFill>
+                <a:srgbClr val="FFFFFF"/>
+              </a:solidFill>
+            </a:endParaRPr>
+          </a:p>
+        </p:txBody>
+      </p:sp>
+      <p:pic>
+        <p:nvPicPr>
+          <p:cNvPr id="7172" name="Picture 3"/>
+          <p:cNvPicPr>
+            <a:picLocks noChangeAspect="1" noChangeArrowheads="1"/>
+          </p:cNvPicPr>
+          <p:nvPr/>
+        </p:nvPicPr>
+        <p:blipFill>
+          <a:blip r:embed="rId4" cstate="print">
+            <a:extLst>
+              <a:ext uri="{28A0092B-C50C-407E-A947-70E740481C1C}">
+                <a14:useLocalDpi xmlns="" xmlns:a14="http://schemas.microsoft.com/office/drawing/2010/main" val="0"/>
+              </a:ext>
+            </a:extLst>
+          </a:blip>
+          <a:srcRect/>
+          <a:stretch>
+            <a:fillRect/>
+          </a:stretch>
+        </p:blipFill>
+        <p:spPr bwMode="auto">
+          <a:xfrm>
+            <a:off x="618331" y="4619625"/>
+            <a:ext cx="2593464" cy="2085976"/>
+          </a:xfrm>
+          <a:prstGeom prst="rect">
+            <a:avLst/>
+          </a:prstGeom>
+          <a:noFill/>
+          <a:ln>
+            <a:noFill/>
+          </a:ln>
+          <a:effectLst/>
+          <a:extLst>
+            <a:ext uri="{909E8E84-426E-40DD-AFC4-6F175D3DCCD1}">
+              <a14:hiddenFill xmlns="" xmlns:a14="http://schemas.microsoft.com/office/drawing/2010/main">
+                <a:blipFill dpi="0" rotWithShape="0">
+                  <a:blip/>
+                  <a:srcRect/>
+                  <a:stretch>
+                    <a:fillRect/>
+                  </a:stretch>
+                </a:blipFill>
+              </a14:hiddenFill>
+            </a:ext>
+            <a:ext uri="{91240B29-F687-4F45-9708-019B960494DF}">
+              <a14:hiddenLine xmlns="" xmlns:a14="http://schemas.microsoft.com/office/drawing/2010/main" w="9525">
+                <a:solidFill>
+                  <a:srgbClr val="808080"/>
+                </a:solidFill>
+                <a:round/>
+                <a:headEnd/>
+                <a:tailEnd/>
+              </a14:hiddenLine>
+            </a:ext>
+            <a:ext uri="{AF507438-7753-43E0-B8FC-AC1667EBCBE1}">
+              <a14:hiddenEffects xmlns="" xmlns:a14="http://schemas.microsoft.com/office/drawing/2010/main">
+                <a:effectLst>
+                  <a:outerShdw dist="35921" dir="2700000" algn="ctr" rotWithShape="0">
+                    <a:srgbClr val="808080"/>
+                  </a:outerShdw>
+                </a:effectLst>
+              </a14:hiddenEffects>
+            </a:ext>
+          </a:extLst>
+        </p:spPr>
+      </p:pic>
+      <p:pic>
+        <p:nvPicPr>
+          <p:cNvPr id="7173" name="Picture 4"/>
+          <p:cNvPicPr>
+            <a:picLocks noChangeAspect="1" noChangeArrowheads="1"/>
+          </p:cNvPicPr>
+          <p:nvPr/>
+        </p:nvPicPr>
+        <p:blipFill>
+          <a:blip r:embed="rId5" cstate="print">
+            <a:extLst>
+              <a:ext uri="{28A0092B-C50C-407E-A947-70E740481C1C}">
+                <a14:useLocalDpi xmlns="" xmlns:a14="http://schemas.microsoft.com/office/drawing/2010/main" val="0"/>
+              </a:ext>
+            </a:extLst>
+          </a:blip>
+          <a:srcRect/>
+          <a:stretch>
+            <a:fillRect/>
+          </a:stretch>
+        </p:blipFill>
+        <p:spPr bwMode="auto">
+          <a:xfrm>
+            <a:off x="436563" y="549275"/>
+            <a:ext cx="2081310" cy="2165350"/>
+          </a:xfrm>
+          <a:prstGeom prst="rect">
+            <a:avLst/>
+          </a:prstGeom>
+          <a:noFill/>
+          <a:ln>
+            <a:noFill/>
+          </a:ln>
+          <a:effectLst/>
+          <a:extLst>
+            <a:ext uri="{909E8E84-426E-40DD-AFC4-6F175D3DCCD1}">
+              <a14:hiddenFill xmlns="" xmlns:a14="http://schemas.microsoft.com/office/drawing/2010/main">
+                <a:blipFill dpi="0" rotWithShape="0">
+                  <a:blip/>
+                  <a:srcRect/>
+                  <a:stretch>
+                    <a:fillRect/>
+                  </a:stretch>
+                </a:blipFill>
+              </a14:hiddenFill>
+            </a:ext>
+            <a:ext uri="{91240B29-F687-4F45-9708-019B960494DF}">
+              <a14:hiddenLine xmlns="" xmlns:a14="http://schemas.microsoft.com/office/drawing/2010/main" w="9525">
+                <a:solidFill>
+                  <a:srgbClr val="808080"/>
+                </a:solidFill>
+                <a:round/>
+                <a:headEnd/>
+                <a:tailEnd/>
+              </a14:hiddenLine>
+            </a:ext>
+            <a:ext uri="{AF507438-7753-43E0-B8FC-AC1667EBCBE1}">
+              <a14:hiddenEffects xmlns="" xmlns:a14="http://schemas.microsoft.com/office/drawing/2010/main">
+                <a:effectLst>
+                  <a:outerShdw dist="35921" dir="2700000" algn="ctr" rotWithShape="0">
+                    <a:srgbClr val="808080"/>
+                  </a:outerShdw>
+                </a:effectLst>
+              </a14:hiddenEffects>
+            </a:ext>
+          </a:extLst>
+        </p:spPr>
+      </p:pic>
+      <p:pic>
+        <p:nvPicPr>
+          <p:cNvPr id="7174" name="Picture 5"/>
+          <p:cNvPicPr>
+            <a:picLocks noChangeAspect="1" noChangeArrowheads="1"/>
+          </p:cNvPicPr>
+          <p:nvPr/>
+        </p:nvPicPr>
+        <p:blipFill>
+          <a:blip r:embed="rId6" cstate="print">
+            <a:extLst>
+              <a:ext uri="{28A0092B-C50C-407E-A947-70E740481C1C}">
+                <a14:useLocalDpi xmlns="" xmlns:a14="http://schemas.microsoft.com/office/drawing/2010/main" val="0"/>
+              </a:ext>
+            </a:extLst>
+          </a:blip>
+          <a:srcRect/>
+          <a:stretch>
+            <a:fillRect/>
+          </a:stretch>
+        </p:blipFill>
+        <p:spPr bwMode="auto">
+          <a:xfrm>
+            <a:off x="7323931" y="4615648"/>
+            <a:ext cx="2373312" cy="2404277"/>
+          </a:xfrm>
+          <a:prstGeom prst="rect">
+            <a:avLst/>
+          </a:prstGeom>
+          <a:noFill/>
+          <a:ln>
+            <a:noFill/>
+          </a:ln>
+          <a:effectLst/>
+          <a:extLst>
+            <a:ext uri="{909E8E84-426E-40DD-AFC4-6F175D3DCCD1}">
+              <a14:hiddenFill xmlns="" xmlns:a14="http://schemas.microsoft.com/office/drawing/2010/main">
+                <a:blipFill dpi="0" rotWithShape="0">
+                  <a:blip/>
+                  <a:srcRect/>
+                  <a:stretch>
+                    <a:fillRect/>
+                  </a:stretch>
+                </a:blipFill>
+              </a14:hiddenFill>
+            </a:ext>
+            <a:ext uri="{91240B29-F687-4F45-9708-019B960494DF}">
+              <a14:hiddenLine xmlns="" xmlns:a14="http://schemas.microsoft.com/office/drawing/2010/main" w="9525">
+                <a:solidFill>
+                  <a:srgbClr val="808080"/>
+                </a:solidFill>
+                <a:round/>
+                <a:headEnd/>
+                <a:tailEnd/>
+              </a14:hiddenLine>
+            </a:ext>
+            <a:ext uri="{AF507438-7753-43E0-B8FC-AC1667EBCBE1}">
+              <a14:hiddenEffects xmlns="" xmlns:a14="http://schemas.microsoft.com/office/drawing/2010/main">
+                <a:effectLst>
+                  <a:outerShdw dist="35921" dir="2700000" algn="ctr" rotWithShape="0">
+                    <a:srgbClr val="808080"/>
+                  </a:outerShdw>
+                </a:effectLst>
+              </a14:hiddenEffects>
+            </a:ext>
+          </a:extLst>
+        </p:spPr>
+      </p:pic>
+      <p:sp>
+        <p:nvSpPr>
+          <p:cNvPr id="8" name="Slide Number Placeholder 7"/>
+          <p:cNvSpPr>
+            <a:spLocks noGrp="1"/>
+          </p:cNvSpPr>
+          <p:nvPr>
+            <p:ph type="sldNum" idx="12"/>
+          </p:nvPr>
+        </p:nvSpPr>
+        <p:spPr/>
+        <p:txBody>
+          <a:bodyPr/>
+          <a:lstStyle/>
+          <a:p>
+            <a:pPr>
+              <a:defRPr/>
+            </a:pPr>
+            <a:fld id="{E55F156C-F0B7-45BC-A5A9-F8C99B9FDB7D}" type="slidenum">
+              <a:rPr lang="en-US" altLang="en-US" smtClean="0"/>
+              <a:pPr>
+                <a:defRPr/>
+              </a:pPr>
+              <a:t>24</a:t>
+            </a:fld>
+            <a:endParaRPr lang="en-US" altLang="en-US" dirty="0"/>
+          </a:p>
+        </p:txBody>
+      </p:sp>
+    </p:spTree>
+  </p:cSld>
+  <p:clrMapOvr>
+    <a:masterClrMapping/>
+  </p:clrMapOvr>
+  <p:transition spd="med"/>
+  <p:timing>
+    <p:tnLst>
+      <p:par>
+        <p:cTn id="1" dur="indefinite" restart="never" nodeType="tmRoot">
+          <p:childTnLst>
+            <p:seq concurrent="1" nextAc="seek">
+              <p:cTn id="2" dur="indefinite" nodeType="mainSeq"/>
+              <p:prevCondLst>
+                <p:cond evt="onPrev" delay="0">
+                  <p:tgtEl>
+                    <p:sldTgt/>
+                  </p:tgtEl>
+                </p:cond>
+              </p:prevCondLst>
+              <p:nextCondLst>
+                <p:cond evt="onNext" delay="0">
+                  <p:tgtEl>
+                    <p:sldTgt/>
+                  </p:tgtEl>
+                </p:cond>
+              </p:nextCondLst>
+            </p:seq>
+          </p:childTnLst>
+        </p:cTn>
       </p:par>
     </p:tnLst>
   </p:timing>
@@ -13836,25 +16211,6 @@
             </a:r>
           </a:p>
           <a:p>
-            <a:r>
-              <a:rPr lang="en-US" sz="3200" dirty="0" smtClean="0">
-                <a:solidFill>
-                  <a:schemeClr val="bg1">
-                    <a:lumMod val="65000"/>
-                  </a:schemeClr>
-                </a:solidFill>
-              </a:rPr>
-              <a:t>Conclusion</a:t>
-            </a:r>
-            <a:endParaRPr lang="en-US" sz="3200" dirty="0">
-              <a:solidFill>
-                <a:schemeClr val="bg1">
-                  <a:lumMod val="65000"/>
-                </a:schemeClr>
-              </a:solidFill>
-            </a:endParaRPr>
-          </a:p>
-          <a:p>
             <a:endParaRPr lang="en-US" sz="4000" dirty="0">
               <a:solidFill>
                 <a:schemeClr val="bg1">
@@ -15630,25 +17986,6 @@
               </a:rPr>
               <a:t>Schedule</a:t>
             </a:r>
-          </a:p>
-          <a:p>
-            <a:r>
-              <a:rPr lang="en-US" sz="3200" dirty="0" smtClean="0">
-                <a:solidFill>
-                  <a:schemeClr val="bg1">
-                    <a:lumMod val="65000"/>
-                  </a:schemeClr>
-                </a:solidFill>
-              </a:rPr>
-              <a:t>Conclusion</a:t>
-            </a:r>
-            <a:endParaRPr lang="en-US" sz="3200" dirty="0">
-              <a:solidFill>
-                <a:schemeClr val="bg1">
-                  <a:lumMod val="65000"/>
-                </a:schemeClr>
-              </a:solidFill>
-            </a:endParaRPr>
           </a:p>
           <a:p>
             <a:endParaRPr lang="en-US" sz="4000" dirty="0">

</xml_diff>

<commit_message>
Added mission architecture slides
</commit_message>
<xml_diff>
--- a/CMQA/Presentations/First Semester Presentation.pptx
+++ b/CMQA/Presentations/First Semester Presentation.pptx
@@ -6,7 +6,7 @@
     <p:sldMasterId id="2147483649" r:id="rId2"/>
   </p:sldMasterIdLst>
   <p:notesMasterIdLst>
-    <p:notesMasterId r:id="rId27"/>
+    <p:notesMasterId r:id="rId30"/>
   </p:notesMasterIdLst>
   <p:sldIdLst>
     <p:sldId id="256" r:id="rId3"/>
@@ -25,14 +25,17 @@
     <p:sldId id="269" r:id="rId16"/>
     <p:sldId id="270" r:id="rId17"/>
     <p:sldId id="271" r:id="rId18"/>
-    <p:sldId id="272" r:id="rId19"/>
-    <p:sldId id="273" r:id="rId20"/>
-    <p:sldId id="274" r:id="rId21"/>
-    <p:sldId id="275" r:id="rId22"/>
-    <p:sldId id="276" r:id="rId23"/>
-    <p:sldId id="277" r:id="rId24"/>
-    <p:sldId id="278" r:id="rId25"/>
-    <p:sldId id="279" r:id="rId26"/>
+    <p:sldId id="280" r:id="rId19"/>
+    <p:sldId id="281" r:id="rId20"/>
+    <p:sldId id="282" r:id="rId21"/>
+    <p:sldId id="272" r:id="rId22"/>
+    <p:sldId id="273" r:id="rId23"/>
+    <p:sldId id="274" r:id="rId24"/>
+    <p:sldId id="275" r:id="rId25"/>
+    <p:sldId id="276" r:id="rId26"/>
+    <p:sldId id="277" r:id="rId27"/>
+    <p:sldId id="278" r:id="rId28"/>
+    <p:sldId id="279" r:id="rId29"/>
   </p:sldIdLst>
   <p:sldSz cx="10075863" cy="7562850"/>
   <p:notesSz cx="7772400" cy="10058400"/>
@@ -202,6 +205,983 @@
     </a:lvl9pPr>
   </p:defaultTextStyle>
 </p:presentation>
+</file>
+
+<file path=ppt/charts/chart1.xml><?xml version="1.0" encoding="utf-8"?>
+<c:chartSpace xmlns:c="http://schemas.openxmlformats.org/drawingml/2006/chart" xmlns:a="http://schemas.openxmlformats.org/drawingml/2006/main" xmlns:r="http://schemas.openxmlformats.org/officeDocument/2006/relationships">
+  <c:date1904 val="1"/>
+  <c:lang val="en-US"/>
+  <c:chart>
+    <c:plotArea>
+      <c:layout/>
+      <c:scatterChart>
+        <c:scatterStyle val="lineMarker"/>
+        <c:ser>
+          <c:idx val="0"/>
+          <c:order val="0"/>
+          <c:tx>
+            <c:v>Succeeded</c:v>
+          </c:tx>
+          <c:spPr>
+            <a:ln w="28575">
+              <a:noFill/>
+            </a:ln>
+          </c:spPr>
+          <c:xVal>
+            <c:numRef>
+              <c:f>('Launched Mission Data'!$D$2,'Launched Mission Data'!$D$10,'Launched Mission Data'!$D$11,'Launched Mission Data'!$D$12)</c:f>
+              <c:numCache>
+                <c:formatCode>General</c:formatCode>
+                <c:ptCount val="4"/>
+                <c:pt idx="0">
+                  <c:v>1</c:v>
+                </c:pt>
+                <c:pt idx="1">
+                  <c:v>2</c:v>
+                </c:pt>
+                <c:pt idx="2">
+                  <c:v>1</c:v>
+                </c:pt>
+                <c:pt idx="3">
+                  <c:v>3</c:v>
+                </c:pt>
+              </c:numCache>
+            </c:numRef>
+          </c:xVal>
+          <c:yVal>
+            <c:numRef>
+              <c:f>('Launched Mission Data'!$H$2,'Launched Mission Data'!$H$10,'Launched Mission Data'!$H$11,'Launched Mission Data'!$H$12)</c:f>
+              <c:numCache>
+                <c:formatCode>General</c:formatCode>
+                <c:ptCount val="4"/>
+                <c:pt idx="0">
+                  <c:v>80</c:v>
+                </c:pt>
+                <c:pt idx="1">
+                  <c:v>300</c:v>
+                </c:pt>
+                <c:pt idx="2">
+                  <c:v>100</c:v>
+                </c:pt>
+                <c:pt idx="3">
+                  <c:v>30</c:v>
+                </c:pt>
+              </c:numCache>
+            </c:numRef>
+          </c:yVal>
+        </c:ser>
+        <c:ser>
+          <c:idx val="1"/>
+          <c:order val="1"/>
+          <c:tx>
+            <c:v>Failed</c:v>
+          </c:tx>
+          <c:spPr>
+            <a:ln w="28575">
+              <a:noFill/>
+            </a:ln>
+          </c:spPr>
+          <c:xVal>
+            <c:numRef>
+              <c:f>('Launched Mission Data'!$D$4,'Launched Mission Data'!$D$6)</c:f>
+              <c:numCache>
+                <c:formatCode>General</c:formatCode>
+                <c:ptCount val="2"/>
+                <c:pt idx="0">
+                  <c:v>1</c:v>
+                </c:pt>
+                <c:pt idx="1">
+                  <c:v>1</c:v>
+                </c:pt>
+              </c:numCache>
+            </c:numRef>
+          </c:xVal>
+          <c:yVal>
+            <c:numRef>
+              <c:f>('Launched Mission Data'!$H$4,'Launched Mission Data'!$H$6)</c:f>
+              <c:numCache>
+                <c:formatCode>General</c:formatCode>
+                <c:ptCount val="2"/>
+                <c:pt idx="0">
+                  <c:v>95</c:v>
+                </c:pt>
+                <c:pt idx="1">
+                  <c:v>0.05</c:v>
+                </c:pt>
+              </c:numCache>
+            </c:numRef>
+          </c:yVal>
+        </c:ser>
+        <c:ser>
+          <c:idx val="2"/>
+          <c:order val="2"/>
+          <c:tx>
+            <c:v>Rascal</c:v>
+          </c:tx>
+          <c:spPr>
+            <a:ln w="28575">
+              <a:noFill/>
+            </a:ln>
+          </c:spPr>
+          <c:xVal>
+            <c:numRef>
+              <c:f>'Launched Mission Data'!$D$14</c:f>
+              <c:numCache>
+                <c:formatCode>General</c:formatCode>
+                <c:ptCount val="1"/>
+                <c:pt idx="0">
+                  <c:v>2</c:v>
+                </c:pt>
+              </c:numCache>
+            </c:numRef>
+          </c:xVal>
+          <c:yVal>
+            <c:numRef>
+              <c:f>'Launched Mission Data'!$H$14</c:f>
+              <c:numCache>
+                <c:formatCode>General</c:formatCode>
+                <c:ptCount val="1"/>
+                <c:pt idx="0">
+                  <c:v>0.1</c:v>
+                </c:pt>
+              </c:numCache>
+            </c:numRef>
+          </c:yVal>
+        </c:ser>
+        <c:axId val="197344640"/>
+        <c:axId val="199044480"/>
+      </c:scatterChart>
+      <c:valAx>
+        <c:axId val="197344640"/>
+        <c:scaling>
+          <c:orientation val="minMax"/>
+          <c:max val="4"/>
+        </c:scaling>
+        <c:axPos val="b"/>
+        <c:title>
+          <c:tx>
+            <c:rich>
+              <a:bodyPr/>
+              <a:lstStyle/>
+              <a:p>
+                <a:pPr>
+                  <a:defRPr/>
+                </a:pPr>
+                <a:r>
+                  <a:rPr lang="en-US">
+                    <a:latin typeface="Times New Roman" pitchFamily="18" charset="0"/>
+                    <a:cs typeface="Times New Roman" pitchFamily="18" charset="0"/>
+                  </a:rPr>
+                  <a:t>Number of Spacecraft</a:t>
+                </a:r>
+              </a:p>
+            </c:rich>
+          </c:tx>
+          <c:layout/>
+        </c:title>
+        <c:numFmt formatCode="General" sourceLinked="1"/>
+        <c:tickLblPos val="nextTo"/>
+        <c:crossAx val="199044480"/>
+        <c:crosses val="autoZero"/>
+        <c:crossBetween val="midCat"/>
+        <c:majorUnit val="1"/>
+      </c:valAx>
+      <c:valAx>
+        <c:axId val="199044480"/>
+        <c:scaling>
+          <c:orientation val="minMax"/>
+        </c:scaling>
+        <c:axPos val="l"/>
+        <c:title>
+          <c:tx>
+            <c:rich>
+              <a:bodyPr rot="-5400000" vert="horz"/>
+              <a:lstStyle/>
+              <a:p>
+                <a:pPr>
+                  <a:defRPr/>
+                </a:pPr>
+                <a:r>
+                  <a:rPr lang="en-US" b="1">
+                    <a:latin typeface="Times New Roman" pitchFamily="18" charset="0"/>
+                    <a:cs typeface="Times New Roman" pitchFamily="18" charset="0"/>
+                  </a:rPr>
+                  <a:t>Cost </a:t>
+                </a:r>
+                <a:r>
+                  <a:rPr lang="en-US" b="1" baseline="0">
+                    <a:latin typeface="Times New Roman" pitchFamily="18" charset="0"/>
+                    <a:cs typeface="Times New Roman" pitchFamily="18" charset="0"/>
+                  </a:rPr>
+                  <a:t>(lMillions of Dollars)</a:t>
+                </a:r>
+                <a:endParaRPr lang="en-US" b="1">
+                  <a:latin typeface="Times New Roman" pitchFamily="18" charset="0"/>
+                  <a:cs typeface="Times New Roman" pitchFamily="18" charset="0"/>
+                </a:endParaRPr>
+              </a:p>
+            </c:rich>
+          </c:tx>
+          <c:layout/>
+        </c:title>
+        <c:numFmt formatCode="General" sourceLinked="1"/>
+        <c:tickLblPos val="nextTo"/>
+        <c:crossAx val="197344640"/>
+        <c:crosses val="autoZero"/>
+        <c:crossBetween val="midCat"/>
+      </c:valAx>
+    </c:plotArea>
+    <c:legend>
+      <c:legendPos val="r"/>
+      <c:layout>
+        <c:manualLayout>
+          <c:xMode val="edge"/>
+          <c:yMode val="edge"/>
+          <c:x val="0.88907223738528562"/>
+          <c:y val="0.42704973268953667"/>
+          <c:w val="8.6023354500107965E-2"/>
+          <c:h val="0.1027732486640838"/>
+        </c:manualLayout>
+      </c:layout>
+      <c:overlay val="1"/>
+      <c:spPr>
+        <a:ln>
+          <a:solidFill>
+            <a:sysClr val="windowText" lastClr="000000"/>
+          </a:solidFill>
+        </a:ln>
+      </c:spPr>
+      <c:txPr>
+        <a:bodyPr/>
+        <a:lstStyle/>
+        <a:p>
+          <a:pPr>
+            <a:defRPr>
+              <a:latin typeface="Times New Roman" pitchFamily="18" charset="0"/>
+              <a:cs typeface="Times New Roman" pitchFamily="18" charset="0"/>
+            </a:defRPr>
+          </a:pPr>
+          <a:endParaRPr lang="en-US"/>
+        </a:p>
+      </c:txPr>
+    </c:legend>
+    <c:plotVisOnly val="1"/>
+  </c:chart>
+  <c:externalData r:id="rId1"/>
+  <c:userShapes r:id="rId2"/>
+</c:chartSpace>
+</file>
+
+<file path=ppt/drawings/drawing1.xml><?xml version="1.0" encoding="utf-8"?>
+<c:userShapes xmlns:c="http://schemas.openxmlformats.org/drawingml/2006/chart">
+  <cdr:relSizeAnchor xmlns:cdr="http://schemas.openxmlformats.org/drawingml/2006/chartDrawing">
+    <cdr:from>
+      <cdr:x>0.30435</cdr:x>
+      <cdr:y>0.5974</cdr:y>
+    </cdr:from>
+    <cdr:to>
+      <cdr:x>0.43226</cdr:x>
+      <cdr:y>0.654</cdr:y>
+    </cdr:to>
+    <cdr:sp macro="" textlink="">
+      <cdr:nvSpPr>
+        <cdr:cNvPr id="4" name="TextBox 1"/>
+        <cdr:cNvSpPr txBox="1"/>
+      </cdr:nvSpPr>
+      <cdr:spPr>
+        <a:xfrm xmlns:a="http://schemas.openxmlformats.org/drawingml/2006/main">
+          <a:off x="2667000" y="3505200"/>
+          <a:ext cx="1120875" cy="332095"/>
+        </a:xfrm>
+        <a:prstGeom xmlns:a="http://schemas.openxmlformats.org/drawingml/2006/main" prst="rect">
+          <a:avLst/>
+        </a:prstGeom>
+      </cdr:spPr>
+      <cdr:txBody>
+        <a:bodyPr xmlns:a="http://schemas.openxmlformats.org/drawingml/2006/main" wrap="square" rtlCol="0"/>
+        <a:lstStyle xmlns:a="http://schemas.openxmlformats.org/drawingml/2006/main">
+          <a:lvl1pPr marL="0" indent="0">
+            <a:defRPr sz="1100">
+              <a:latin typeface="+mn-lt"/>
+              <a:ea typeface="+mn-ea"/>
+              <a:cs typeface="+mn-cs"/>
+            </a:defRPr>
+          </a:lvl1pPr>
+          <a:lvl2pPr marL="457200" indent="0">
+            <a:defRPr sz="1100">
+              <a:latin typeface="+mn-lt"/>
+              <a:ea typeface="+mn-ea"/>
+              <a:cs typeface="+mn-cs"/>
+            </a:defRPr>
+          </a:lvl2pPr>
+          <a:lvl3pPr marL="914400" indent="0">
+            <a:defRPr sz="1100">
+              <a:latin typeface="+mn-lt"/>
+              <a:ea typeface="+mn-ea"/>
+              <a:cs typeface="+mn-cs"/>
+            </a:defRPr>
+          </a:lvl3pPr>
+          <a:lvl4pPr marL="1371600" indent="0">
+            <a:defRPr sz="1100">
+              <a:latin typeface="+mn-lt"/>
+              <a:ea typeface="+mn-ea"/>
+              <a:cs typeface="+mn-cs"/>
+            </a:defRPr>
+          </a:lvl4pPr>
+          <a:lvl5pPr marL="1828800" indent="0">
+            <a:defRPr sz="1100">
+              <a:latin typeface="+mn-lt"/>
+              <a:ea typeface="+mn-ea"/>
+              <a:cs typeface="+mn-cs"/>
+            </a:defRPr>
+          </a:lvl5pPr>
+          <a:lvl6pPr marL="2286000" indent="0">
+            <a:defRPr sz="1100">
+              <a:latin typeface="+mn-lt"/>
+              <a:ea typeface="+mn-ea"/>
+              <a:cs typeface="+mn-cs"/>
+            </a:defRPr>
+          </a:lvl6pPr>
+          <a:lvl7pPr marL="2743200" indent="0">
+            <a:defRPr sz="1100">
+              <a:latin typeface="+mn-lt"/>
+              <a:ea typeface="+mn-ea"/>
+              <a:cs typeface="+mn-cs"/>
+            </a:defRPr>
+          </a:lvl7pPr>
+          <a:lvl8pPr marL="3200400" indent="0">
+            <a:defRPr sz="1100">
+              <a:latin typeface="+mn-lt"/>
+              <a:ea typeface="+mn-ea"/>
+              <a:cs typeface="+mn-cs"/>
+            </a:defRPr>
+          </a:lvl8pPr>
+          <a:lvl9pPr marL="3657600" indent="0">
+            <a:defRPr sz="1100">
+              <a:latin typeface="+mn-lt"/>
+              <a:ea typeface="+mn-ea"/>
+              <a:cs typeface="+mn-cs"/>
+            </a:defRPr>
+          </a:lvl9pPr>
+        </a:lstStyle>
+        <a:p xmlns:a="http://schemas.openxmlformats.org/drawingml/2006/main">
+          <a:r>
+            <a:rPr lang="en-US" sz="1100" dirty="0">
+              <a:latin typeface="Times New Roman" pitchFamily="18" charset="0"/>
+              <a:cs typeface="Times New Roman" pitchFamily="18" charset="0"/>
+            </a:rPr>
+            <a:t>XSS-10</a:t>
+          </a:r>
+        </a:p>
+      </cdr:txBody>
+    </cdr:sp>
+  </cdr:relSizeAnchor>
+  <cdr:relSizeAnchor xmlns:cdr="http://schemas.openxmlformats.org/drawingml/2006/chartDrawing">
+    <cdr:from>
+      <cdr:x>0.31304</cdr:x>
+      <cdr:y>0.68831</cdr:y>
+    </cdr:from>
+    <cdr:to>
+      <cdr:x>0.43763</cdr:x>
+      <cdr:y>0.7537</cdr:y>
+    </cdr:to>
+    <cdr:sp macro="" textlink="">
+      <cdr:nvSpPr>
+        <cdr:cNvPr id="5" name="TextBox 1"/>
+        <cdr:cNvSpPr txBox="1"/>
+      </cdr:nvSpPr>
+      <cdr:spPr>
+        <a:xfrm xmlns:a="http://schemas.openxmlformats.org/drawingml/2006/main">
+          <a:off x="2743200" y="4038600"/>
+          <a:ext cx="1091782" cy="383669"/>
+        </a:xfrm>
+        <a:prstGeom xmlns:a="http://schemas.openxmlformats.org/drawingml/2006/main" prst="rect">
+          <a:avLst/>
+        </a:prstGeom>
+      </cdr:spPr>
+      <cdr:txBody>
+        <a:bodyPr xmlns:a="http://schemas.openxmlformats.org/drawingml/2006/main" wrap="square" rtlCol="0"/>
+        <a:lstStyle xmlns:a="http://schemas.openxmlformats.org/drawingml/2006/main">
+          <a:lvl1pPr marL="0" indent="0">
+            <a:defRPr sz="1100">
+              <a:latin typeface="+mn-lt"/>
+              <a:ea typeface="+mn-ea"/>
+              <a:cs typeface="+mn-cs"/>
+            </a:defRPr>
+          </a:lvl1pPr>
+          <a:lvl2pPr marL="457200" indent="0">
+            <a:defRPr sz="1100">
+              <a:latin typeface="+mn-lt"/>
+              <a:ea typeface="+mn-ea"/>
+              <a:cs typeface="+mn-cs"/>
+            </a:defRPr>
+          </a:lvl2pPr>
+          <a:lvl3pPr marL="914400" indent="0">
+            <a:defRPr sz="1100">
+              <a:latin typeface="+mn-lt"/>
+              <a:ea typeface="+mn-ea"/>
+              <a:cs typeface="+mn-cs"/>
+            </a:defRPr>
+          </a:lvl3pPr>
+          <a:lvl4pPr marL="1371600" indent="0">
+            <a:defRPr sz="1100">
+              <a:latin typeface="+mn-lt"/>
+              <a:ea typeface="+mn-ea"/>
+              <a:cs typeface="+mn-cs"/>
+            </a:defRPr>
+          </a:lvl4pPr>
+          <a:lvl5pPr marL="1828800" indent="0">
+            <a:defRPr sz="1100">
+              <a:latin typeface="+mn-lt"/>
+              <a:ea typeface="+mn-ea"/>
+              <a:cs typeface="+mn-cs"/>
+            </a:defRPr>
+          </a:lvl5pPr>
+          <a:lvl6pPr marL="2286000" indent="0">
+            <a:defRPr sz="1100">
+              <a:latin typeface="+mn-lt"/>
+              <a:ea typeface="+mn-ea"/>
+              <a:cs typeface="+mn-cs"/>
+            </a:defRPr>
+          </a:lvl6pPr>
+          <a:lvl7pPr marL="2743200" indent="0">
+            <a:defRPr sz="1100">
+              <a:latin typeface="+mn-lt"/>
+              <a:ea typeface="+mn-ea"/>
+              <a:cs typeface="+mn-cs"/>
+            </a:defRPr>
+          </a:lvl7pPr>
+          <a:lvl8pPr marL="3200400" indent="0">
+            <a:defRPr sz="1100">
+              <a:latin typeface="+mn-lt"/>
+              <a:ea typeface="+mn-ea"/>
+              <a:cs typeface="+mn-cs"/>
+            </a:defRPr>
+          </a:lvl8pPr>
+          <a:lvl9pPr marL="3657600" indent="0">
+            <a:defRPr sz="1100">
+              <a:latin typeface="+mn-lt"/>
+              <a:ea typeface="+mn-ea"/>
+              <a:cs typeface="+mn-cs"/>
+            </a:defRPr>
+          </a:lvl9pPr>
+        </a:lstStyle>
+        <a:p xmlns:a="http://schemas.openxmlformats.org/drawingml/2006/main">
+          <a:r>
+            <a:rPr lang="en-US" sz="1100" dirty="0">
+              <a:latin typeface="Times New Roman" pitchFamily="18" charset="0"/>
+              <a:cs typeface="Times New Roman" pitchFamily="18" charset="0"/>
+            </a:rPr>
+            <a:t>XSS-11</a:t>
+          </a:r>
+        </a:p>
+      </cdr:txBody>
+    </cdr:sp>
+  </cdr:relSizeAnchor>
+  <cdr:relSizeAnchor xmlns:cdr="http://schemas.openxmlformats.org/drawingml/2006/chartDrawing">
+    <cdr:from>
+      <cdr:x>0.31304</cdr:x>
+      <cdr:y>0.64935</cdr:y>
+    </cdr:from>
+    <cdr:to>
+      <cdr:x>0.44926</cdr:x>
+      <cdr:y>0.68922</cdr:y>
+    </cdr:to>
+    <cdr:sp macro="" textlink="">
+      <cdr:nvSpPr>
+        <cdr:cNvPr id="6" name="TextBox 1"/>
+        <cdr:cNvSpPr txBox="1"/>
+      </cdr:nvSpPr>
+      <cdr:spPr>
+        <a:xfrm xmlns:a="http://schemas.openxmlformats.org/drawingml/2006/main">
+          <a:off x="2743200" y="3810000"/>
+          <a:ext cx="1193695" cy="233933"/>
+        </a:xfrm>
+        <a:prstGeom xmlns:a="http://schemas.openxmlformats.org/drawingml/2006/main" prst="rect">
+          <a:avLst/>
+        </a:prstGeom>
+      </cdr:spPr>
+      <cdr:txBody>
+        <a:bodyPr xmlns:a="http://schemas.openxmlformats.org/drawingml/2006/main" wrap="square" rtlCol="0"/>
+        <a:lstStyle xmlns:a="http://schemas.openxmlformats.org/drawingml/2006/main">
+          <a:lvl1pPr marL="0" indent="0">
+            <a:defRPr sz="1100">
+              <a:latin typeface="+mn-lt"/>
+              <a:ea typeface="+mn-ea"/>
+              <a:cs typeface="+mn-cs"/>
+            </a:defRPr>
+          </a:lvl1pPr>
+          <a:lvl2pPr marL="457200" indent="0">
+            <a:defRPr sz="1100">
+              <a:latin typeface="+mn-lt"/>
+              <a:ea typeface="+mn-ea"/>
+              <a:cs typeface="+mn-cs"/>
+            </a:defRPr>
+          </a:lvl2pPr>
+          <a:lvl3pPr marL="914400" indent="0">
+            <a:defRPr sz="1100">
+              <a:latin typeface="+mn-lt"/>
+              <a:ea typeface="+mn-ea"/>
+              <a:cs typeface="+mn-cs"/>
+            </a:defRPr>
+          </a:lvl3pPr>
+          <a:lvl4pPr marL="1371600" indent="0">
+            <a:defRPr sz="1100">
+              <a:latin typeface="+mn-lt"/>
+              <a:ea typeface="+mn-ea"/>
+              <a:cs typeface="+mn-cs"/>
+            </a:defRPr>
+          </a:lvl4pPr>
+          <a:lvl5pPr marL="1828800" indent="0">
+            <a:defRPr sz="1100">
+              <a:latin typeface="+mn-lt"/>
+              <a:ea typeface="+mn-ea"/>
+              <a:cs typeface="+mn-cs"/>
+            </a:defRPr>
+          </a:lvl5pPr>
+          <a:lvl6pPr marL="2286000" indent="0">
+            <a:defRPr sz="1100">
+              <a:latin typeface="+mn-lt"/>
+              <a:ea typeface="+mn-ea"/>
+              <a:cs typeface="+mn-cs"/>
+            </a:defRPr>
+          </a:lvl6pPr>
+          <a:lvl7pPr marL="2743200" indent="0">
+            <a:defRPr sz="1100">
+              <a:latin typeface="+mn-lt"/>
+              <a:ea typeface="+mn-ea"/>
+              <a:cs typeface="+mn-cs"/>
+            </a:defRPr>
+          </a:lvl7pPr>
+          <a:lvl8pPr marL="3200400" indent="0">
+            <a:defRPr sz="1100">
+              <a:latin typeface="+mn-lt"/>
+              <a:ea typeface="+mn-ea"/>
+              <a:cs typeface="+mn-cs"/>
+            </a:defRPr>
+          </a:lvl8pPr>
+          <a:lvl9pPr marL="3657600" indent="0">
+            <a:defRPr sz="1100">
+              <a:latin typeface="+mn-lt"/>
+              <a:ea typeface="+mn-ea"/>
+              <a:cs typeface="+mn-cs"/>
+            </a:defRPr>
+          </a:lvl9pPr>
+        </a:lstStyle>
+        <a:p xmlns:a="http://schemas.openxmlformats.org/drawingml/2006/main">
+          <a:r>
+            <a:rPr lang="en-US" sz="1100" dirty="0">
+              <a:latin typeface="Times New Roman" pitchFamily="18" charset="0"/>
+              <a:cs typeface="Times New Roman" pitchFamily="18" charset="0"/>
+            </a:rPr>
+            <a:t>DART</a:t>
+          </a:r>
+        </a:p>
+      </cdr:txBody>
+    </cdr:sp>
+  </cdr:relSizeAnchor>
+  <cdr:relSizeAnchor xmlns:cdr="http://schemas.openxmlformats.org/drawingml/2006/chartDrawing">
+    <cdr:from>
+      <cdr:x>0.53662</cdr:x>
+      <cdr:y>0.87379</cdr:y>
+    </cdr:from>
+    <cdr:to>
+      <cdr:x>0.61972</cdr:x>
+      <cdr:y>0.91651</cdr:y>
+    </cdr:to>
+    <cdr:sp macro="" textlink="">
+      <cdr:nvSpPr>
+        <cdr:cNvPr id="7" name="TextBox 1"/>
+        <cdr:cNvSpPr txBox="1"/>
+      </cdr:nvSpPr>
+      <cdr:spPr>
+        <a:xfrm xmlns:a="http://schemas.openxmlformats.org/drawingml/2006/main">
+          <a:off x="4652625" y="5495193"/>
+          <a:ext cx="720493" cy="268664"/>
+        </a:xfrm>
+        <a:prstGeom xmlns:a="http://schemas.openxmlformats.org/drawingml/2006/main" prst="rect">
+          <a:avLst/>
+        </a:prstGeom>
+      </cdr:spPr>
+      <cdr:txBody>
+        <a:bodyPr xmlns:a="http://schemas.openxmlformats.org/drawingml/2006/main" wrap="square" rtlCol="0"/>
+        <a:lstStyle xmlns:a="http://schemas.openxmlformats.org/drawingml/2006/main">
+          <a:lvl1pPr marL="0" indent="0">
+            <a:defRPr sz="1100">
+              <a:latin typeface="Calibri"/>
+            </a:defRPr>
+          </a:lvl1pPr>
+          <a:lvl2pPr marL="457200" indent="0">
+            <a:defRPr sz="1100">
+              <a:latin typeface="Calibri"/>
+            </a:defRPr>
+          </a:lvl2pPr>
+          <a:lvl3pPr marL="914400" indent="0">
+            <a:defRPr sz="1100">
+              <a:latin typeface="Calibri"/>
+            </a:defRPr>
+          </a:lvl3pPr>
+          <a:lvl4pPr marL="1371600" indent="0">
+            <a:defRPr sz="1100">
+              <a:latin typeface="Calibri"/>
+            </a:defRPr>
+          </a:lvl4pPr>
+          <a:lvl5pPr marL="1828800" indent="0">
+            <a:defRPr sz="1100">
+              <a:latin typeface="Calibri"/>
+            </a:defRPr>
+          </a:lvl5pPr>
+          <a:lvl6pPr marL="2286000" indent="0">
+            <a:defRPr sz="1100">
+              <a:latin typeface="Calibri"/>
+            </a:defRPr>
+          </a:lvl6pPr>
+          <a:lvl7pPr marL="2743200" indent="0">
+            <a:defRPr sz="1100">
+              <a:latin typeface="Calibri"/>
+            </a:defRPr>
+          </a:lvl7pPr>
+          <a:lvl8pPr marL="3200400" indent="0">
+            <a:defRPr sz="1100">
+              <a:latin typeface="Calibri"/>
+            </a:defRPr>
+          </a:lvl8pPr>
+          <a:lvl9pPr marL="3657600" indent="0">
+            <a:defRPr sz="1100">
+              <a:latin typeface="Calibri"/>
+            </a:defRPr>
+          </a:lvl9pPr>
+        </a:lstStyle>
+        <a:p xmlns:a="http://schemas.openxmlformats.org/drawingml/2006/main">
+          <a:r>
+            <a:rPr lang="en-US" sz="1100">
+              <a:latin typeface="Times New Roman" pitchFamily="18" charset="0"/>
+              <a:cs typeface="Times New Roman" pitchFamily="18" charset="0"/>
+            </a:rPr>
+            <a:t>Rascal</a:t>
+          </a:r>
+        </a:p>
+      </cdr:txBody>
+    </cdr:sp>
+  </cdr:relSizeAnchor>
+  <cdr:relSizeAnchor xmlns:cdr="http://schemas.openxmlformats.org/drawingml/2006/chartDrawing">
+    <cdr:from>
+      <cdr:x>0.5324</cdr:x>
+      <cdr:y>0.12816</cdr:y>
+    </cdr:from>
+    <cdr:to>
+      <cdr:x>0.68592</cdr:x>
+      <cdr:y>0.1767</cdr:y>
+    </cdr:to>
+    <cdr:sp macro="" textlink="">
+      <cdr:nvSpPr>
+        <cdr:cNvPr id="10" name="TextBox 1"/>
+        <cdr:cNvSpPr txBox="1"/>
+      </cdr:nvSpPr>
+      <cdr:spPr>
+        <a:xfrm xmlns:a="http://schemas.openxmlformats.org/drawingml/2006/main">
+          <a:off x="4615991" y="805961"/>
+          <a:ext cx="1331028" cy="305266"/>
+        </a:xfrm>
+        <a:prstGeom xmlns:a="http://schemas.openxmlformats.org/drawingml/2006/main" prst="rect">
+          <a:avLst/>
+        </a:prstGeom>
+      </cdr:spPr>
+      <cdr:txBody>
+        <a:bodyPr xmlns:a="http://schemas.openxmlformats.org/drawingml/2006/main" wrap="square" rtlCol="0"/>
+        <a:lstStyle xmlns:a="http://schemas.openxmlformats.org/drawingml/2006/main">
+          <a:lvl1pPr marL="0" indent="0">
+            <a:defRPr sz="1100">
+              <a:latin typeface="+mn-lt"/>
+              <a:ea typeface="+mn-ea"/>
+              <a:cs typeface="+mn-cs"/>
+            </a:defRPr>
+          </a:lvl1pPr>
+          <a:lvl2pPr marL="457200" indent="0">
+            <a:defRPr sz="1100">
+              <a:latin typeface="+mn-lt"/>
+              <a:ea typeface="+mn-ea"/>
+              <a:cs typeface="+mn-cs"/>
+            </a:defRPr>
+          </a:lvl2pPr>
+          <a:lvl3pPr marL="914400" indent="0">
+            <a:defRPr sz="1100">
+              <a:latin typeface="+mn-lt"/>
+              <a:ea typeface="+mn-ea"/>
+              <a:cs typeface="+mn-cs"/>
+            </a:defRPr>
+          </a:lvl3pPr>
+          <a:lvl4pPr marL="1371600" indent="0">
+            <a:defRPr sz="1100">
+              <a:latin typeface="+mn-lt"/>
+              <a:ea typeface="+mn-ea"/>
+              <a:cs typeface="+mn-cs"/>
+            </a:defRPr>
+          </a:lvl4pPr>
+          <a:lvl5pPr marL="1828800" indent="0">
+            <a:defRPr sz="1100">
+              <a:latin typeface="+mn-lt"/>
+              <a:ea typeface="+mn-ea"/>
+              <a:cs typeface="+mn-cs"/>
+            </a:defRPr>
+          </a:lvl5pPr>
+          <a:lvl6pPr marL="2286000" indent="0">
+            <a:defRPr sz="1100">
+              <a:latin typeface="+mn-lt"/>
+              <a:ea typeface="+mn-ea"/>
+              <a:cs typeface="+mn-cs"/>
+            </a:defRPr>
+          </a:lvl6pPr>
+          <a:lvl7pPr marL="2743200" indent="0">
+            <a:defRPr sz="1100">
+              <a:latin typeface="+mn-lt"/>
+              <a:ea typeface="+mn-ea"/>
+              <a:cs typeface="+mn-cs"/>
+            </a:defRPr>
+          </a:lvl7pPr>
+          <a:lvl8pPr marL="3200400" indent="0">
+            <a:defRPr sz="1100">
+              <a:latin typeface="+mn-lt"/>
+              <a:ea typeface="+mn-ea"/>
+              <a:cs typeface="+mn-cs"/>
+            </a:defRPr>
+          </a:lvl8pPr>
+          <a:lvl9pPr marL="3657600" indent="0">
+            <a:defRPr sz="1100">
+              <a:latin typeface="+mn-lt"/>
+              <a:ea typeface="+mn-ea"/>
+              <a:cs typeface="+mn-cs"/>
+            </a:defRPr>
+          </a:lvl9pPr>
+        </a:lstStyle>
+        <a:p xmlns:a="http://schemas.openxmlformats.org/drawingml/2006/main">
+          <a:r>
+            <a:rPr lang="en-US" sz="1100">
+              <a:latin typeface="Times New Roman" pitchFamily="18" charset="0"/>
+              <a:cs typeface="Times New Roman" pitchFamily="18" charset="0"/>
+            </a:rPr>
+            <a:t>Orbital</a:t>
+          </a:r>
+          <a:r>
+            <a:rPr lang="en-US" sz="1100" baseline="0">
+              <a:latin typeface="Times New Roman" pitchFamily="18" charset="0"/>
+              <a:cs typeface="Times New Roman" pitchFamily="18" charset="0"/>
+            </a:rPr>
+            <a:t> Express</a:t>
+          </a:r>
+          <a:endParaRPr lang="en-US" sz="1100">
+            <a:latin typeface="Times New Roman" pitchFamily="18" charset="0"/>
+            <a:cs typeface="Times New Roman" pitchFamily="18" charset="0"/>
+          </a:endParaRPr>
+        </a:p>
+      </cdr:txBody>
+    </cdr:sp>
+  </cdr:relSizeAnchor>
+  <cdr:relSizeAnchor xmlns:cdr="http://schemas.openxmlformats.org/drawingml/2006/chartDrawing">
+    <cdr:from>
+      <cdr:x>0.7662</cdr:x>
+      <cdr:y>0.80971</cdr:y>
+    </cdr:from>
+    <cdr:to>
+      <cdr:x>0.8493</cdr:x>
+      <cdr:y>0.85243</cdr:y>
+    </cdr:to>
+    <cdr:sp macro="" textlink="">
+      <cdr:nvSpPr>
+        <cdr:cNvPr id="11" name="TextBox 1"/>
+        <cdr:cNvSpPr txBox="1"/>
+      </cdr:nvSpPr>
+      <cdr:spPr>
+        <a:xfrm xmlns:a="http://schemas.openxmlformats.org/drawingml/2006/main">
+          <a:off x="6643074" y="5092206"/>
+          <a:ext cx="720493" cy="268663"/>
+        </a:xfrm>
+        <a:prstGeom xmlns:a="http://schemas.openxmlformats.org/drawingml/2006/main" prst="rect">
+          <a:avLst/>
+        </a:prstGeom>
+      </cdr:spPr>
+      <cdr:txBody>
+        <a:bodyPr xmlns:a="http://schemas.openxmlformats.org/drawingml/2006/main" wrap="square" rtlCol="0"/>
+        <a:lstStyle xmlns:a="http://schemas.openxmlformats.org/drawingml/2006/main">
+          <a:lvl1pPr marL="0" indent="0">
+            <a:defRPr sz="1100">
+              <a:latin typeface="+mn-lt"/>
+              <a:ea typeface="+mn-ea"/>
+              <a:cs typeface="+mn-cs"/>
+            </a:defRPr>
+          </a:lvl1pPr>
+          <a:lvl2pPr marL="457200" indent="0">
+            <a:defRPr sz="1100">
+              <a:latin typeface="+mn-lt"/>
+              <a:ea typeface="+mn-ea"/>
+              <a:cs typeface="+mn-cs"/>
+            </a:defRPr>
+          </a:lvl2pPr>
+          <a:lvl3pPr marL="914400" indent="0">
+            <a:defRPr sz="1100">
+              <a:latin typeface="+mn-lt"/>
+              <a:ea typeface="+mn-ea"/>
+              <a:cs typeface="+mn-cs"/>
+            </a:defRPr>
+          </a:lvl3pPr>
+          <a:lvl4pPr marL="1371600" indent="0">
+            <a:defRPr sz="1100">
+              <a:latin typeface="+mn-lt"/>
+              <a:ea typeface="+mn-ea"/>
+              <a:cs typeface="+mn-cs"/>
+            </a:defRPr>
+          </a:lvl4pPr>
+          <a:lvl5pPr marL="1828800" indent="0">
+            <a:defRPr sz="1100">
+              <a:latin typeface="+mn-lt"/>
+              <a:ea typeface="+mn-ea"/>
+              <a:cs typeface="+mn-cs"/>
+            </a:defRPr>
+          </a:lvl5pPr>
+          <a:lvl6pPr marL="2286000" indent="0">
+            <a:defRPr sz="1100">
+              <a:latin typeface="+mn-lt"/>
+              <a:ea typeface="+mn-ea"/>
+              <a:cs typeface="+mn-cs"/>
+            </a:defRPr>
+          </a:lvl6pPr>
+          <a:lvl7pPr marL="2743200" indent="0">
+            <a:defRPr sz="1100">
+              <a:latin typeface="+mn-lt"/>
+              <a:ea typeface="+mn-ea"/>
+              <a:cs typeface="+mn-cs"/>
+            </a:defRPr>
+          </a:lvl7pPr>
+          <a:lvl8pPr marL="3200400" indent="0">
+            <a:defRPr sz="1100">
+              <a:latin typeface="+mn-lt"/>
+              <a:ea typeface="+mn-ea"/>
+              <a:cs typeface="+mn-cs"/>
+            </a:defRPr>
+          </a:lvl8pPr>
+          <a:lvl9pPr marL="3657600" indent="0">
+            <a:defRPr sz="1100">
+              <a:latin typeface="+mn-lt"/>
+              <a:ea typeface="+mn-ea"/>
+              <a:cs typeface="+mn-cs"/>
+            </a:defRPr>
+          </a:lvl9pPr>
+        </a:lstStyle>
+        <a:p xmlns:a="http://schemas.openxmlformats.org/drawingml/2006/main">
+          <a:r>
+            <a:rPr lang="en-US" sz="1100">
+              <a:latin typeface="Times New Roman" pitchFamily="18" charset="0"/>
+              <a:cs typeface="Times New Roman" pitchFamily="18" charset="0"/>
+            </a:rPr>
+            <a:t>MiTEx</a:t>
+          </a:r>
+        </a:p>
+      </cdr:txBody>
+    </cdr:sp>
+  </cdr:relSizeAnchor>
+  <cdr:relSizeAnchor xmlns:cdr="http://schemas.openxmlformats.org/drawingml/2006/chartDrawing">
+    <cdr:from>
+      <cdr:x>0.30564</cdr:x>
+      <cdr:y>0.8699</cdr:y>
+    </cdr:from>
+    <cdr:to>
+      <cdr:x>0.38873</cdr:x>
+      <cdr:y>0.91262</cdr:y>
+    </cdr:to>
+    <cdr:sp macro="" textlink="">
+      <cdr:nvSpPr>
+        <cdr:cNvPr id="13" name="TextBox 1"/>
+        <cdr:cNvSpPr txBox="1"/>
+      </cdr:nvSpPr>
+      <cdr:spPr>
+        <a:xfrm xmlns:a="http://schemas.openxmlformats.org/drawingml/2006/main">
+          <a:off x="2649931" y="5470776"/>
+          <a:ext cx="720406" cy="268663"/>
+        </a:xfrm>
+        <a:prstGeom xmlns:a="http://schemas.openxmlformats.org/drawingml/2006/main" prst="rect">
+          <a:avLst/>
+        </a:prstGeom>
+      </cdr:spPr>
+      <cdr:txBody>
+        <a:bodyPr xmlns:a="http://schemas.openxmlformats.org/drawingml/2006/main" wrap="square" rtlCol="0"/>
+        <a:lstStyle xmlns:a="http://schemas.openxmlformats.org/drawingml/2006/main">
+          <a:lvl1pPr marL="0" indent="0">
+            <a:defRPr sz="1100">
+              <a:latin typeface="+mn-lt"/>
+              <a:ea typeface="+mn-ea"/>
+              <a:cs typeface="+mn-cs"/>
+            </a:defRPr>
+          </a:lvl1pPr>
+          <a:lvl2pPr marL="457200" indent="0">
+            <a:defRPr sz="1100">
+              <a:latin typeface="+mn-lt"/>
+              <a:ea typeface="+mn-ea"/>
+              <a:cs typeface="+mn-cs"/>
+            </a:defRPr>
+          </a:lvl2pPr>
+          <a:lvl3pPr marL="914400" indent="0">
+            <a:defRPr sz="1100">
+              <a:latin typeface="+mn-lt"/>
+              <a:ea typeface="+mn-ea"/>
+              <a:cs typeface="+mn-cs"/>
+            </a:defRPr>
+          </a:lvl3pPr>
+          <a:lvl4pPr marL="1371600" indent="0">
+            <a:defRPr sz="1100">
+              <a:latin typeface="+mn-lt"/>
+              <a:ea typeface="+mn-ea"/>
+              <a:cs typeface="+mn-cs"/>
+            </a:defRPr>
+          </a:lvl4pPr>
+          <a:lvl5pPr marL="1828800" indent="0">
+            <a:defRPr sz="1100">
+              <a:latin typeface="+mn-lt"/>
+              <a:ea typeface="+mn-ea"/>
+              <a:cs typeface="+mn-cs"/>
+            </a:defRPr>
+          </a:lvl5pPr>
+          <a:lvl6pPr marL="2286000" indent="0">
+            <a:defRPr sz="1100">
+              <a:latin typeface="+mn-lt"/>
+              <a:ea typeface="+mn-ea"/>
+              <a:cs typeface="+mn-cs"/>
+            </a:defRPr>
+          </a:lvl6pPr>
+          <a:lvl7pPr marL="2743200" indent="0">
+            <a:defRPr sz="1100">
+              <a:latin typeface="+mn-lt"/>
+              <a:ea typeface="+mn-ea"/>
+              <a:cs typeface="+mn-cs"/>
+            </a:defRPr>
+          </a:lvl7pPr>
+          <a:lvl8pPr marL="3200400" indent="0">
+            <a:defRPr sz="1100">
+              <a:latin typeface="+mn-lt"/>
+              <a:ea typeface="+mn-ea"/>
+              <a:cs typeface="+mn-cs"/>
+            </a:defRPr>
+          </a:lvl8pPr>
+          <a:lvl9pPr marL="3657600" indent="0">
+            <a:defRPr sz="1100">
+              <a:latin typeface="+mn-lt"/>
+              <a:ea typeface="+mn-ea"/>
+              <a:cs typeface="+mn-cs"/>
+            </a:defRPr>
+          </a:lvl9pPr>
+        </a:lstStyle>
+        <a:p xmlns:a="http://schemas.openxmlformats.org/drawingml/2006/main">
+          <a:r>
+            <a:rPr lang="en-US" sz="1100">
+              <a:latin typeface="Times New Roman" pitchFamily="18" charset="0"/>
+              <a:cs typeface="Times New Roman" pitchFamily="18" charset="0"/>
+            </a:rPr>
+            <a:t>SNAP-1</a:t>
+          </a:r>
+        </a:p>
+      </cdr:txBody>
+    </cdr:sp>
+  </cdr:relSizeAnchor>
+</c:userShapes>
 </file>
 
 <file path=ppt/notesMasters/notesMaster1.xml><?xml version="1.0" encoding="utf-8"?>
@@ -2471,7 +3451,7 @@
                 <a:latin typeface="Times New Roman" pitchFamily="16" charset="0"/>
               </a:rPr>
               <a:pPr eaLnBrk="1"/>
-              <a:t>24</a:t>
+              <a:t>27</a:t>
             </a:fld>
             <a:endParaRPr lang="en-US" altLang="en-US" smtClean="0">
               <a:solidFill>
@@ -12677,7 +13657,7 @@
         <p:spPr>
           <a:xfrm>
             <a:off x="618331" y="1419225"/>
-            <a:ext cx="9210675" cy="3124200"/>
+            <a:ext cx="9210675" cy="3657600"/>
           </a:xfrm>
         </p:spPr>
         <p:txBody>
@@ -12697,8 +13677,113 @@
                   </a:schemeClr>
                 </a:solidFill>
               </a:rPr>
-              <a:t>Each of the design constraints listed in the previous section relate directly to design decisions made to </a:t>
-            </a:r>
+              <a:t>Each of the design constraints listed in the previous section relate directly to design decisions made in fulfilling the Rascal mission.</a:t>
+            </a:r>
+          </a:p>
+          <a:p>
+            <a:pPr lvl="1">
+              <a:buFont typeface="Arial" pitchFamily="34" charset="0"/>
+              <a:buChar char="•"/>
+            </a:pPr>
+            <a:r>
+              <a:rPr lang="en-US" sz="1800" dirty="0" smtClean="0">
+                <a:solidFill>
+                  <a:schemeClr val="tx1">
+                    <a:lumMod val="85000"/>
+                    <a:lumOff val="15000"/>
+                  </a:schemeClr>
+                </a:solidFill>
+              </a:rPr>
+              <a:t>Cost will relate directly to the type of mission that can be flown.</a:t>
+            </a:r>
+          </a:p>
+          <a:p>
+            <a:pPr lvl="1">
+              <a:buFont typeface="Arial" pitchFamily="34" charset="0"/>
+              <a:buChar char="•"/>
+            </a:pPr>
+            <a:r>
+              <a:rPr lang="en-US" sz="1800" dirty="0" smtClean="0">
+                <a:solidFill>
+                  <a:schemeClr val="tx1">
+                    <a:lumMod val="85000"/>
+                    <a:lumOff val="15000"/>
+                  </a:schemeClr>
+                </a:solidFill>
+              </a:rPr>
+              <a:t>Volume (not mass) will relate to the size of the mission that can be flown.</a:t>
+            </a:r>
+          </a:p>
+          <a:p>
+            <a:pPr lvl="1">
+              <a:buFont typeface="Arial" pitchFamily="34" charset="0"/>
+              <a:buChar char="•"/>
+            </a:pPr>
+            <a:r>
+              <a:rPr lang="en-US" sz="1800" dirty="0" smtClean="0">
+                <a:solidFill>
+                  <a:schemeClr val="tx1">
+                    <a:lumMod val="85000"/>
+                    <a:lumOff val="15000"/>
+                  </a:schemeClr>
+                </a:solidFill>
+              </a:rPr>
+              <a:t>Mission lifetime will relate to the subsystems required to keep mission alive for the duration of its orbit life.</a:t>
+            </a:r>
+          </a:p>
+          <a:p>
+            <a:pPr lvl="1">
+              <a:buFont typeface="Arial" pitchFamily="34" charset="0"/>
+              <a:buChar char="•"/>
+            </a:pPr>
+            <a:r>
+              <a:rPr lang="en-US" sz="1800" dirty="0" smtClean="0">
+                <a:solidFill>
+                  <a:schemeClr val="tx1">
+                    <a:lumMod val="85000"/>
+                    <a:lumOff val="15000"/>
+                  </a:schemeClr>
+                </a:solidFill>
+              </a:rPr>
+              <a:t>Mission success criteria will relate to the subsystems required to make the mission successful.</a:t>
+            </a:r>
+          </a:p>
+          <a:p>
+            <a:pPr lvl="1">
+              <a:buFont typeface="Arial" pitchFamily="34" charset="0"/>
+              <a:buChar char="•"/>
+            </a:pPr>
+            <a:r>
+              <a:rPr lang="en-US" sz="1800" dirty="0" smtClean="0">
+                <a:solidFill>
+                  <a:schemeClr val="tx1">
+                    <a:lumMod val="85000"/>
+                    <a:lumOff val="15000"/>
+                  </a:schemeClr>
+                </a:solidFill>
+              </a:rPr>
+              <a:t>Mission success verification will relate to the subsystems required to relay the successful completion of the mission to the ground.</a:t>
+            </a:r>
+          </a:p>
+          <a:p>
+            <a:pPr lvl="1">
+              <a:buFont typeface="Arial" pitchFamily="34" charset="0"/>
+              <a:buChar char="•"/>
+            </a:pPr>
+            <a:endParaRPr lang="en-US" sz="1800" dirty="0" smtClean="0">
+              <a:solidFill>
+                <a:schemeClr val="tx1">
+                  <a:lumMod val="85000"/>
+                  <a:lumOff val="15000"/>
+                </a:schemeClr>
+              </a:solidFill>
+            </a:endParaRPr>
+          </a:p>
+          <a:p>
+            <a:pPr>
+              <a:buFont typeface="Arial" pitchFamily="34" charset="0"/>
+              <a:buChar char="•"/>
+            </a:pPr>
             <a:endParaRPr lang="en-US" sz="1800" dirty="0" smtClean="0">
               <a:solidFill>
                 <a:schemeClr val="tx1">
@@ -12835,7 +13920,7 @@
                   </a:schemeClr>
                 </a:solidFill>
               </a:rPr>
-              <a:t>Tom Slide</a:t>
+              <a:t>Mission Architecture: Cost/Experience Based</a:t>
             </a:r>
             <a:endParaRPr lang="en-US" dirty="0">
               <a:solidFill>
@@ -12863,7 +13948,33 @@
           <a:bodyPr/>
           <a:lstStyle/>
           <a:p>
-            <a:endParaRPr lang="en-US"/>
+            <a:pPr>
+              <a:buFont typeface="Arial" pitchFamily="34" charset="0"/>
+              <a:buChar char="•"/>
+            </a:pPr>
+            <a:r>
+              <a:rPr lang="en-US" sz="2000" dirty="0" smtClean="0">
+                <a:solidFill>
+                  <a:schemeClr val="tx1"/>
+                </a:solidFill>
+              </a:rPr>
+              <a:t>Based on the relatively high costs associated with launch any non-CubeSat sized spacecraft, as well as the time and resources required to design, build, and test such a system, it is absolutely necessary to limit mission design to a CubeSat architecture.</a:t>
+            </a:r>
+          </a:p>
+          <a:p>
+            <a:r>
+              <a:rPr lang="en-US" sz="2000" dirty="0" smtClean="0">
+                <a:solidFill>
+                  <a:schemeClr val="tx1"/>
+                </a:solidFill>
+              </a:rPr>
+              <a:t> </a:t>
+            </a:r>
+            <a:endParaRPr lang="en-US" sz="2000" dirty="0">
+              <a:solidFill>
+                <a:schemeClr val="tx1"/>
+              </a:solidFill>
+            </a:endParaRPr>
           </a:p>
         </p:txBody>
       </p:sp>
@@ -12896,6 +14007,89 @@
           </a:p>
         </p:txBody>
       </p:sp>
+      <p:pic>
+        <p:nvPicPr>
+          <p:cNvPr id="52226" name="Picture 2" descr="http://astrolab.slu.edu/AstroLab/SLU-01__COPPER_files/IMG_9300.jpg"/>
+          <p:cNvPicPr>
+            <a:picLocks noChangeAspect="1" noChangeArrowheads="1"/>
+          </p:cNvPicPr>
+          <p:nvPr/>
+        </p:nvPicPr>
+        <p:blipFill>
+          <a:blip r:embed="rId2" cstate="print"/>
+          <a:srcRect/>
+          <a:stretch>
+            <a:fillRect/>
+          </a:stretch>
+        </p:blipFill>
+        <p:spPr bwMode="auto">
+          <a:xfrm>
+            <a:off x="999331" y="3095625"/>
+            <a:ext cx="5257800" cy="3505200"/>
+          </a:xfrm>
+          <a:prstGeom prst="rect">
+            <a:avLst/>
+          </a:prstGeom>
+          <a:noFill/>
+          <a:ln>
+            <a:solidFill>
+              <a:schemeClr val="tx1"/>
+            </a:solidFill>
+          </a:ln>
+        </p:spPr>
+      </p:pic>
+      <p:pic>
+        <p:nvPicPr>
+          <p:cNvPr id="52228" name="Picture 4" descr="http://astrolab.slu.edu/AstroLab/SLU-01__COPPER_files/COPPER%20patch.png"/>
+          <p:cNvPicPr>
+            <a:picLocks noChangeAspect="1" noChangeArrowheads="1"/>
+          </p:cNvPicPr>
+          <p:nvPr/>
+        </p:nvPicPr>
+        <p:blipFill>
+          <a:blip r:embed="rId3" cstate="print"/>
+          <a:srcRect/>
+          <a:stretch>
+            <a:fillRect/>
+          </a:stretch>
+        </p:blipFill>
+        <p:spPr bwMode="auto">
+          <a:xfrm>
+            <a:off x="7095331" y="2943225"/>
+            <a:ext cx="1828800" cy="1828800"/>
+          </a:xfrm>
+          <a:prstGeom prst="rect">
+            <a:avLst/>
+          </a:prstGeom>
+          <a:noFill/>
+        </p:spPr>
+      </p:pic>
+      <p:pic>
+        <p:nvPicPr>
+          <p:cNvPr id="52230" name="Picture 6" descr="http://astrolab.slu.edu/AstroLab/SLU-02__Argus_files/Argus%20Logo%20copy.png"/>
+          <p:cNvPicPr>
+            <a:picLocks noChangeAspect="1" noChangeArrowheads="1"/>
+          </p:cNvPicPr>
+          <p:nvPr/>
+        </p:nvPicPr>
+        <p:blipFill>
+          <a:blip r:embed="rId4" cstate="print"/>
+          <a:srcRect/>
+          <a:stretch>
+            <a:fillRect/>
+          </a:stretch>
+        </p:blipFill>
+        <p:spPr bwMode="auto">
+          <a:xfrm>
+            <a:off x="7095331" y="4619625"/>
+            <a:ext cx="1905000" cy="1905001"/>
+          </a:xfrm>
+          <a:prstGeom prst="rect">
+            <a:avLst/>
+          </a:prstGeom>
+          <a:noFill/>
+        </p:spPr>
+      </p:pic>
     </p:spTree>
   </p:cSld>
   <p:clrMapOvr>
@@ -12945,7 +14139,7 @@
                   </a:schemeClr>
                 </a:solidFill>
               </a:rPr>
-              <a:t>Here Be Subsystem Slides (Still Have to Make CDH/ADC ones)</a:t>
+              <a:t>Mission Architecture: Cost/Experience Based (2)</a:t>
             </a:r>
             <a:endParaRPr lang="en-US" dirty="0">
               <a:solidFill>
@@ -12973,7 +14167,19 @@
           <a:bodyPr/>
           <a:lstStyle/>
           <a:p>
-            <a:endParaRPr lang="en-US"/>
+            <a:r>
+              <a:rPr lang="en-US" sz="2000" dirty="0" smtClean="0">
+                <a:solidFill>
+                  <a:schemeClr val="tx1"/>
+                </a:solidFill>
+              </a:rPr>
+              <a:t> </a:t>
+            </a:r>
+            <a:endParaRPr lang="en-US" sz="2000" dirty="0">
+              <a:solidFill>
+                <a:schemeClr val="tx1"/>
+              </a:solidFill>
+            </a:endParaRPr>
           </a:p>
         </p:txBody>
       </p:sp>
@@ -13006,6 +14212,24 @@
           </a:p>
         </p:txBody>
       </p:sp>
+      <p:graphicFrame>
+        <p:nvGraphicFramePr>
+          <p:cNvPr id="5" name="Chart 4"/>
+          <p:cNvGraphicFramePr>
+            <a:graphicFrameLocks noGrp="1"/>
+          </p:cNvGraphicFramePr>
+          <p:nvPr/>
+        </p:nvGraphicFramePr>
+        <p:xfrm>
+          <a:off x="694531" y="1114425"/>
+          <a:ext cx="8763000" cy="5867400"/>
+        </p:xfrm>
+        <a:graphic>
+          <a:graphicData uri="http://schemas.openxmlformats.org/drawingml/2006/chart">
+            <c:chart xmlns:c="http://schemas.openxmlformats.org/drawingml/2006/chart" xmlns:r="http://schemas.openxmlformats.org/officeDocument/2006/relationships" r:id="rId2"/>
+          </a:graphicData>
+        </a:graphic>
+      </p:graphicFrame>
     </p:spTree>
   </p:cSld>
   <p:clrMapOvr>
@@ -13033,88 +14257,21 @@
       </p:grpSpPr>
       <p:sp>
         <p:nvSpPr>
-          <p:cNvPr id="2" name="Subtitle 1"/>
+          <p:cNvPr id="2" name="Title 1"/>
           <p:cNvSpPr>
             <a:spLocks noGrp="1"/>
           </p:cNvSpPr>
           <p:nvPr>
-            <p:ph type="subTitle" idx="1"/>
+            <p:ph type="title"/>
           </p:nvPr>
         </p:nvSpPr>
-        <p:spPr>
-          <a:xfrm>
-            <a:off x="1456531" y="971338"/>
-            <a:ext cx="7053104" cy="6591512"/>
-          </a:xfrm>
-        </p:spPr>
+        <p:spPr/>
         <p:txBody>
           <a:bodyPr/>
           <a:lstStyle/>
           <a:p>
             <a:r>
-              <a:rPr lang="en-US" sz="3200" dirty="0" smtClean="0">
-                <a:solidFill>
-                  <a:schemeClr val="bg1">
-                    <a:lumMod val="65000"/>
-                  </a:schemeClr>
-                </a:solidFill>
-              </a:rPr>
-              <a:t>Group Organization</a:t>
-            </a:r>
-            <a:endParaRPr lang="en-US" sz="3200" dirty="0" smtClean="0">
-              <a:solidFill>
-                <a:schemeClr val="bg1">
-                  <a:lumMod val="65000"/>
-                </a:schemeClr>
-              </a:solidFill>
-            </a:endParaRPr>
-          </a:p>
-          <a:p>
-            <a:r>
-              <a:rPr lang="en-US" sz="3200" dirty="0" smtClean="0">
-                <a:solidFill>
-                  <a:schemeClr val="bg1">
-                    <a:lumMod val="65000"/>
-                  </a:schemeClr>
-                </a:solidFill>
-              </a:rPr>
-              <a:t>Project Overview</a:t>
-            </a:r>
-          </a:p>
-          <a:p>
-            <a:r>
-              <a:rPr lang="en-US" sz="3200" dirty="0" smtClean="0">
-                <a:solidFill>
-                  <a:schemeClr val="bg1">
-                    <a:lumMod val="65000"/>
-                  </a:schemeClr>
-                </a:solidFill>
-              </a:rPr>
-              <a:t>Design Constraints</a:t>
-            </a:r>
-            <a:endParaRPr lang="en-US" sz="3200" dirty="0" smtClean="0">
-              <a:solidFill>
-                <a:schemeClr val="bg1">
-                  <a:lumMod val="65000"/>
-                </a:schemeClr>
-              </a:solidFill>
-            </a:endParaRPr>
-          </a:p>
-          <a:p>
-            <a:r>
-              <a:rPr lang="en-US" sz="3200" dirty="0" smtClean="0">
-                <a:solidFill>
-                  <a:schemeClr val="bg1">
-                    <a:lumMod val="65000"/>
-                  </a:schemeClr>
-                </a:solidFill>
-              </a:rPr>
-              <a:t>Mission Architecture</a:t>
-            </a:r>
-          </a:p>
-          <a:p>
-            <a:r>
-              <a:rPr lang="en-US" sz="3200" dirty="0" smtClean="0">
+              <a:rPr lang="en-US" dirty="0" smtClean="0">
                 <a:solidFill>
                   <a:schemeClr val="tx1">
                     <a:lumMod val="85000"/>
@@ -13122,78 +14279,171 @@
                   </a:schemeClr>
                 </a:solidFill>
               </a:rPr>
-              <a:t>CONOPS</a:t>
-            </a:r>
-          </a:p>
-          <a:p>
-            <a:r>
-              <a:rPr lang="en-US" sz="3200" dirty="0" smtClean="0">
-                <a:solidFill>
-                  <a:schemeClr val="bg1">
-                    <a:lumMod val="65000"/>
-                  </a:schemeClr>
-                </a:solidFill>
-              </a:rPr>
-              <a:t>Risk Assessment</a:t>
-            </a:r>
-          </a:p>
-          <a:p>
-            <a:r>
-              <a:rPr lang="en-US" sz="3200" dirty="0" smtClean="0">
-                <a:solidFill>
-                  <a:schemeClr val="bg1">
-                    <a:lumMod val="65000"/>
-                  </a:schemeClr>
-                </a:solidFill>
-              </a:rPr>
-              <a:t>Schedule</a:t>
-            </a:r>
-          </a:p>
-          <a:p>
-            <a:endParaRPr lang="en-US" sz="4000" dirty="0">
+              <a:t>Mission Architecture: Volume Based</a:t>
+            </a:r>
+            <a:endParaRPr lang="en-US" dirty="0">
               <a:solidFill>
-                <a:schemeClr val="bg1">
-                  <a:lumMod val="65000"/>
+                <a:schemeClr val="tx1">
+                  <a:lumMod val="85000"/>
+                  <a:lumOff val="15000"/>
                 </a:schemeClr>
               </a:solidFill>
             </a:endParaRPr>
           </a:p>
-          <a:p>
-            <a:endParaRPr lang="en-US" dirty="0" smtClean="0">
+        </p:txBody>
+      </p:sp>
+      <p:sp>
+        <p:nvSpPr>
+          <p:cNvPr id="4" name="Slide Number Placeholder 3"/>
+          <p:cNvSpPr>
+            <a:spLocks noGrp="1"/>
+          </p:cNvSpPr>
+          <p:nvPr>
+            <p:ph type="sldNum" idx="12"/>
+          </p:nvPr>
+        </p:nvSpPr>
+        <p:spPr/>
+        <p:txBody>
+          <a:bodyPr/>
+          <a:lstStyle/>
+          <a:p>
+            <a:pPr>
+              <a:defRPr/>
+            </a:pPr>
+            <a:fld id="{8C6E2802-7AC4-44BB-B0A5-E12803E0614A}" type="slidenum">
+              <a:rPr lang="en-US" altLang="en-US" smtClean="0"/>
+              <a:pPr>
+                <a:defRPr/>
+              </a:pPr>
+              <a:t>18</a:t>
+            </a:fld>
+            <a:endParaRPr lang="en-US" altLang="en-US" dirty="0"/>
+          </a:p>
+        </p:txBody>
+      </p:sp>
+      <p:sp>
+        <p:nvSpPr>
+          <p:cNvPr id="6" name="Rectangle 5"/>
+          <p:cNvSpPr/>
+          <p:nvPr/>
+        </p:nvSpPr>
+        <p:spPr>
+          <a:xfrm>
+            <a:off x="923131" y="1359352"/>
+            <a:ext cx="8382000" cy="2496837"/>
+          </a:xfrm>
+          <a:prstGeom prst="rect">
+            <a:avLst/>
+          </a:prstGeom>
+        </p:spPr>
+        <p:txBody>
+          <a:bodyPr wrap="square">
+            <a:spAutoFit/>
+          </a:bodyPr>
+          <a:lstStyle/>
+          <a:p>
+            <a:pPr>
+              <a:buFont typeface="Arial" pitchFamily="34" charset="0"/>
+              <a:buChar char="•"/>
+            </a:pPr>
+            <a:r>
+              <a:rPr lang="en-US" sz="2000" dirty="0" smtClean="0">
+                <a:solidFill>
+                  <a:schemeClr val="tx1">
+                    <a:lumMod val="85000"/>
+                    <a:lumOff val="15000"/>
+                  </a:schemeClr>
+                </a:solidFill>
+              </a:rPr>
+              <a:t>Since the mission architecture will fit the CubeSat standard, its launch will rely on it being able to integrate into one of the currently available CubeSat deployers.</a:t>
+            </a:r>
+            <a:endParaRPr lang="en-US" sz="2000" dirty="0" smtClean="0">
               <a:solidFill>
-                <a:schemeClr val="bg1">
-                  <a:lumMod val="65000"/>
+                <a:schemeClr val="tx1">
+                  <a:lumMod val="85000"/>
+                  <a:lumOff val="15000"/>
                 </a:schemeClr>
               </a:solidFill>
             </a:endParaRPr>
           </a:p>
+          <a:p>
+            <a:pPr lvl="1">
+              <a:buFont typeface="Arial" pitchFamily="34" charset="0"/>
+              <a:buChar char="•"/>
+            </a:pPr>
+            <a:r>
+              <a:rPr lang="en-US" dirty="0" smtClean="0">
+                <a:solidFill>
+                  <a:schemeClr val="tx1">
+                    <a:lumMod val="85000"/>
+                    <a:lumOff val="15000"/>
+                  </a:schemeClr>
+                </a:solidFill>
+              </a:rPr>
+              <a:t>This means that a 6U volume is the largest volume that the spacecraft can attain will still being able to meet this constraint.</a:t>
+            </a:r>
+          </a:p>
+          <a:p>
+            <a:pPr lvl="1">
+              <a:buFont typeface="Arial" pitchFamily="34" charset="0"/>
+              <a:buChar char="•"/>
+            </a:pPr>
+            <a:r>
+              <a:rPr lang="en-US" dirty="0" smtClean="0">
+                <a:solidFill>
+                  <a:schemeClr val="tx1">
+                    <a:lumMod val="85000"/>
+                    <a:lumOff val="15000"/>
+                  </a:schemeClr>
+                </a:solidFill>
+              </a:rPr>
+              <a:t>It also means that a deployer must be selected for which the design of the mission will hinge upon, as each different deployer has different dimensional, structural, and electrical constraints associated with its use.</a:t>
+            </a:r>
+          </a:p>
+          <a:p>
+            <a:pPr lvl="1"/>
+            <a:endParaRPr lang="en-US" dirty="0" smtClean="0">
+              <a:solidFill>
+                <a:schemeClr val="tx1">
+                  <a:lumMod val="85000"/>
+                  <a:lumOff val="15000"/>
+                </a:schemeClr>
+              </a:solidFill>
+            </a:endParaRPr>
+          </a:p>
         </p:txBody>
       </p:sp>
+      <p:pic>
+        <p:nvPicPr>
+          <p:cNvPr id="57346" name="Picture 2" descr="http://www.nasa.gov/sites/default/files/images/746364main_smallsat_graph.jpg"/>
+          <p:cNvPicPr>
+            <a:picLocks noChangeAspect="1" noChangeArrowheads="1"/>
+          </p:cNvPicPr>
+          <p:nvPr/>
+        </p:nvPicPr>
+        <p:blipFill>
+          <a:blip r:embed="rId2" cstate="print"/>
+          <a:srcRect/>
+          <a:stretch>
+            <a:fillRect/>
+          </a:stretch>
+        </p:blipFill>
+        <p:spPr bwMode="auto">
+          <a:xfrm>
+            <a:off x="2904331" y="3629025"/>
+            <a:ext cx="4572000" cy="3476408"/>
+          </a:xfrm>
+          <a:prstGeom prst="rect">
+            <a:avLst/>
+          </a:prstGeom>
+          <a:noFill/>
+        </p:spPr>
+      </p:pic>
     </p:spTree>
-    <p:extLst>
-      <p:ext uri="{BB962C8B-B14F-4D97-AF65-F5344CB8AC3E}">
-        <p14:creationId xmlns:p14="http://schemas.microsoft.com/office/powerpoint/2010/main" xmlns="" val="1899034955"/>
-      </p:ext>
-    </p:extLst>
   </p:cSld>
   <p:clrMapOvr>
     <a:masterClrMapping/>
   </p:clrMapOvr>
-  <mc:AlternateContent xmlns:mc="http://schemas.openxmlformats.org/markup-compatibility/2006">
-    <mc:Choice xmlns:p14="http://schemas.microsoft.com/office/powerpoint/2010/main" xmlns="" Requires="p14">
-      <p:transition spd="slow" p14:dur="2000" advTm="1111"/>
-    </mc:Choice>
-    <mc:Fallback>
-      <p:transition spd="slow" advTm="1111"/>
-    </mc:Fallback>
-  </mc:AlternateContent>
-  <p:timing>
-    <p:tnLst>
-      <p:par>
-        <p:cTn id="1" dur="indefinite" restart="never" nodeType="tmRoot"/>
-      </p:par>
-    </p:tnLst>
-  </p:timing>
 </p:sld>
 </file>
 
@@ -13230,7 +14480,7 @@
           <a:lstStyle/>
           <a:p>
             <a:r>
-              <a:rPr lang="en-US" dirty="0" smtClean="0">
+              <a:rPr lang="en-US" b="1" dirty="0" smtClean="0">
                 <a:solidFill>
                   <a:schemeClr val="tx1">
                     <a:lumMod val="85000"/>
@@ -13238,9 +14488,9 @@
                   </a:schemeClr>
                 </a:solidFill>
               </a:rPr>
-              <a:t>Here be CONOPS</a:t>
-            </a:r>
-            <a:endParaRPr lang="en-US" dirty="0">
+              <a:t>Mission Architecture: Success Verification Based</a:t>
+            </a:r>
+            <a:endParaRPr lang="en-US" b="1" dirty="0">
               <a:solidFill>
                 <a:schemeClr val="tx1">
                   <a:lumMod val="85000"/>
@@ -13261,12 +14511,281 @@
             <p:ph idx="1"/>
           </p:nvPr>
         </p:nvSpPr>
-        <p:spPr/>
+        <p:spPr>
+          <a:xfrm>
+            <a:off x="618331" y="1419225"/>
+            <a:ext cx="9210675" cy="3657600"/>
+          </a:xfrm>
+        </p:spPr>
         <p:txBody>
           <a:bodyPr/>
           <a:lstStyle/>
           <a:p>
-            <a:endParaRPr lang="en-US"/>
+            <a:pPr>
+              <a:buFont typeface="Arial" pitchFamily="34" charset="0"/>
+              <a:buChar char="•"/>
+            </a:pPr>
+            <a:r>
+              <a:rPr lang="en-US" sz="2000" dirty="0" smtClean="0">
+                <a:solidFill>
+                  <a:schemeClr val="tx1">
+                    <a:lumMod val="85000"/>
+                    <a:lumOff val="15000"/>
+                  </a:schemeClr>
+                </a:solidFill>
+              </a:rPr>
+              <a:t>Based on the mission success criteria and the fact that mission success must be verified on the ground, it is clear that several subsystems will need to be integrated into the spacecraft that facilitate meeting these goals.</a:t>
+            </a:r>
+          </a:p>
+          <a:p>
+            <a:pPr>
+              <a:buFont typeface="Arial" pitchFamily="34" charset="0"/>
+              <a:buChar char="•"/>
+            </a:pPr>
+            <a:r>
+              <a:rPr lang="en-US" sz="2000" dirty="0" smtClean="0">
+                <a:solidFill>
+                  <a:schemeClr val="tx1">
+                    <a:lumMod val="85000"/>
+                    <a:lumOff val="15000"/>
+                  </a:schemeClr>
+                </a:solidFill>
+              </a:rPr>
+              <a:t>These subsystems, which will be described in slightly more detail on the following slides, consist of:</a:t>
+            </a:r>
+          </a:p>
+          <a:p>
+            <a:pPr lvl="1">
+              <a:buFont typeface="Arial" pitchFamily="34" charset="0"/>
+              <a:buChar char="•"/>
+            </a:pPr>
+            <a:r>
+              <a:rPr lang="en-US" sz="1800" b="1" u="sng" dirty="0" smtClean="0">
+                <a:solidFill>
+                  <a:schemeClr val="tx1">
+                    <a:lumMod val="85000"/>
+                    <a:lumOff val="15000"/>
+                  </a:schemeClr>
+                </a:solidFill>
+              </a:rPr>
+              <a:t>Structures</a:t>
+            </a:r>
+            <a:r>
+              <a:rPr lang="en-US" sz="1800" dirty="0" smtClean="0">
+                <a:solidFill>
+                  <a:schemeClr val="tx1">
+                    <a:lumMod val="85000"/>
+                    <a:lumOff val="15000"/>
+                  </a:schemeClr>
+                </a:solidFill>
+              </a:rPr>
+              <a:t>: determines the layout of each subsystem of the spacecraft and ensuring that it is capable of surviving launch and the on-orbit environment</a:t>
+            </a:r>
+          </a:p>
+          <a:p>
+            <a:pPr lvl="1">
+              <a:buFont typeface="Arial" pitchFamily="34" charset="0"/>
+              <a:buChar char="•"/>
+            </a:pPr>
+            <a:r>
+              <a:rPr lang="en-US" sz="1800" b="1" u="sng" dirty="0" smtClean="0">
+                <a:solidFill>
+                  <a:schemeClr val="tx1">
+                    <a:lumMod val="85000"/>
+                    <a:lumOff val="15000"/>
+                  </a:schemeClr>
+                </a:solidFill>
+              </a:rPr>
+              <a:t>Propulsion</a:t>
+            </a:r>
+            <a:r>
+              <a:rPr lang="en-US" sz="1800" dirty="0" smtClean="0">
+                <a:solidFill>
+                  <a:schemeClr val="tx1">
+                    <a:lumMod val="85000"/>
+                    <a:lumOff val="15000"/>
+                  </a:schemeClr>
+                </a:solidFill>
+              </a:rPr>
+              <a:t>: allows for the performance of orbital maneuvers to achieve each mission success criterion</a:t>
+            </a:r>
+          </a:p>
+          <a:p>
+            <a:pPr lvl="1">
+              <a:buFont typeface="Arial" pitchFamily="34" charset="0"/>
+              <a:buChar char="•"/>
+            </a:pPr>
+            <a:r>
+              <a:rPr lang="en-US" sz="1800" b="1" u="sng" dirty="0" smtClean="0">
+                <a:solidFill>
+                  <a:schemeClr val="tx1">
+                    <a:lumMod val="85000"/>
+                    <a:lumOff val="15000"/>
+                  </a:schemeClr>
+                </a:solidFill>
+              </a:rPr>
+              <a:t>Attitude Determination and Control</a:t>
+            </a:r>
+            <a:r>
+              <a:rPr lang="en-US" sz="1800" dirty="0" smtClean="0">
+                <a:solidFill>
+                  <a:schemeClr val="tx1">
+                    <a:lumMod val="85000"/>
+                    <a:lumOff val="15000"/>
+                  </a:schemeClr>
+                </a:solidFill>
+              </a:rPr>
+              <a:t>: determines the location and orientation of the spacecraft and to collect data related to controlling the propulsion system.</a:t>
+            </a:r>
+          </a:p>
+          <a:p>
+            <a:pPr lvl="1">
+              <a:buFont typeface="Arial" pitchFamily="34" charset="0"/>
+              <a:buChar char="•"/>
+            </a:pPr>
+            <a:r>
+              <a:rPr lang="en-US" sz="1800" b="1" u="sng" dirty="0" smtClean="0">
+                <a:solidFill>
+                  <a:schemeClr val="tx1">
+                    <a:lumMod val="85000"/>
+                    <a:lumOff val="15000"/>
+                  </a:schemeClr>
+                </a:solidFill>
+              </a:rPr>
+              <a:t>Communications</a:t>
+            </a:r>
+            <a:r>
+              <a:rPr lang="en-US" sz="1800" dirty="0" smtClean="0">
+                <a:solidFill>
+                  <a:schemeClr val="tx1">
+                    <a:lumMod val="85000"/>
+                    <a:lumOff val="15000"/>
+                  </a:schemeClr>
+                </a:solidFill>
+              </a:rPr>
+              <a:t>: allows for the communication of mission success to the ground and facilitating the observation of the spacecraft during its mission lifetime.</a:t>
+            </a:r>
+          </a:p>
+          <a:p>
+            <a:pPr lvl="1">
+              <a:buFont typeface="Arial" pitchFamily="34" charset="0"/>
+              <a:buChar char="•"/>
+            </a:pPr>
+            <a:r>
+              <a:rPr lang="en-US" sz="1800" b="1" u="sng" dirty="0" smtClean="0">
+                <a:solidFill>
+                  <a:schemeClr val="tx1">
+                    <a:lumMod val="85000"/>
+                    <a:lumOff val="15000"/>
+                  </a:schemeClr>
+                </a:solidFill>
+              </a:rPr>
+              <a:t>Command and Data Handling</a:t>
+            </a:r>
+            <a:r>
+              <a:rPr lang="en-US" sz="1800" dirty="0" smtClean="0">
+                <a:solidFill>
+                  <a:schemeClr val="tx1">
+                    <a:lumMod val="85000"/>
+                    <a:lumOff val="15000"/>
+                  </a:schemeClr>
+                </a:solidFill>
+              </a:rPr>
+              <a:t>: allows for recording of mission data and the handling of data exchanges between each subsystem of the spacecraft.</a:t>
+            </a:r>
+            <a:endParaRPr lang="en-US" sz="1800" b="1" u="sng" dirty="0" smtClean="0">
+              <a:solidFill>
+                <a:schemeClr val="tx1">
+                  <a:lumMod val="85000"/>
+                  <a:lumOff val="15000"/>
+                </a:schemeClr>
+              </a:solidFill>
+            </a:endParaRPr>
+          </a:p>
+          <a:p>
+            <a:pPr lvl="1">
+              <a:buFont typeface="Arial" pitchFamily="34" charset="0"/>
+              <a:buChar char="•"/>
+            </a:pPr>
+            <a:r>
+              <a:rPr lang="en-US" sz="1800" b="1" u="sng" dirty="0" smtClean="0">
+                <a:solidFill>
+                  <a:schemeClr val="tx1">
+                    <a:lumMod val="85000"/>
+                    <a:lumOff val="15000"/>
+                  </a:schemeClr>
+                </a:solidFill>
+              </a:rPr>
+              <a:t>Power</a:t>
+            </a:r>
+            <a:r>
+              <a:rPr lang="en-US" sz="1800" b="1" dirty="0" smtClean="0">
+                <a:solidFill>
+                  <a:schemeClr val="tx1">
+                    <a:lumMod val="85000"/>
+                    <a:lumOff val="15000"/>
+                  </a:schemeClr>
+                </a:solidFill>
+              </a:rPr>
+              <a:t>: </a:t>
+            </a:r>
+            <a:r>
+              <a:rPr lang="en-US" sz="1800" dirty="0" smtClean="0">
+                <a:solidFill>
+                  <a:schemeClr val="tx1">
+                    <a:lumMod val="85000"/>
+                    <a:lumOff val="15000"/>
+                  </a:schemeClr>
+                </a:solidFill>
+              </a:rPr>
+              <a:t>allows for the operation of each of the other subsystems over the course of the mission lifetime.</a:t>
+            </a:r>
+            <a:endParaRPr lang="en-US" sz="1800" b="1" u="sng" dirty="0" smtClean="0">
+              <a:solidFill>
+                <a:schemeClr val="tx1">
+                  <a:lumMod val="85000"/>
+                  <a:lumOff val="15000"/>
+                </a:schemeClr>
+              </a:solidFill>
+            </a:endParaRPr>
+          </a:p>
+          <a:p>
+            <a:pPr lvl="1">
+              <a:buFont typeface="Arial" pitchFamily="34" charset="0"/>
+              <a:buChar char="•"/>
+            </a:pPr>
+            <a:endParaRPr lang="en-US" sz="1800" dirty="0" smtClean="0">
+              <a:solidFill>
+                <a:schemeClr val="tx1">
+                  <a:lumMod val="85000"/>
+                  <a:lumOff val="15000"/>
+                </a:schemeClr>
+              </a:solidFill>
+            </a:endParaRPr>
+          </a:p>
+          <a:p>
+            <a:pPr>
+              <a:buFont typeface="Arial" pitchFamily="34" charset="0"/>
+              <a:buChar char="•"/>
+            </a:pPr>
+            <a:endParaRPr lang="en-US" sz="1800" dirty="0" smtClean="0">
+              <a:solidFill>
+                <a:schemeClr val="tx1">
+                  <a:lumMod val="85000"/>
+                  <a:lumOff val="15000"/>
+                </a:schemeClr>
+              </a:solidFill>
+            </a:endParaRPr>
+          </a:p>
+          <a:p>
+            <a:endParaRPr lang="en-US" dirty="0" smtClean="0">
+              <a:solidFill>
+                <a:schemeClr val="tx1">
+                  <a:lumMod val="85000"/>
+                  <a:lumOff val="15000"/>
+                </a:schemeClr>
+              </a:solidFill>
+            </a:endParaRPr>
           </a:p>
         </p:txBody>
       </p:sp>
@@ -13299,11 +14818,48 @@
           </a:p>
         </p:txBody>
       </p:sp>
+      <p:sp>
+        <p:nvSpPr>
+          <p:cNvPr id="40964" name="AutoShape 4" descr="data:image/jpeg;base64,/9j/4AAQSkZJRgABAQAAAQABAAD/2wCEAAkGBxQSEhUUExQWFRUXFxgZGBUWGBwbHBobHhwYFxsfIRwYHCggHhwmHRcYIjEkJykrLi4uHB8zODMsNygtLisBCgoKDg0OGhAQGywmICQ0LCwsLy8sLCwsLCwsLywsLSwsLCwsLCwsLCwsLCwsLC8sLCwxLDQsLSwsLCwsLDQsLP/AABEIAMoA+QMBIgACEQEDEQH/xAAbAAEAAgMBAQAAAAAAAAAAAAAABQYCAwQHAf/EAEEQAAIBAwMCBQIDBAcIAgMBAAECEQADIQQSMQVBBhMiUWEycUKBsRQjkaEzNFJic7LBJENyg8LR4fCCs2OT8RX/xAAZAQEAAwEBAAAAAAAAAAAAAAAAAQIEAwX/xAAwEQACAQMBBAkEAgMAAAAAAAAAAQIDESExBBJBYSIyUYGRscHh8DNxodETI0NSYv/aAAwDAQACEQMRAD8A9xpSlAKUpQClKUApSlAKwuXAoJJAAyScCozxD1pdLb3GNxB2j3iAfv8AUKpV25qtedwCrZOd5YhVjB7gmMyBgxBY1yqVYw1JSuTnWfGaowt2hkmDcYgKuJk+358cweDK9A60LmltXrrKpfd3iSCRiecCaqQt6XSLtRRfdztJuR+IDCKBOccDgqSSIqN6a15z/slvcqMq+pQYUksxljsEThcnviazR2l5lbHPBbdPVrdwMAQQQeCKzqi6TxHbFyLreTeG4kqCFIHIdW4gEc/cECrF03rJa2GvJ5UmJMbTkgGQTAODn3Amu1PaFLEsP5oQ4tExSvgNfa0FRSlKAUpSgFKUoBSlKAUpSgFKUoBSlKAUpXygPtKUoBSlKAUrn1etS0Jdgo+e/wCXJqlda8YPc9GkGWJUNgkkGTAVpI29x2PIPFJTUdSUrls6r1i3YWWMnJgcwIk/AEiqVrfEmp1bhNIGXcTnjaAYkmIE/PHYSawtdFKlrusuMu7cBaQ7mhjJBIBChtsYzx6prDU+IEtA27RVEgRbThMZ3NtyxJAIzkQfnJKvKbtD2LJWJfxBdVjY84hmtA71G0hmIRsk4UE22MQcA8AE1X9T1t7odFMkQAArFZOIC44zEiD7HiujpPhq9qQr3ybaCGXaVlgVBBABO0zmWk54AFXfp/TrdgEWxEmWY5ZickknJOayVNojF9LpP8FkisdN8HFmR9SwbaBCLOTydxPOYwIq2abTrbUKihVHAAgVtpWCpVlPVljg6l0e1fyygPBAuADcv2J/Q4qpdQ6Ve0iIYGptrcLFWHpWSSCV/DAP1Dj86vlKtTryhjgLIqnTevkXLh3qttVGzT7SWYDLFSD9XaPjjvVm6T1db6g7WRiAdlwbWg8c1EdV8M27u5k/duwIlQNpJ7sIyR8EVW763dO+nGqtm8ELhbm8jkLkEMBmMBhIPBAr09n2pWsvB66cDm4nplKqGg8SeVbZ7twXUV9sKrm4oYwsiJbnmIxMmrRpdWlwSjTHIyCPuDkV6EakZaFWjfSlKuQKUpQClKUApSlAKUpQClKUAr5X2vlQwfaV8qF6z4ltWAZYFuABxPPI9vijaWoJm5cCiSQB7nFVTrnjNLYZbILsPxDgerb3GfYe5981X7uq1fUc2zttg7TPpC9ySc5PBCk4ETk1kLWn0h32wLlwc3SvoBJA9CyMwTET9/fLU2lX3Y6/PAuo9phasX9Wxe7eFu2B9NyCYmWHlzMcwW/IRitx1VnTY06BDEb22+a05OWyBwcxAJxMA8apc1F64LKEvks4OCxgDPCqMnMknMTEWDoPg9LQVrxFy4CTHKCfgiWPyax1ZqP1H3FkV7SaDUa0kqdijaPMLMQ2Cpzy5EDHyZJJmrh0nw3ZsqAUW44Eb2UE8RA9h8VMIgAgAAewxX2sVXaJSxHCJsAIpSlZyRSlKAUpSgFYXrKuCrAMDyCJB/I1nSgKt1bwuwLPpXFtj+HIz3hlysjtx7RUfY6y1u6RfF0XdkbwxUAKcErO1iCckAyDweKvNc+u0SXVKuoIzB7j5B7H5rXT2prEvHiRY5On9cIt2zqPLlzt3Wm3qWzHCjtn4+KnbdwMJBBHuKoN7w9f0rBtJBUcgkltvLAjh/g8jivnSvEIBvEFvOJHogeWWiAJIG3ODuOPevUpbVfmu39r3KOJ6DSozTdXWUS9Fq6wkIWBB+zd6k61xkpK6KClKVYClKUApSlAKUpQCvlfa+VDBSfFfXbgvNYRxbIClTJG4tiJBHvOcYyDUfpujWrThrn726FAXTrJSAAsFmB3gEycQJ4rk8aT+3nE+m3JjjNOn9WOnZoOMkzkRPc8gS386w7SpO9jojd1Hq7m55CIyqAV8q2pKqMR6Fjd3HYCQZ5FdHSPB7vD6phO9mKAeppjlwcCR9IH5136fq9q4Wa0pW+SqttVfUcHliAwj5n2zU5a1sELcXYx9srPA9Xae0gVhnUnBWireZZG/S6RLYOxFWedoifv71upSsLd3dkilKVAFKUoBSlKAUpSgFKE18BpYH2lKUAqK6z0K3qFcRsdgR5iYaeATH1fnUrSrRk4u6BRH6bd0l1Cba37YTy97LPpiSAIZrYJnuV95muzoHX2S3JutqGa6V8ogKwLE7QpLxtUQDEzEwJq31X+reGUdWNn9287oGFJGe30z7jP3rbR2vKvh9v79irRYdJr0clQYccofqHHbuMjIxXXXmzF7F0i/aALoANQcsGAMQ/4iB2kGPsanuieIW22gxbU7hDXLVsjYwE+peykcEmfv29SntCa6Xjw9u8o42LXStWn1Cuu5Tj7QQe4IPBrbWm5UUpSgFKUoBXyvtKhg8s8a/1857Wse+f9OagergeYuYzj59dvFT3jYj9vOMxag+2c/wAqgupkLcA+TBOYO5IwfmKzSXTLomLmm/snb7gcEfkcfcV1aXqjqWDIhLJtNxxub+7BOHE52kj8q577ELg5xmPy4qH0/WVdypkjiCP+3fk/MQM85Ywck3qieRe+m9U2ra2M99nlWAT0qwmWMSbYmR3GMRU9p9arQD6Hz6GjdjmM5HyK84tOZBtORtIMAwR9j3Bzzg9qkLfVmCXlRVW4zb/MeT6jAY7VII9IMFT3+9Z57OpaE3PQKVAaDrP7xLYJvBrPmBlUwIAxu4YnsCd3vM1NafUK67lOPkEEH2IOQfisU6bjqWNtKUqgFKVydTF0pFnaHkZbsO8Yifv/ADqUruwM9XrUtj1MAYJC/iaPZeSftUVrNXqLgi2hSBuIxvjsvMBjk7QeB9Smt9voikE3WNy4wILNwJ4gcQK5ReuWztXaLuwKQ+AxUYZCYDYmVkZ/jXemo8Msg0aG3Z2st9juU53vuEn1Qvsf7sbvivuitl2Js2otRzcld3MbSF3Lx889jWoX7ZV11L3t7YINpwMCMQpRxk5iKaDqF4ubdos6gBQWXOcbsncsdw2D+GK7NPLX5vbuIJLp3UAsBywUqzA3TlCGCMjMcSCwj3HvEnOz1R7rgWrZ2BoNx8CAYMDv3/7VlpOl4/ecAkhQZyTJJaJJJzGB8VJogAAAgAQAOwrPKUL4RJ9pSlcSRSlKA13rCuIZQw9iJqr9Q8LuhD6W4ybc+WDEj+yG9vg4nvVspXSFWUNAUPT9bZPMVkazeJk3WLCWgDcyQfRiMSPgVbrHiBN6oxVtylhct5SBgy2QuZ7n7196p0m1qF23k3DjkgwecjNVjVdM1OjZrli6DZiSCssWkASigbjHdYPGMV6NDauCxyencUa7S/W3DAEEEHgjINZVR+kdesrFpL3l3oDMjlnSST6dzcT8EH78VO9P6wdZb3acgAOUdzypAVjtBHqkMIJx8HivRpVlPg0UasS2o1KpG5gJwJOSfYDufgVwdI6t+0Nc2rtFt9jBj6t21XyB9OGGDnmQIrrs6JVbdlm43MZP5DgfkBXJ0fR27dzUlEC7r25oESTbtEk/Mk12IJSvlfa+VDB5d41J/byO0Wp/jj+dQeuBNwSdv1SOZh0MY94/KpvxtH7eZmYtR/HM/lUF1Zv3qcjOI999v/SazS65dEzqj6fzH61SNCPXd+4/6qu+r+k/cfqKpGgP7y79x/1Vnj9Gfd5o7UPqL5wZKW9U6jBx/wCd3P8AxZ/jUla6irAB+/sDuxn8Pz9gf4iolBJA+a+H8x9sfpXGM8ZNVShGTxhlm0uruoUa252iQyrHBgQRxj3WPipPpfUES2FU+UVuH97dus3pP1Hc+7PEK2PkRVY6SbhDEEEgkfMQCB8xwPaT3Nddx0eQ2GIgnt2gEH/0fE1eUEzC+i7Pgei2eo+raSHAAO9BIEgn1AfSCBIPHPGJ7rN1WAZSCDwQZH8q8+0/Urtr07yEZSvp7HgENyhzjtUz0XqPmBBYDITO/wA5skrj6Yg7u5BU+9Y6mz2yiUy10qO0nWLbts3LuB24YFSw5UEfiHsYP3qRrNKLi7MkVi9sHBAPfNZUqoMfKHsKW7YUQAAPYYrKlTcCqp4l8XHTam1p0W07NsLrcvLbch3CKLat/SPhjEjt71a6qviXwm2pveYlxbYdbaXt1vezIlzzF2NuGxssJg9vaulHc3unoQzf1fxK1izrrgthv2SIG6N820uZxj6478VO6K9vto8RuVWj2kA/61UvEfg/Uai5fFvV+Vp9Tt86z5KsxhQh2uTKyqgVb9PaCKqjhQAPsBAqaihurd19l63CubK13L6qVDMAWMKCYk+w9zWyawuWlaJAMGRI4PuPmuStfJJnXx3ABJMAZJPaoHqnWl0rOWcvuMhDAW3C8SM5gmIJzxFV/Va/Va241q0CFUmSIAVo4ciRGf7xmCIrvDZ5Szw7SLk71jxbatEqpDsCAc4kiRn292OB7ziq+x1OpBe+x09mFLXWIQQNxESATlvge8muXUajS6T03P8Aa9Qvb/do3ME8sc99x+1QfVOo3tS037hYA4QelR+Q/UyfmK20qKXVXe9e5DU6+o/s6C4ulV3ITbc1JZisZgBPpjP1AD7mK9K8D6VU0iOJm9+9ef7TBQYAGBCjFeWII0uojH9GPyk/+a9b8I/1LT/4S/pW7Z8XRznFXvxJeuPQ/Xf/AMUf/VarsmuPQ/Xf/wAQf/VarSVOyvlfaVDB5b41J/bjicWs+3q/14qC6pIcBRzMkdgXQT/E1avFPSbt7XMLaXMom1gPRIzLMcQPiTNVvqugueeLch7i7mOwMQdrIzACJP8A3rNO6lvF0TFrSPdJRBO1QT78wP4waq/UelPaYtbUspXc9vAdCPqx+Je4I9+0VYtL1l7V9Ra2Mr4ae8DcMj/j/lVls6jT6wsAGW4hgN9LCO4KnjMc+9Zo1JU9VdPUnKd1qeXae8rcH7j2rOrZ1/wmIZyIaSwu2l9X2dZAI7yucd5qp6yy9iDch0Jhb1vKE+2YIYe3NP4FUX9Lvyevd2+fI109qX+THPh7Ez4f4f8A4h+grDxZdKWNwidyjIBwcEZ7EYrLw4wKuRkbh+grT4y/q/8A80/Wr7PH++EX2x9DJXfWa5mvRdSK/V3BJ5jsfy7/AH/WTQh4KtBmdskqW5Bxnt+fcVXhWSXCOO38P/H5Vy3+k7mqezKycS5WeuOqMjnaCcEAF4GWjdIae3fNTnTuqMbpt2LbNaFsOHYgIOAUH4ge+RHIwIqh6bqU+lszA9RgzHY98x89+1SWjumRcRjgERORI45gg/P8apOnFxM7upWZ6NpdYtwCDmJ2nkdv/YrorzvR9S9FlT5dlbV4FtlvOwnjkFCSZJE8GrXoepNuuAJcuW0Ii5Alt3q9PZwsxIgyIg81jqUHHQJkzStdi+rruUhge4/n+dbKzkilK06mxvAG5lhlb0mJggwfgxmpQN1YX7yopZjCgSSewrmu6l0a4XVRaVQVbdkn8QIOB8Zqqde8XI6G2EYbwwbcRK8YO0mJ7xJA7GutOjKbXYGy0P1iwAzeYvpmYOcCf9R/GvPhrrvmbLZa4z7jC7iCjZiGOeMnC5IBjNbR0V2t+dqriWLBacghsTACn3zG4yOwzWnWde2qyaFRpxtk3LmXcjhRG6JHH6Ct9KnGF1DN+3RfORU7tP0dVH+1E3bzRcOmtAG40KEAYgwFiBiAMCaius+ILt4eXHkIuPKQxMGIYjmIiBj71E6bqV5HZ9+244Kt5ZMlTtJJZvUT6Rkn4GMVp1CuuXEDmIM/cTXf+K0rt3+cESuZkiR8n3rKtdpuBzj6vf8A81sroWO1MaW+f7RUfwBNeq+FHA0Wmk820A+8V5Sv9Tvf4uP/ANan/U16X0H+q6DH9nt/+K5XShqzlMkBbvDUuxBNrYNsNwcYCzEzJkjiM9qj9D028pUXA7ib8sbv4TculBhgZKunYxt5ECevUWNQCdrMR5vp+mNhVPqyCAG38Sa+3rOoNpgpi4zMwM/Ss+hQSDmAu6fdoPFaCh26Qi1aQOwBhRJb8R7Sxk5+a65qvdVD+Q4uA5ayFmGlg4kiJgH5j7CrDFAceg+q9/if9KVXeu+HnF03rGZO6AYZWyCyzggg5B+eZgdt7qz2L5U6e49u5dI823kW4RSS45C85E8dqsCOGEggg9wZqs4KSsweQ6/e113gtfVgpJ9EQPVIg5IODx8d6jL5K2WUkBtu4qpn6oK5HebbYr2Hq3RLOoB3rDERvXDAdsiqT1joV+wQfSyCT5qj6WyAWQ/B5ms8qTjpoXUu009H8VOrLauAG2qS1wk78Ec8zAZT8ipl9DY1Qa5Ydd30kgAg9yGVhBFUs2QCXXcxY7SZEbQFQieS5KDt8Vlo7l7TlUDm2S8MoPbn/qg1mdJPKwWZ3P059K7g2gttmZgycL8c8AR/7xEeLHD6aVMjeuR96uPSfFdu+SlwAKAAXYiCchpHY7lYVh1LwrbuLvsFdrQSoMo45wRjPvU06u7VjOpqmn9yko3i0igIcVsB9J+4+1dOv6DctM3lTAJPkv8AXHJ2H8cZ4zwYzUfZ1AMjIPdTg/wqs6LV5xzHPdftXDyPQpV4zSjo/mhjrnK23YchGI+4BNWf9jgBkmcHbMdoMYx2/hH2qvU/6G7/AMD/AOU1drX0j7D9K5wk1HBz2vrI4G1Ck7bghhEEZZSeDjOeeIzB+dysTuVj5lq4m1l5Vh33KPzyPtFVzq39cb/hH+VBXXpuoMnv8nn4Eg8x8H/uO84qNs6q/wA8DPCnKUW1wZdundZ8w2CTb04jYRJLEjhVIO2I7MCasOj6luDFx6VMeYFIU5jg5WO5OO8153buI+RCtMzyN3E4waktH1O4jbLjMUJUqskDHKhh7/2TzNZalGLIvqehTUF1rxPasiFO54aB2x+ueMic5EEji6lrbH7KwVjbGB5YME5EgATyJyMDNVpbml0yBr5/abt0K4sr9Ken0h885jPA4GM8qWzp5lf7E3Oy9+064l/SlhlYG4zehVIgzxMDBAAB7nmudOo2NKUt6MftN4zF1+EmFhBAEnt9sk1D9V6vf1WLrBbciLKYUR9P/v6V1eG9Gu5r7fRZBcgclgCV/hH8hWxx3Y9LTsQscnWzc88m+267CiZnBAMCMAZ4HzXGs8k7FmN32yTjMfasuo9UBZrjy1xzMRgLEfmeOePY8iJe9cvHLYiOYAA7fb4rrHCV9TpCm5fY6bvVFtibfY7t/cCMxnBJJMzInmuu5g24/EjEj7FAP1NV7XLCuAQcHI71YbvNn/Cf/MlWTuiakFBqxpuW4yBKkyR7fIrYj+8Z4I7is6wtaRiTsUkRJUSSI7ihTQ69SP8AZQY/3r/ySP8ASvXPCH9S0/8AhJ+leVdV6t5mnt2ggVbakkj8TQc/HNeq+EP6lp/8JP0rps983OcyYri0P13/APFH/wBVqu2oTovUd97VIy7GW9AEglgLVn1Y4BxWk5k3FKUoD5Fcd3QerfbY22PI5RjEAsuJPyCDgZjFdtKA4LWvKwt8BGJ2g/gYxMg9vs0H713GvlxAwIIBB5BqPuWbttt1uGtBf6HvuEAbWJhcdjj7STQHD1nwrbvkspa25MypwT8gjvwYjmqN1HpNywXV7QQR6bmCmfr2ngHH4hPsBzXqWk1a3BIkHupwynuCPvWWosK6lXUMp5UiQfyrnOkpEp2PGfIVAPK3N5ig8YBY7bY92Yh2JIEYHFdfTOt3NP5dpP8AdWgHtRy4TI/iAMH86tfXPCDbg+naEXJs/HcKYxGIHbtFVTT6S1bU7bQQrcXcSpB2rkgKIyxHJ+Z71mlBrEkXuWzR9Ts6xXV127Tt9RGcxIPvxj5HNRXiHwoLijDXAv4ww84L7BmlWAjgifkVVtVa2ILZdXf0lwJ/Eu6OIn0qcVO9K8Q3LWo2XG/2faSBGVAKgEEdsk/aK4pSg96mw0nhlT6z0u7bS6oBu29pXeohgSCAGU5H3iD2Jq3W+B9h+lWC5ptPrrRe3BJBAYSCpjv3qt63S3tKT5k3LfZxkiT3+I/94qJTU8WSfHhf08g2+LuVjq39cb/hH+VK+V86vdH7Tu/C6gK3b6V/1BFJq21xaVN/8+rNmxNbslz9EbJKmQfy/wBDUp0zWSApx24xJ4//AJ/5qKuNOZBwMisUPqt/41v/AC3f+1c49Zx4CtBOnvcST1F1mRySfRsiP73pP8iajw013N/R3v8AlfqKjNNO3Puf1NaE9UZIpXubSamurKNPYt6cCTe9d3OT9Ij3AjH5Vz+HdKLl9d30pLt7enifzj+FcvUNWb153JkFoU/AJH8P+1UfSmo8Fl+n7LMrurM3Gj3gflit7IzL6sACdi+3v3j86xu3trPH1bj6vYZBrVaR3wJOePv+pq3Fo2LqpmGocunlgCOw+cxJ/Op6+hBsyP8AdP8AzZI/1rZoekJb2NeDMSQfKSd5TMtj6BMD+0e2M1t1guM43qQY2qqqQAq8KqjsPialGapNSeDlq0+DmuMly3bWd5hnAyoj+1wP1z8V96X4YVFF7WN5dsAk2yYbERPf/wCIzx9q5upeJ2bZb0i/s9kTKqAGYyIjbwInHPGe1cZS3+jHx4e5TU5PFPlg+XatLbCegwSWJjMicgSMxJnntV78DdWB0iJcG1rbCyFGSxCo3Ak/jz7ROBVR6H4Ov6gByfKWQQXBlveB7fJ79q9J6T0+3ZDrbUKN8+5JKpJJOST7/ArdRhuxOM27hfNu7gwNlCIEEG58+6qP4nPaurSaVLa7UUKPYfqT3PzW6ldiBSlKAUpSgFKUoDn1WjW5BMhh9LKYYfYj9ODXO+puWi3mLut8i4gkj4KCWP3UH7CpClAYWbquAykEHgio7rXQbOqUrdWT/aGGGZ5rovaAfVbPltJJ2jDE5O5eDPvz81t1GoFtdzmBiT8kgfqahq4TtlFE6r4dvWWZlzb2t+8SN6g4yDmQD9Q9u1VQ6dSiG2rkw6By0ACNqjaRJE8s0DHtXr//APp24uGTFvDEqfcjGM5BGKrvW9JpL0bWNu4SrDarQ8njYMNPB71xlR/1LKR5/pnuW3thbkBDtJRgRvVpPBjAeDVw0XilW8wXwqokAuJOcCNoBnPtUXrul3LW8OirbIBVwJBXBMEibZgAHHfvFQl7T3I8tFZ/Mgl8fVLMABORAB3fb7VmnBPEkWuXHWeHbN5C9kI6uD6TBUzwQeVYe4P3qmdT8O3LTqthTJmbLkSIj6XMK09hhs8GJrv0HV7lu9bCO2wBmKKfS0CDjjlD/wCmrToutafVqfORUH4d5EEfB5B+Kqp1KatrHsfz8rI0d1hnmlu+CdplWGCrYIPtWxfqt/41v/Leq89c8LBwzR5sgw0nzVPIIefUPgz+VU+90t7LWpfeDeSAVIZQFuTvBmDLRMn+dTGNKXSg7cn6P9/k6yrylHdku86W/o73/K/zCo2y8g/BIqSb+jvf8r9RWnoWi8y8qQCN25542iC0/cY/OrNpbzfzBziSjt5GigDbd1B+/o4H2EZj5NQYHH5V3de1fnahmH0L6FE4xyft8feuGq0lZXeryXNQ6KT+8chLbOQGP3gkKssw+QI9yK7f2tbcjTpsHHmvBuD32n8IPxn+9U54V6f5gJa35g94GApMgFgRJJ+4g5Far/UNMmoBTSBgwcIhcn1KVAJQAgTJxnjFS53bSVyHJvU1dK0tyzYfU5CkhQTEurGWABwRgffPzW/qPiZne26kbrZBRQIWCpye5MmNsgRPxTTefr9Utm+biITO0CFRQD+A8TkSwnIwJxcdL4G063TcJLr+G0fpH37sPg1eFBy6UtSjaKPY6fq9e5cKXz9bHaig9hOIEcLJq/8AQfB9jTEOR5l0fjbgH+6vA+/NT1iwqKFRVVRgKoAAHwBgVyPq3uEraXEZut9IPsF5Y/wHz2rTCmolXJs6NbrEsqWdoA/Mn4AGSfYDJrm6LrfOVrnlvbBYbRcADEbEIO0Ekc8GDjit2m0IWCxNx+d7ZM/A4UfAiuuK6FRSlKAUpSgFKUoBSlKAUpSgFRvUdUm2953otIAWef8A5HEdoH3qSqM6p0ZNQl1LhbbcH4CVI9O3kGgOPzbDM48y6zMyDhjw7lYO36QxbPGI7Vhr7OmVgLjXAyQUweSQfTC+ozEjNdFvoG0jbfugBlO30kEKWbaSVkrLseZ+az6l0Jb8+ZcciICwpUZBOCsNMCQ0jFAddqHDWyspsX6s7lYMCCCPj+dQHV/CS7ZsDg/0bHB+xP0kdv8ASp5l8oFgCwCou1RkBd0kAc4PAHbFdFjUK4lTMcjgg8wQcgwRzVZQUlZg8kv6NrYdGtrYbccEAGJOVIxDFjPyTya5H0+BbQFyCp3BSDgbmwRMDcM/Br2DX9OtXl23EVsEAkZE+x5B+1U7rPhS5bLOjtcQiCgEOBIPIPrHuIHAwa4SpNZRZSILpPiq6lxkuR5dtLcqFzJmQD7ZH8Ksto6fXIHEqxkc7WkYOO/5e9U79k80YAtlid+5fUGLEgH1fu1WeIP5VosrFxEX1KjM3mqCAZLLInjIEH5EVmcE8rUu1bBiwi3e/wCV+orf0rX27OnvCGN66ds/hVNoH+rfyrQw/d3f+UJ/MfzrV03VC1cRyAdrKRPbnMHBjmryhe9+XkEa9NonLC2qMXP4YM5zMe2ZmrLp+gWdMu/XPBP0WkaSYOZ289uMD3rh1viK557XkJVyhtz+ELOIHBPeT/a+M7ejeHNTrG3uWVcTduhiSMkbQYLD8wBPNRuTm7aefiTfGTDqHie46+Tp18izhUS2IePaV9/Yfxqf8F+F7lm8L98BYTaikgkltpmOxG2PfJqzeH/DdnSqAoD3MzdYDcZ9vYdoFdHVVBfTzGLx5HB8q6B+cxHzWmlRUCkpX0Pmo01zzVZSdq7cSMyx3z7wsRXHe0epDbkd9pdnKMVJEFAqA/2CN7fwFcdu/qCDH7QQZ2g21VgRhpnBwCy8fVHauh79/wAu1/TbmZwPQMDdKG57ekRHu3xXcoSPR7T27e267MxYkG4VLGRMenGDIx7VI1WLPmNb0xvBvMGoT6hkelt2BwJ3Z9qs9AKUpQClKUApSlAKUpQClKUApSlAKUpQClKUArmv6JWYP9LgQHXmPb5Hwa6aUBHrqntj98BA/wB4v0x7sD9PzyK7lYESDIPBFfSK4m6ftYNaOyMFI9DD22ggA/3h880Bq6r0S3fywIcCA4Ofz7H86o3VegXrIbzfXbNxGm3uAO3I3hTIBJM5ir/Z13a6PLaQBJ9LE/2W78HHPxXWygiCAQe1c50oy+5Kk0eNdR0YCGPqJEAD2K9+OAcfFSngzwmmrU3rrHywWQIIkkYaTGB2EZ+RVw6v4Z0927bLhhuMbUIVTCtyIkYkYip3T6dLS7UVUUdgABUQptdZ3G8yB6X4L09lt5BuEGV3nA9scGPczVgv3lRSzGFAkk1xjqG8xZXeMTcmLcTBhhO4iDgd+SK2afQwSzsbjEg+oYWMjavAj8z810SsQavOuXQvlg20OS7r6iPYIeCfdv4e3TpNItudsyxliSSSfkmuilSBSlKAUpSgFKUoBSlKAUpSgFKUoBSlKAUpSgFKUoBSlKAUpSgFKUoDXfsq6lWAKkQQa4/IuWiPLO+3ABRzkROVY5J+GPYQRUhSgKprfFCXGK6ZGv6ixcKtpvSjBjbciS5C7f7wJHPNTGk0ty6k6mAWCk2kJ2qeSCwMvkwZ9JA45nPV2VF6y20btzeqBP0N3qQoD4qgCBgV9pSgFKUoBSlKAUpSgFKUoBSlKAUpSgP/2Q=="/>
+          <p:cNvSpPr>
+            <a:spLocks noChangeAspect="1" noChangeArrowheads="1"/>
+          </p:cNvSpPr>
+          <p:nvPr/>
+        </p:nvSpPr>
+        <p:spPr bwMode="auto">
+          <a:xfrm>
+            <a:off x="155575" y="-144463"/>
+            <a:ext cx="304800" cy="304801"/>
+          </a:xfrm>
+          <a:prstGeom prst="rect">
+            <a:avLst/>
+          </a:prstGeom>
+          <a:noFill/>
+        </p:spPr>
+        <p:txBody>
+          <a:bodyPr vert="horz" wrap="square" lIns="91440" tIns="45720" rIns="91440" bIns="45720" numCol="1" anchor="t" anchorCtr="0" compatLnSpc="1">
+            <a:prstTxWarp prst="textNoShape">
+              <a:avLst/>
+            </a:prstTxWarp>
+          </a:bodyPr>
+          <a:lstStyle/>
+          <a:p>
+            <a:endParaRPr lang="en-US"/>
+          </a:p>
+        </p:txBody>
+      </p:sp>
     </p:spTree>
   </p:cSld>
   <p:clrMapOvr>
     <a:masterClrMapping/>
   </p:clrMapOvr>
+  <p:timing>
+    <p:tnLst>
+      <p:par>
+        <p:cTn id="1" dur="indefinite" restart="never" nodeType="tmRoot"/>
+      </p:par>
+    </p:tnLst>
+  </p:timing>
 </p:sld>
 </file>
 
@@ -13522,6 +15078,116 @@
       </p:grpSpPr>
       <p:sp>
         <p:nvSpPr>
+          <p:cNvPr id="2" name="Title 1"/>
+          <p:cNvSpPr>
+            <a:spLocks noGrp="1"/>
+          </p:cNvSpPr>
+          <p:nvPr>
+            <p:ph type="title"/>
+          </p:nvPr>
+        </p:nvSpPr>
+        <p:spPr/>
+        <p:txBody>
+          <a:bodyPr/>
+          <a:lstStyle/>
+          <a:p>
+            <a:r>
+              <a:rPr lang="en-US" dirty="0" smtClean="0">
+                <a:solidFill>
+                  <a:schemeClr val="tx1">
+                    <a:lumMod val="85000"/>
+                    <a:lumOff val="15000"/>
+                  </a:schemeClr>
+                </a:solidFill>
+              </a:rPr>
+              <a:t>Here Be Subsystem Slides (Still Have to Make CDH/ADC ones)</a:t>
+            </a:r>
+            <a:endParaRPr lang="en-US" dirty="0">
+              <a:solidFill>
+                <a:schemeClr val="tx1">
+                  <a:lumMod val="85000"/>
+                  <a:lumOff val="15000"/>
+                </a:schemeClr>
+              </a:solidFill>
+            </a:endParaRPr>
+          </a:p>
+        </p:txBody>
+      </p:sp>
+      <p:sp>
+        <p:nvSpPr>
+          <p:cNvPr id="3" name="Content Placeholder 2"/>
+          <p:cNvSpPr>
+            <a:spLocks noGrp="1"/>
+          </p:cNvSpPr>
+          <p:nvPr>
+            <p:ph idx="1"/>
+          </p:nvPr>
+        </p:nvSpPr>
+        <p:spPr/>
+        <p:txBody>
+          <a:bodyPr/>
+          <a:lstStyle/>
+          <a:p>
+            <a:endParaRPr lang="en-US"/>
+          </a:p>
+        </p:txBody>
+      </p:sp>
+      <p:sp>
+        <p:nvSpPr>
+          <p:cNvPr id="4" name="Slide Number Placeholder 3"/>
+          <p:cNvSpPr>
+            <a:spLocks noGrp="1"/>
+          </p:cNvSpPr>
+          <p:nvPr>
+            <p:ph type="sldNum" idx="12"/>
+          </p:nvPr>
+        </p:nvSpPr>
+        <p:spPr/>
+        <p:txBody>
+          <a:bodyPr/>
+          <a:lstStyle/>
+          <a:p>
+            <a:pPr>
+              <a:defRPr/>
+            </a:pPr>
+            <a:fld id="{8C6E2802-7AC4-44BB-B0A5-E12803E0614A}" type="slidenum">
+              <a:rPr lang="en-US" altLang="en-US" smtClean="0"/>
+              <a:pPr>
+                <a:defRPr/>
+              </a:pPr>
+              <a:t>20</a:t>
+            </a:fld>
+            <a:endParaRPr lang="en-US" altLang="en-US" dirty="0"/>
+          </a:p>
+        </p:txBody>
+      </p:sp>
+    </p:spTree>
+  </p:cSld>
+  <p:clrMapOvr>
+    <a:masterClrMapping/>
+  </p:clrMapOvr>
+</p:sld>
+</file>
+
+<file path=ppt/slides/slide21.xml><?xml version="1.0" encoding="utf-8"?>
+<p:sld xmlns:a="http://schemas.openxmlformats.org/drawingml/2006/main" xmlns:r="http://schemas.openxmlformats.org/officeDocument/2006/relationships" xmlns:p="http://schemas.openxmlformats.org/presentationml/2006/main">
+  <p:cSld>
+    <p:spTree>
+      <p:nvGrpSpPr>
+        <p:cNvPr id="1" name=""/>
+        <p:cNvGrpSpPr/>
+        <p:nvPr/>
+      </p:nvGrpSpPr>
+      <p:grpSpPr>
+        <a:xfrm>
+          <a:off x="0" y="0"/>
+          <a:ext cx="0" cy="0"/>
+          <a:chOff x="0" y="0"/>
+          <a:chExt cx="0" cy="0"/>
+        </a:xfrm>
+      </p:grpSpPr>
+      <p:sp>
+        <p:nvSpPr>
           <p:cNvPr id="2" name="Subtitle 1"/>
           <p:cNvSpPr>
             <a:spLocks noGrp="1"/>
@@ -13605,21 +15271,21 @@
             <a:r>
               <a:rPr lang="en-US" sz="3200" dirty="0" smtClean="0">
                 <a:solidFill>
-                  <a:schemeClr val="bg1">
-                    <a:lumMod val="65000"/>
-                  </a:schemeClr>
-                </a:solidFill>
-              </a:rPr>
-              <a:t>CONOPS</a:t>
-            </a:r>
-          </a:p>
-          <a:p>
-            <a:r>
-              <a:rPr lang="en-US" sz="3200" dirty="0" smtClean="0">
-                <a:solidFill>
                   <a:schemeClr val="tx1">
                     <a:lumMod val="85000"/>
                     <a:lumOff val="15000"/>
+                  </a:schemeClr>
+                </a:solidFill>
+              </a:rPr>
+              <a:t>CONOPS</a:t>
+            </a:r>
+          </a:p>
+          <a:p>
+            <a:r>
+              <a:rPr lang="en-US" sz="3200" dirty="0" smtClean="0">
+                <a:solidFill>
+                  <a:schemeClr val="bg1">
+                    <a:lumMod val="65000"/>
                   </a:schemeClr>
                 </a:solidFill>
               </a:rPr>
@@ -13686,116 +15352,6 @@
 </p:sld>
 </file>
 
-<file path=ppt/slides/slide21.xml><?xml version="1.0" encoding="utf-8"?>
-<p:sld xmlns:a="http://schemas.openxmlformats.org/drawingml/2006/main" xmlns:r="http://schemas.openxmlformats.org/officeDocument/2006/relationships" xmlns:p="http://schemas.openxmlformats.org/presentationml/2006/main">
-  <p:cSld>
-    <p:spTree>
-      <p:nvGrpSpPr>
-        <p:cNvPr id="1" name=""/>
-        <p:cNvGrpSpPr/>
-        <p:nvPr/>
-      </p:nvGrpSpPr>
-      <p:grpSpPr>
-        <a:xfrm>
-          <a:off x="0" y="0"/>
-          <a:ext cx="0" cy="0"/>
-          <a:chOff x="0" y="0"/>
-          <a:chExt cx="0" cy="0"/>
-        </a:xfrm>
-      </p:grpSpPr>
-      <p:sp>
-        <p:nvSpPr>
-          <p:cNvPr id="2" name="Title 1"/>
-          <p:cNvSpPr>
-            <a:spLocks noGrp="1"/>
-          </p:cNvSpPr>
-          <p:nvPr>
-            <p:ph type="title"/>
-          </p:nvPr>
-        </p:nvSpPr>
-        <p:spPr/>
-        <p:txBody>
-          <a:bodyPr/>
-          <a:lstStyle/>
-          <a:p>
-            <a:r>
-              <a:rPr lang="en-US" dirty="0" smtClean="0">
-                <a:solidFill>
-                  <a:schemeClr val="tx1">
-                    <a:lumMod val="85000"/>
-                    <a:lumOff val="15000"/>
-                  </a:schemeClr>
-                </a:solidFill>
-              </a:rPr>
-              <a:t>Here be Risk Assessment</a:t>
-            </a:r>
-            <a:endParaRPr lang="en-US" dirty="0">
-              <a:solidFill>
-                <a:schemeClr val="tx1">
-                  <a:lumMod val="85000"/>
-                  <a:lumOff val="15000"/>
-                </a:schemeClr>
-              </a:solidFill>
-            </a:endParaRPr>
-          </a:p>
-        </p:txBody>
-      </p:sp>
-      <p:sp>
-        <p:nvSpPr>
-          <p:cNvPr id="3" name="Content Placeholder 2"/>
-          <p:cNvSpPr>
-            <a:spLocks noGrp="1"/>
-          </p:cNvSpPr>
-          <p:nvPr>
-            <p:ph idx="1"/>
-          </p:nvPr>
-        </p:nvSpPr>
-        <p:spPr/>
-        <p:txBody>
-          <a:bodyPr/>
-          <a:lstStyle/>
-          <a:p>
-            <a:endParaRPr lang="en-US"/>
-          </a:p>
-        </p:txBody>
-      </p:sp>
-      <p:sp>
-        <p:nvSpPr>
-          <p:cNvPr id="4" name="Slide Number Placeholder 3"/>
-          <p:cNvSpPr>
-            <a:spLocks noGrp="1"/>
-          </p:cNvSpPr>
-          <p:nvPr>
-            <p:ph type="sldNum" idx="12"/>
-          </p:nvPr>
-        </p:nvSpPr>
-        <p:spPr/>
-        <p:txBody>
-          <a:bodyPr/>
-          <a:lstStyle/>
-          <a:p>
-            <a:pPr>
-              <a:defRPr/>
-            </a:pPr>
-            <a:fld id="{8C6E2802-7AC4-44BB-B0A5-E12803E0614A}" type="slidenum">
-              <a:rPr lang="en-US" altLang="en-US" smtClean="0"/>
-              <a:pPr>
-                <a:defRPr/>
-              </a:pPr>
-              <a:t>21</a:t>
-            </a:fld>
-            <a:endParaRPr lang="en-US" altLang="en-US" dirty="0"/>
-          </a:p>
-        </p:txBody>
-      </p:sp>
-    </p:spTree>
-  </p:cSld>
-  <p:clrMapOvr>
-    <a:masterClrMapping/>
-  </p:clrMapOvr>
-</p:sld>
-</file>
-
 <file path=ppt/slides/slide22.xml><?xml version="1.0" encoding="utf-8"?>
 <p:sld xmlns:a="http://schemas.openxmlformats.org/drawingml/2006/main" xmlns:r="http://schemas.openxmlformats.org/officeDocument/2006/relationships" xmlns:p="http://schemas.openxmlformats.org/presentationml/2006/main">
   <p:cSld>
@@ -13815,6 +15371,116 @@
       </p:grpSpPr>
       <p:sp>
         <p:nvSpPr>
+          <p:cNvPr id="2" name="Title 1"/>
+          <p:cNvSpPr>
+            <a:spLocks noGrp="1"/>
+          </p:cNvSpPr>
+          <p:nvPr>
+            <p:ph type="title"/>
+          </p:nvPr>
+        </p:nvSpPr>
+        <p:spPr/>
+        <p:txBody>
+          <a:bodyPr/>
+          <a:lstStyle/>
+          <a:p>
+            <a:r>
+              <a:rPr lang="en-US" dirty="0" smtClean="0">
+                <a:solidFill>
+                  <a:schemeClr val="tx1">
+                    <a:lumMod val="85000"/>
+                    <a:lumOff val="15000"/>
+                  </a:schemeClr>
+                </a:solidFill>
+              </a:rPr>
+              <a:t>Here be CONOPS</a:t>
+            </a:r>
+            <a:endParaRPr lang="en-US" dirty="0">
+              <a:solidFill>
+                <a:schemeClr val="tx1">
+                  <a:lumMod val="85000"/>
+                  <a:lumOff val="15000"/>
+                </a:schemeClr>
+              </a:solidFill>
+            </a:endParaRPr>
+          </a:p>
+        </p:txBody>
+      </p:sp>
+      <p:sp>
+        <p:nvSpPr>
+          <p:cNvPr id="3" name="Content Placeholder 2"/>
+          <p:cNvSpPr>
+            <a:spLocks noGrp="1"/>
+          </p:cNvSpPr>
+          <p:nvPr>
+            <p:ph idx="1"/>
+          </p:nvPr>
+        </p:nvSpPr>
+        <p:spPr/>
+        <p:txBody>
+          <a:bodyPr/>
+          <a:lstStyle/>
+          <a:p>
+            <a:endParaRPr lang="en-US"/>
+          </a:p>
+        </p:txBody>
+      </p:sp>
+      <p:sp>
+        <p:nvSpPr>
+          <p:cNvPr id="4" name="Slide Number Placeholder 3"/>
+          <p:cNvSpPr>
+            <a:spLocks noGrp="1"/>
+          </p:cNvSpPr>
+          <p:nvPr>
+            <p:ph type="sldNum" idx="12"/>
+          </p:nvPr>
+        </p:nvSpPr>
+        <p:spPr/>
+        <p:txBody>
+          <a:bodyPr/>
+          <a:lstStyle/>
+          <a:p>
+            <a:pPr>
+              <a:defRPr/>
+            </a:pPr>
+            <a:fld id="{8C6E2802-7AC4-44BB-B0A5-E12803E0614A}" type="slidenum">
+              <a:rPr lang="en-US" altLang="en-US" smtClean="0"/>
+              <a:pPr>
+                <a:defRPr/>
+              </a:pPr>
+              <a:t>22</a:t>
+            </a:fld>
+            <a:endParaRPr lang="en-US" altLang="en-US" dirty="0"/>
+          </a:p>
+        </p:txBody>
+      </p:sp>
+    </p:spTree>
+  </p:cSld>
+  <p:clrMapOvr>
+    <a:masterClrMapping/>
+  </p:clrMapOvr>
+</p:sld>
+</file>
+
+<file path=ppt/slides/slide23.xml><?xml version="1.0" encoding="utf-8"?>
+<p:sld xmlns:a="http://schemas.openxmlformats.org/drawingml/2006/main" xmlns:r="http://schemas.openxmlformats.org/officeDocument/2006/relationships" xmlns:p="http://schemas.openxmlformats.org/presentationml/2006/main">
+  <p:cSld>
+    <p:spTree>
+      <p:nvGrpSpPr>
+        <p:cNvPr id="1" name=""/>
+        <p:cNvGrpSpPr/>
+        <p:nvPr/>
+      </p:nvGrpSpPr>
+      <p:grpSpPr>
+        <a:xfrm>
+          <a:off x="0" y="0"/>
+          <a:ext cx="0" cy="0"/>
+          <a:chOff x="0" y="0"/>
+          <a:chExt cx="0" cy="0"/>
+        </a:xfrm>
+      </p:grpSpPr>
+      <p:sp>
+        <p:nvSpPr>
           <p:cNvPr id="2" name="Subtitle 1"/>
           <p:cNvSpPr>
             <a:spLocks noGrp="1"/>
@@ -13910,19 +15576,22 @@
             <a:r>
               <a:rPr lang="en-US" sz="3200" dirty="0" smtClean="0">
                 <a:solidFill>
+                  <a:schemeClr val="tx1">
+                    <a:lumMod val="85000"/>
+                    <a:lumOff val="15000"/>
+                  </a:schemeClr>
+                </a:solidFill>
+              </a:rPr>
+              <a:t>Risk Assessment</a:t>
+            </a:r>
+          </a:p>
+          <a:p>
+            <a:r>
+              <a:rPr lang="en-US" sz="3200" dirty="0" smtClean="0">
+                <a:solidFill>
                   <a:schemeClr val="bg1">
                     <a:lumMod val="65000"/>
                   </a:schemeClr>
-                </a:solidFill>
-              </a:rPr>
-              <a:t>Risk Assessment</a:t>
-            </a:r>
-          </a:p>
-          <a:p>
-            <a:r>
-              <a:rPr lang="en-US" sz="3200" dirty="0" smtClean="0">
-                <a:solidFill>
-                  <a:schemeClr val="tx1"/>
                 </a:solidFill>
               </a:rPr>
               <a:t>Schedule</a:t>
@@ -13976,7 +15645,7 @@
 </p:sld>
 </file>
 
-<file path=ppt/slides/slide23.xml><?xml version="1.0" encoding="utf-8"?>
+<file path=ppt/slides/slide24.xml><?xml version="1.0" encoding="utf-8"?>
 <p:sld xmlns:a="http://schemas.openxmlformats.org/drawingml/2006/main" xmlns:r="http://schemas.openxmlformats.org/officeDocument/2006/relationships" xmlns:p="http://schemas.openxmlformats.org/presentationml/2006/main">
   <p:cSld>
     <p:spTree>
@@ -14017,7 +15686,7 @@
                   </a:schemeClr>
                 </a:solidFill>
               </a:rPr>
-              <a:t>Here be Schedule</a:t>
+              <a:t>Here be Risk Assessment</a:t>
             </a:r>
             <a:endParaRPr lang="en-US" dirty="0">
               <a:solidFill>
@@ -14072,7 +15741,7 @@
               <a:pPr>
                 <a:defRPr/>
               </a:pPr>
-              <a:t>23</a:t>
+              <a:t>24</a:t>
             </a:fld>
             <a:endParaRPr lang="en-US" altLang="en-US" dirty="0"/>
           </a:p>
@@ -14086,7 +15755,297 @@
 </p:sld>
 </file>
 
-<file path=ppt/slides/slide24.xml><?xml version="1.0" encoding="utf-8"?>
+<file path=ppt/slides/slide25.xml><?xml version="1.0" encoding="utf-8"?>
+<p:sld xmlns:a="http://schemas.openxmlformats.org/drawingml/2006/main" xmlns:r="http://schemas.openxmlformats.org/officeDocument/2006/relationships" xmlns:p="http://schemas.openxmlformats.org/presentationml/2006/main">
+  <p:cSld>
+    <p:spTree>
+      <p:nvGrpSpPr>
+        <p:cNvPr id="1" name=""/>
+        <p:cNvGrpSpPr/>
+        <p:nvPr/>
+      </p:nvGrpSpPr>
+      <p:grpSpPr>
+        <a:xfrm>
+          <a:off x="0" y="0"/>
+          <a:ext cx="0" cy="0"/>
+          <a:chOff x="0" y="0"/>
+          <a:chExt cx="0" cy="0"/>
+        </a:xfrm>
+      </p:grpSpPr>
+      <p:sp>
+        <p:nvSpPr>
+          <p:cNvPr id="2" name="Subtitle 1"/>
+          <p:cNvSpPr>
+            <a:spLocks noGrp="1"/>
+          </p:cNvSpPr>
+          <p:nvPr>
+            <p:ph type="subTitle" idx="1"/>
+          </p:nvPr>
+        </p:nvSpPr>
+        <p:spPr>
+          <a:xfrm>
+            <a:off x="1456531" y="971338"/>
+            <a:ext cx="7053104" cy="6591512"/>
+          </a:xfrm>
+        </p:spPr>
+        <p:txBody>
+          <a:bodyPr/>
+          <a:lstStyle/>
+          <a:p>
+            <a:r>
+              <a:rPr lang="en-US" sz="3200" dirty="0" smtClean="0">
+                <a:solidFill>
+                  <a:schemeClr val="bg1">
+                    <a:lumMod val="65000"/>
+                  </a:schemeClr>
+                </a:solidFill>
+              </a:rPr>
+              <a:t>Group Organization</a:t>
+            </a:r>
+            <a:endParaRPr lang="en-US" sz="3200" dirty="0" smtClean="0">
+              <a:solidFill>
+                <a:schemeClr val="bg1">
+                  <a:lumMod val="65000"/>
+                </a:schemeClr>
+              </a:solidFill>
+            </a:endParaRPr>
+          </a:p>
+          <a:p>
+            <a:r>
+              <a:rPr lang="en-US" sz="3200" dirty="0" smtClean="0">
+                <a:solidFill>
+                  <a:schemeClr val="bg1">
+                    <a:lumMod val="65000"/>
+                  </a:schemeClr>
+                </a:solidFill>
+              </a:rPr>
+              <a:t>Project Overview</a:t>
+            </a:r>
+          </a:p>
+          <a:p>
+            <a:r>
+              <a:rPr lang="en-US" sz="3200" dirty="0" smtClean="0">
+                <a:solidFill>
+                  <a:schemeClr val="bg1">
+                    <a:lumMod val="65000"/>
+                  </a:schemeClr>
+                </a:solidFill>
+              </a:rPr>
+              <a:t>Design Constraints</a:t>
+            </a:r>
+            <a:endParaRPr lang="en-US" sz="3200" dirty="0" smtClean="0">
+              <a:solidFill>
+                <a:schemeClr val="bg1">
+                  <a:lumMod val="65000"/>
+                </a:schemeClr>
+              </a:solidFill>
+            </a:endParaRPr>
+          </a:p>
+          <a:p>
+            <a:r>
+              <a:rPr lang="en-US" sz="3200" dirty="0" smtClean="0">
+                <a:solidFill>
+                  <a:schemeClr val="bg1">
+                    <a:lumMod val="65000"/>
+                  </a:schemeClr>
+                </a:solidFill>
+              </a:rPr>
+              <a:t>Mission Architecture</a:t>
+            </a:r>
+          </a:p>
+          <a:p>
+            <a:r>
+              <a:rPr lang="en-US" sz="3200" dirty="0" smtClean="0">
+                <a:solidFill>
+                  <a:schemeClr val="bg1">
+                    <a:lumMod val="65000"/>
+                  </a:schemeClr>
+                </a:solidFill>
+              </a:rPr>
+              <a:t>CONOPS</a:t>
+            </a:r>
+          </a:p>
+          <a:p>
+            <a:r>
+              <a:rPr lang="en-US" sz="3200" dirty="0" smtClean="0">
+                <a:solidFill>
+                  <a:schemeClr val="bg1">
+                    <a:lumMod val="65000"/>
+                  </a:schemeClr>
+                </a:solidFill>
+              </a:rPr>
+              <a:t>Risk Assessment</a:t>
+            </a:r>
+          </a:p>
+          <a:p>
+            <a:r>
+              <a:rPr lang="en-US" sz="3200" dirty="0" smtClean="0">
+                <a:solidFill>
+                  <a:schemeClr val="tx1"/>
+                </a:solidFill>
+              </a:rPr>
+              <a:t>Schedule</a:t>
+            </a:r>
+          </a:p>
+          <a:p>
+            <a:endParaRPr lang="en-US" sz="4000" dirty="0">
+              <a:solidFill>
+                <a:schemeClr val="bg1">
+                  <a:lumMod val="65000"/>
+                </a:schemeClr>
+              </a:solidFill>
+            </a:endParaRPr>
+          </a:p>
+          <a:p>
+            <a:endParaRPr lang="en-US" dirty="0" smtClean="0">
+              <a:solidFill>
+                <a:schemeClr val="bg1">
+                  <a:lumMod val="65000"/>
+                </a:schemeClr>
+              </a:solidFill>
+            </a:endParaRPr>
+          </a:p>
+        </p:txBody>
+      </p:sp>
+    </p:spTree>
+    <p:extLst>
+      <p:ext uri="{BB962C8B-B14F-4D97-AF65-F5344CB8AC3E}">
+        <p14:creationId xmlns:p14="http://schemas.microsoft.com/office/powerpoint/2010/main" xmlns="" val="1899034955"/>
+      </p:ext>
+    </p:extLst>
+  </p:cSld>
+  <p:clrMapOvr>
+    <a:masterClrMapping/>
+  </p:clrMapOvr>
+  <mc:AlternateContent xmlns:mc="http://schemas.openxmlformats.org/markup-compatibility/2006">
+    <mc:Choice xmlns:p14="http://schemas.microsoft.com/office/powerpoint/2010/main" xmlns="" Requires="p14">
+      <p:transition spd="slow" p14:dur="2000" advTm="1111"/>
+    </mc:Choice>
+    <mc:Fallback>
+      <p:transition spd="slow" advTm="1111"/>
+    </mc:Fallback>
+  </mc:AlternateContent>
+  <p:timing>
+    <p:tnLst>
+      <p:par>
+        <p:cTn id="1" dur="indefinite" restart="never" nodeType="tmRoot"/>
+      </p:par>
+    </p:tnLst>
+  </p:timing>
+</p:sld>
+</file>
+
+<file path=ppt/slides/slide26.xml><?xml version="1.0" encoding="utf-8"?>
+<p:sld xmlns:a="http://schemas.openxmlformats.org/drawingml/2006/main" xmlns:r="http://schemas.openxmlformats.org/officeDocument/2006/relationships" xmlns:p="http://schemas.openxmlformats.org/presentationml/2006/main">
+  <p:cSld>
+    <p:spTree>
+      <p:nvGrpSpPr>
+        <p:cNvPr id="1" name=""/>
+        <p:cNvGrpSpPr/>
+        <p:nvPr/>
+      </p:nvGrpSpPr>
+      <p:grpSpPr>
+        <a:xfrm>
+          <a:off x="0" y="0"/>
+          <a:ext cx="0" cy="0"/>
+          <a:chOff x="0" y="0"/>
+          <a:chExt cx="0" cy="0"/>
+        </a:xfrm>
+      </p:grpSpPr>
+      <p:sp>
+        <p:nvSpPr>
+          <p:cNvPr id="2" name="Title 1"/>
+          <p:cNvSpPr>
+            <a:spLocks noGrp="1"/>
+          </p:cNvSpPr>
+          <p:nvPr>
+            <p:ph type="title"/>
+          </p:nvPr>
+        </p:nvSpPr>
+        <p:spPr/>
+        <p:txBody>
+          <a:bodyPr/>
+          <a:lstStyle/>
+          <a:p>
+            <a:r>
+              <a:rPr lang="en-US" dirty="0" smtClean="0">
+                <a:solidFill>
+                  <a:schemeClr val="tx1">
+                    <a:lumMod val="85000"/>
+                    <a:lumOff val="15000"/>
+                  </a:schemeClr>
+                </a:solidFill>
+              </a:rPr>
+              <a:t>Here be Schedule</a:t>
+            </a:r>
+            <a:endParaRPr lang="en-US" dirty="0">
+              <a:solidFill>
+                <a:schemeClr val="tx1">
+                  <a:lumMod val="85000"/>
+                  <a:lumOff val="15000"/>
+                </a:schemeClr>
+              </a:solidFill>
+            </a:endParaRPr>
+          </a:p>
+        </p:txBody>
+      </p:sp>
+      <p:sp>
+        <p:nvSpPr>
+          <p:cNvPr id="3" name="Content Placeholder 2"/>
+          <p:cNvSpPr>
+            <a:spLocks noGrp="1"/>
+          </p:cNvSpPr>
+          <p:nvPr>
+            <p:ph idx="1"/>
+          </p:nvPr>
+        </p:nvSpPr>
+        <p:spPr/>
+        <p:txBody>
+          <a:bodyPr/>
+          <a:lstStyle/>
+          <a:p>
+            <a:endParaRPr lang="en-US"/>
+          </a:p>
+        </p:txBody>
+      </p:sp>
+      <p:sp>
+        <p:nvSpPr>
+          <p:cNvPr id="4" name="Slide Number Placeholder 3"/>
+          <p:cNvSpPr>
+            <a:spLocks noGrp="1"/>
+          </p:cNvSpPr>
+          <p:nvPr>
+            <p:ph type="sldNum" idx="12"/>
+          </p:nvPr>
+        </p:nvSpPr>
+        <p:spPr/>
+        <p:txBody>
+          <a:bodyPr/>
+          <a:lstStyle/>
+          <a:p>
+            <a:pPr>
+              <a:defRPr/>
+            </a:pPr>
+            <a:fld id="{8C6E2802-7AC4-44BB-B0A5-E12803E0614A}" type="slidenum">
+              <a:rPr lang="en-US" altLang="en-US" smtClean="0"/>
+              <a:pPr>
+                <a:defRPr/>
+              </a:pPr>
+              <a:t>26</a:t>
+            </a:fld>
+            <a:endParaRPr lang="en-US" altLang="en-US" dirty="0"/>
+          </a:p>
+        </p:txBody>
+      </p:sp>
+    </p:spTree>
+  </p:cSld>
+  <p:clrMapOvr>
+    <a:masterClrMapping/>
+  </p:clrMapOvr>
+</p:sld>
+</file>
+
+<file path=ppt/slides/slide27.xml><?xml version="1.0" encoding="utf-8"?>
 <p:sld xmlns:a="http://schemas.openxmlformats.org/drawingml/2006/main" xmlns:r="http://schemas.openxmlformats.org/officeDocument/2006/relationships" xmlns:p="http://schemas.openxmlformats.org/presentationml/2006/main">
   <p:cSld>
     <p:spTree>
@@ -14993,7 +16952,7 @@
               <a:pPr>
                 <a:defRPr/>
               </a:pPr>
-              <a:t>24</a:t>
+              <a:t>27</a:t>
             </a:fld>
             <a:endParaRPr lang="en-US" altLang="en-US" dirty="0"/>
           </a:p>

</xml_diff>